<commit_message>
Updated information for Lecture 6 (Visualizing and Exploring)
</commit_message>
<xml_diff>
--- a/Lectures/6 Exploration.pptx
+++ b/Lectures/6 Exploration.pptx
@@ -4724,7 +4724,7 @@
           <a:p>
             <a:fld id="{D3AAB66F-B1B7-D045-B4E8-4F60236F228D}" type="datetimeFigureOut">
               <a:rPr lang="en-US" smtClean="0"/>
-              <a:t>1/29/14</a:t>
+              <a:t>1/30/14</a:t>
             </a:fld>
             <a:endParaRPr lang="en-US"/>
           </a:p>
@@ -4890,7 +4890,7 @@
           <a:p>
             <a:fld id="{BCCF8E76-06A6-164E-A6FA-EC32C13EB232}" type="datetimeFigureOut">
               <a:rPr lang="en-US" smtClean="0"/>
-              <a:t>1/29/14</a:t>
+              <a:t>1/30/14</a:t>
             </a:fld>
             <a:endParaRPr lang="en-US"/>
           </a:p>
@@ -5301,16 +5301,17 @@
           <a:p>
             <a:r>
               <a:rPr lang="en-US" dirty="0" smtClean="0"/>
-              <a:t>Same boxplots with lots of outliers (prior to cleaning)</a:t>
+              <a:t>Same boxplots with lots of outliers (prior to </a:t>
+            </a:r>
+            <a:r>
+              <a:rPr lang="en-US" smtClean="0"/>
+              <a:t>cleaning</a:t>
+            </a:r>
+            <a:r>
+              <a:rPr lang="en-US" smtClean="0"/>
+              <a:t>)</a:t>
             </a:r>
             <a:endParaRPr lang="en-US" baseline="0" dirty="0" smtClean="0"/>
-          </a:p>
-          <a:p>
-            <a:r>
-              <a:rPr lang="en-US" baseline="0" dirty="0" smtClean="0"/>
-              <a:t>Also – is this even an appropriate display for zips</a:t>
-            </a:r>
-            <a:endParaRPr lang="en-US" dirty="0"/>
           </a:p>
         </p:txBody>
       </p:sp>
@@ -7038,13 +7039,11 @@
           <a:p>
             <a:r>
               <a:rPr lang="en-US" baseline="0" dirty="0" smtClean="0"/>
-              <a:t>Also – is this even an appropriate display for zips</a:t>
-            </a:r>
-          </a:p>
-          <a:p>
+              <a:t>Boxplots </a:t>
+            </a:r>
             <a:r>
               <a:rPr lang="en-US" baseline="0" dirty="0" smtClean="0"/>
-              <a:t>Boxplots make comparison really easy … </a:t>
+              <a:t>make comparison really easy … </a:t>
             </a:r>
           </a:p>
           <a:p>
@@ -7609,7 +7608,7 @@
             <a:fld id="{FA3C144B-2939-9A49-B014-915EC3E81866}" type="datetime1">
               <a:rPr lang="en-US" smtClean="0"/>
               <a:pPr/>
-              <a:t>1/29/14</a:t>
+              <a:t>1/30/14</a:t>
             </a:fld>
             <a:endParaRPr lang="en-US" dirty="0"/>
           </a:p>
@@ -8038,7 +8037,7 @@
           <a:p>
             <a:fld id="{76838339-A875-5E45-AB3F-AAABD270346A}" type="datetime1">
               <a:rPr lang="en-US" smtClean="0"/>
-              <a:t>1/29/14</a:t>
+              <a:t>1/30/14</a:t>
             </a:fld>
             <a:endParaRPr lang="en-US"/>
           </a:p>
@@ -8324,7 +8323,7 @@
             <a:fld id="{FA3C144B-2939-9A49-B014-915EC3E81866}" type="datetime1">
               <a:rPr lang="en-US" smtClean="0"/>
               <a:pPr/>
-              <a:t>1/29/14</a:t>
+              <a:t>1/30/14</a:t>
             </a:fld>
             <a:endParaRPr lang="en-US" dirty="0"/>
           </a:p>
@@ -8806,7 +8805,7 @@
           <a:p>
             <a:fld id="{A73F672F-A5FB-5745-934A-1BF51CA5539C}" type="datetime1">
               <a:rPr lang="en-US" smtClean="0"/>
-              <a:t>1/29/14</a:t>
+              <a:t>1/30/14</a:t>
             </a:fld>
             <a:endParaRPr lang="en-US"/>
           </a:p>
@@ -9148,7 +9147,7 @@
             <a:fld id="{FA3C144B-2939-9A49-B014-915EC3E81866}" type="datetime1">
               <a:rPr lang="en-US" smtClean="0"/>
               <a:pPr/>
-              <a:t>1/29/14</a:t>
+              <a:t>1/30/14</a:t>
             </a:fld>
             <a:endParaRPr lang="en-US" dirty="0"/>
           </a:p>
@@ -9612,7 +9611,7 @@
           <a:p>
             <a:fld id="{6AFE6A63-5EBE-3E48-B0AE-DF655A1ECE76}" type="datetime1">
               <a:rPr lang="en-US" smtClean="0"/>
-              <a:t>1/29/14</a:t>
+              <a:t>1/30/14</a:t>
             </a:fld>
             <a:endParaRPr lang="en-US"/>
           </a:p>
@@ -9931,7 +9930,7 @@
           <a:p>
             <a:fld id="{4A019F0C-9D18-B54A-9AC9-18AA74EDB034}" type="datetime1">
               <a:rPr lang="en-US" smtClean="0"/>
-              <a:t>1/29/14</a:t>
+              <a:t>1/30/14</a:t>
             </a:fld>
             <a:endParaRPr lang="en-US"/>
           </a:p>
@@ -10241,7 +10240,7 @@
             <a:fld id="{FA3C144B-2939-9A49-B014-915EC3E81866}" type="datetime1">
               <a:rPr lang="en-US" smtClean="0"/>
               <a:pPr/>
-              <a:t>1/29/14</a:t>
+              <a:t>1/30/14</a:t>
             </a:fld>
             <a:endParaRPr lang="en-US" dirty="0"/>
           </a:p>
@@ -10504,7 +10503,7 @@
           <a:p>
             <a:fld id="{FA3C144B-2939-9A49-B014-915EC3E81866}" type="datetime1">
               <a:rPr lang="en-US" smtClean="0"/>
-              <a:t>1/29/14</a:t>
+              <a:t>1/30/14</a:t>
             </a:fld>
             <a:endParaRPr lang="en-US" dirty="0"/>
           </a:p>
@@ -10872,7 +10871,7 @@
           <a:p>
             <a:fld id="{7053BEFA-1175-F644-B249-7D41D72BD3FF}" type="datetime1">
               <a:rPr lang="en-US" smtClean="0"/>
-              <a:t>1/29/14</a:t>
+              <a:t>1/30/14</a:t>
             </a:fld>
             <a:endParaRPr lang="en-US"/>
           </a:p>
@@ -10991,7 +10990,7 @@
             <a:fld id="{FA3C144B-2939-9A49-B014-915EC3E81866}" type="datetime1">
               <a:rPr lang="en-US" smtClean="0"/>
               <a:pPr/>
-              <a:t>1/29/14</a:t>
+              <a:t>1/30/14</a:t>
             </a:fld>
             <a:endParaRPr lang="en-US" dirty="0"/>
           </a:p>
@@ -11208,7 +11207,7 @@
             <a:fld id="{FA3C144B-2939-9A49-B014-915EC3E81866}" type="datetime1">
               <a:rPr lang="en-US" smtClean="0"/>
               <a:pPr/>
-              <a:t>1/29/14</a:t>
+              <a:t>1/30/14</a:t>
             </a:fld>
             <a:endParaRPr lang="en-US" dirty="0"/>
           </a:p>
@@ -11453,7 +11452,7 @@
             <a:fld id="{FA3C144B-2939-9A49-B014-915EC3E81866}" type="datetime1">
               <a:rPr lang="en-US" smtClean="0"/>
               <a:pPr/>
-              <a:t>1/29/14</a:t>
+              <a:t>1/30/14</a:t>
             </a:fld>
             <a:endParaRPr lang="en-US" dirty="0"/>
           </a:p>
@@ -11831,7 +11830,7 @@
           <a:p>
             <a:fld id="{111EEF3B-ABF2-AA4E-9E24-0C6256942674}" type="datetime1">
               <a:rPr lang="en-US" smtClean="0"/>
-              <a:t>1/29/14</a:t>
+              <a:t>1/30/14</a:t>
             </a:fld>
             <a:endParaRPr lang="en-US"/>
           </a:p>
@@ -11995,7 +11994,7 @@
             <a:fld id="{FA3C144B-2939-9A49-B014-915EC3E81866}" type="datetime1">
               <a:rPr lang="en-US" smtClean="0"/>
               <a:pPr/>
-              <a:t>1/29/14</a:t>
+              <a:t>1/30/14</a:t>
             </a:fld>
             <a:endParaRPr lang="en-US" dirty="0"/>
           </a:p>
@@ -12412,7 +12411,7 @@
             <a:fld id="{FA3C144B-2939-9A49-B014-915EC3E81866}" type="datetime1">
               <a:rPr lang="en-US" smtClean="0"/>
               <a:pPr/>
-              <a:t>1/29/14</a:t>
+              <a:t>1/30/14</a:t>
             </a:fld>
             <a:endParaRPr lang="en-US" dirty="0"/>
           </a:p>
@@ -12728,7 +12727,7 @@
             <a:fld id="{FA3C144B-2939-9A49-B014-915EC3E81866}" type="datetime1">
               <a:rPr lang="en-US" smtClean="0"/>
               <a:pPr/>
-              <a:t>1/29/14</a:t>
+              <a:t>1/30/14</a:t>
             </a:fld>
             <a:endParaRPr lang="en-US" dirty="0"/>
           </a:p>
@@ -13394,7 +13393,7 @@
             <a:fld id="{FA3C144B-2939-9A49-B014-915EC3E81866}" type="datetime1">
               <a:rPr lang="en-US" smtClean="0"/>
               <a:pPr/>
-              <a:t>1/29/14</a:t>
+              <a:t>1/30/14</a:t>
             </a:fld>
             <a:endParaRPr lang="en-US" dirty="0"/>
           </a:p>
@@ -14438,6 +14437,13 @@
   <p:clrMapOvr>
     <a:masterClrMapping/>
   </p:clrMapOvr>
+  <p:timing>
+    <p:tnLst>
+      <p:par>
+        <p:cTn xmlns:p14="http://schemas.microsoft.com/office/powerpoint/2010/main" id="1" dur="indefinite" restart="never" nodeType="tmRoot"/>
+      </p:par>
+    </p:tnLst>
+  </p:timing>
 </p:sld>
 </file>
 
@@ -14595,7 +14601,7 @@
           <a:p>
             <a:fld id="{7053BEFA-1175-F644-B249-7D41D72BD3FF}" type="datetime1">
               <a:rPr lang="en-US" smtClean="0"/>
-              <a:t>1/29/14</a:t>
+              <a:t>1/30/14</a:t>
             </a:fld>
             <a:endParaRPr lang="en-US"/>
           </a:p>
@@ -14653,6 +14659,13 @@
   <p:clrMapOvr>
     <a:masterClrMapping/>
   </p:clrMapOvr>
+  <p:timing>
+    <p:tnLst>
+      <p:par>
+        <p:cTn xmlns:p14="http://schemas.microsoft.com/office/powerpoint/2010/main" id="1" dur="indefinite" restart="never" nodeType="tmRoot"/>
+      </p:par>
+    </p:tnLst>
+  </p:timing>
 </p:sld>
 </file>
 
@@ -14802,7 +14815,7 @@
           <a:p>
             <a:fld id="{7053BEFA-1175-F644-B249-7D41D72BD3FF}" type="datetime1">
               <a:rPr lang="en-US" smtClean="0"/>
-              <a:t>1/29/14</a:t>
+              <a:t>1/30/14</a:t>
             </a:fld>
             <a:endParaRPr lang="en-US"/>
           </a:p>
@@ -14860,6 +14873,13 @@
   <p:clrMapOvr>
     <a:masterClrMapping/>
   </p:clrMapOvr>
+  <p:timing>
+    <p:tnLst>
+      <p:par>
+        <p:cTn xmlns:p14="http://schemas.microsoft.com/office/powerpoint/2010/main" id="1" dur="indefinite" restart="never" nodeType="tmRoot"/>
+      </p:par>
+    </p:tnLst>
+  </p:timing>
 </p:sld>
 </file>
 
@@ -14945,7 +14965,7 @@
           <a:p>
             <a:fld id="{7053BEFA-1175-F644-B249-7D41D72BD3FF}" type="datetime1">
               <a:rPr lang="en-US" smtClean="0"/>
-              <a:t>1/29/14</a:t>
+              <a:t>1/30/14</a:t>
             </a:fld>
             <a:endParaRPr lang="en-US"/>
           </a:p>
@@ -15206,7 +15226,7 @@
           <a:p>
             <a:fld id="{7053BEFA-1175-F644-B249-7D41D72BD3FF}" type="datetime1">
               <a:rPr lang="en-US" smtClean="0"/>
-              <a:t>1/29/14</a:t>
+              <a:t>1/30/14</a:t>
             </a:fld>
             <a:endParaRPr lang="en-US"/>
           </a:p>
@@ -15264,6 +15284,13 @@
   <p:clrMapOvr>
     <a:masterClrMapping/>
   </p:clrMapOvr>
+  <p:timing>
+    <p:tnLst>
+      <p:par>
+        <p:cTn xmlns:p14="http://schemas.microsoft.com/office/powerpoint/2010/main" id="1" dur="indefinite" restart="never" nodeType="tmRoot"/>
+      </p:par>
+    </p:tnLst>
+  </p:timing>
 </p:sld>
 </file>
 
@@ -15406,7 +15433,7 @@
           <a:p>
             <a:fld id="{7053BEFA-1175-F644-B249-7D41D72BD3FF}" type="datetime1">
               <a:rPr lang="en-US" smtClean="0"/>
-              <a:t>1/29/14</a:t>
+              <a:t>1/30/14</a:t>
             </a:fld>
             <a:endParaRPr lang="en-US"/>
           </a:p>
@@ -15464,6 +15491,13 @@
   <p:clrMapOvr>
     <a:masterClrMapping/>
   </p:clrMapOvr>
+  <p:timing>
+    <p:tnLst>
+      <p:par>
+        <p:cTn xmlns:p14="http://schemas.microsoft.com/office/powerpoint/2010/main" id="1" dur="indefinite" restart="never" nodeType="tmRoot"/>
+      </p:par>
+    </p:tnLst>
+  </p:timing>
 </p:sld>
 </file>
 
@@ -15612,7 +15646,7 @@
           <a:p>
             <a:fld id="{7053BEFA-1175-F644-B249-7D41D72BD3FF}" type="datetime1">
               <a:rPr lang="en-US" smtClean="0"/>
-              <a:t>1/29/14</a:t>
+              <a:t>1/30/14</a:t>
             </a:fld>
             <a:endParaRPr lang="en-US"/>
           </a:p>
@@ -16440,7 +16474,7 @@
           <a:p>
             <a:fld id="{7053BEFA-1175-F644-B249-7D41D72BD3FF}" type="datetime1">
               <a:rPr lang="en-US" smtClean="0"/>
-              <a:t>1/29/14</a:t>
+              <a:t>1/30/14</a:t>
             </a:fld>
             <a:endParaRPr lang="en-US"/>
           </a:p>
@@ -17896,7 +17930,7 @@
           <a:p>
             <a:fld id="{7053BEFA-1175-F644-B249-7D41D72BD3FF}" type="datetime1">
               <a:rPr lang="en-US" smtClean="0"/>
-              <a:t>1/29/14</a:t>
+              <a:t>1/30/14</a:t>
             </a:fld>
             <a:endParaRPr lang="en-US"/>
           </a:p>
@@ -21766,7 +21800,7 @@
           <a:p>
             <a:fld id="{7053BEFA-1175-F644-B249-7D41D72BD3FF}" type="datetime1">
               <a:rPr lang="en-US" smtClean="0"/>
-              <a:t>1/29/14</a:t>
+              <a:t>1/30/14</a:t>
             </a:fld>
             <a:endParaRPr lang="en-US"/>
           </a:p>
@@ -21910,7 +21944,7 @@
           <a:p>
             <a:fld id="{111EEF3B-ABF2-AA4E-9E24-0C6256942674}" type="datetime1">
               <a:rPr lang="en-US" smtClean="0"/>
-              <a:t>1/29/14</a:t>
+              <a:t>1/30/14</a:t>
             </a:fld>
             <a:endParaRPr lang="en-US"/>
           </a:p>
@@ -21949,6 +21983,13 @@
   <p:clrMapOvr>
     <a:masterClrMapping/>
   </p:clrMapOvr>
+  <p:timing>
+    <p:tnLst>
+      <p:par>
+        <p:cTn xmlns:p14="http://schemas.microsoft.com/office/powerpoint/2010/main" id="1" dur="indefinite" restart="never" nodeType="tmRoot"/>
+      </p:par>
+    </p:tnLst>
+  </p:timing>
 </p:sld>
 </file>
 
@@ -22034,7 +22075,7 @@
           <a:p>
             <a:fld id="{7053BEFA-1175-F644-B249-7D41D72BD3FF}" type="datetime1">
               <a:rPr lang="en-US" smtClean="0"/>
-              <a:t>1/29/14</a:t>
+              <a:t>1/30/14</a:t>
             </a:fld>
             <a:endParaRPr lang="en-US"/>
           </a:p>
@@ -22092,6 +22133,13 @@
   <p:clrMapOvr>
     <a:masterClrMapping/>
   </p:clrMapOvr>
+  <p:timing>
+    <p:tnLst>
+      <p:par>
+        <p:cTn xmlns:p14="http://schemas.microsoft.com/office/powerpoint/2010/main" id="1" dur="indefinite" restart="never" nodeType="tmRoot"/>
+      </p:par>
+    </p:tnLst>
+  </p:timing>
 </p:sld>
 </file>
 
@@ -22229,7 +22277,7 @@
           <a:p>
             <a:fld id="{7053BEFA-1175-F644-B249-7D41D72BD3FF}" type="datetime1">
               <a:rPr lang="en-US" smtClean="0"/>
-              <a:t>1/29/14</a:t>
+              <a:t>1/30/14</a:t>
             </a:fld>
             <a:endParaRPr lang="en-US"/>
           </a:p>
@@ -22287,6 +22335,13 @@
   <p:clrMapOvr>
     <a:masterClrMapping/>
   </p:clrMapOvr>
+  <p:timing>
+    <p:tnLst>
+      <p:par>
+        <p:cTn xmlns:p14="http://schemas.microsoft.com/office/powerpoint/2010/main" id="1" dur="indefinite" restart="never" nodeType="tmRoot"/>
+      </p:par>
+    </p:tnLst>
+  </p:timing>
 </p:sld>
 </file>
 
@@ -22324,7 +22379,7 @@
           <a:p>
             <a:r>
               <a:rPr lang="en-US" dirty="0" smtClean="0"/>
-              <a:t>Boxplot</a:t>
+              <a:t>Boxplot [Data Source Unspecified]</a:t>
             </a:r>
             <a:endParaRPr lang="en-US" dirty="0"/>
           </a:p>
@@ -22347,7 +22402,7 @@
           <a:p>
             <a:fld id="{7053BEFA-1175-F644-B249-7D41D72BD3FF}" type="datetime1">
               <a:rPr lang="en-US" smtClean="0"/>
-              <a:t>1/29/14</a:t>
+              <a:t>1/30/14</a:t>
             </a:fld>
             <a:endParaRPr lang="en-US"/>
           </a:p>
@@ -22430,6 +22485,13 @@
   <p:clrMapOvr>
     <a:masterClrMapping/>
   </p:clrMapOvr>
+  <p:timing>
+    <p:tnLst>
+      <p:par>
+        <p:cTn xmlns:p14="http://schemas.microsoft.com/office/powerpoint/2010/main" id="1" dur="indefinite" restart="never" nodeType="tmRoot"/>
+      </p:par>
+    </p:tnLst>
+  </p:timing>
 </p:sld>
 </file>
 
@@ -22467,7 +22529,11 @@
           <a:p>
             <a:r>
               <a:rPr lang="en-US" dirty="0" smtClean="0"/>
-              <a:t>Boxplot</a:t>
+              <a:t>Boxplot [Data </a:t>
+            </a:r>
+            <a:r>
+              <a:rPr lang="en-US" smtClean="0"/>
+              <a:t>Source Unspecified]</a:t>
             </a:r>
             <a:endParaRPr lang="en-US" dirty="0"/>
           </a:p>
@@ -22490,7 +22556,7 @@
           <a:p>
             <a:fld id="{7053BEFA-1175-F644-B249-7D41D72BD3FF}" type="datetime1">
               <a:rPr lang="en-US" smtClean="0"/>
-              <a:t>1/29/14</a:t>
+              <a:t>1/30/14</a:t>
             </a:fld>
             <a:endParaRPr lang="en-US"/>
           </a:p>
@@ -22573,6 +22639,13 @@
   <p:clrMapOvr>
     <a:masterClrMapping/>
   </p:clrMapOvr>
+  <p:timing>
+    <p:tnLst>
+      <p:par>
+        <p:cTn xmlns:p14="http://schemas.microsoft.com/office/powerpoint/2010/main" id="1" dur="indefinite" restart="never" nodeType="tmRoot"/>
+      </p:par>
+    </p:tnLst>
+  </p:timing>
 </p:sld>
 </file>
 
@@ -22664,7 +22737,7 @@
           <a:p>
             <a:fld id="{7053BEFA-1175-F644-B249-7D41D72BD3FF}" type="datetime1">
               <a:rPr lang="en-US" smtClean="0"/>
-              <a:t>1/29/14</a:t>
+              <a:t>1/30/14</a:t>
             </a:fld>
             <a:endParaRPr lang="en-US"/>
           </a:p>
@@ -22722,6 +22795,13 @@
   <p:clrMapOvr>
     <a:masterClrMapping/>
   </p:clrMapOvr>
+  <p:timing>
+    <p:tnLst>
+      <p:par>
+        <p:cTn xmlns:p14="http://schemas.microsoft.com/office/powerpoint/2010/main" id="1" dur="indefinite" restart="never" nodeType="tmRoot"/>
+      </p:par>
+    </p:tnLst>
+  </p:timing>
 </p:sld>
 </file>
 
@@ -22821,7 +22901,7 @@
           <a:p>
             <a:fld id="{7053BEFA-1175-F644-B249-7D41D72BD3FF}" type="datetime1">
               <a:rPr lang="en-US" smtClean="0"/>
-              <a:t>1/29/14</a:t>
+              <a:t>1/30/14</a:t>
             </a:fld>
             <a:endParaRPr lang="en-US"/>
           </a:p>
@@ -23108,7 +23188,7 @@
           <a:p>
             <a:fld id="{7053BEFA-1175-F644-B249-7D41D72BD3FF}" type="datetime1">
               <a:rPr lang="en-US" smtClean="0"/>
-              <a:t>1/29/14</a:t>
+              <a:t>1/30/14</a:t>
             </a:fld>
             <a:endParaRPr lang="en-US"/>
           </a:p>
@@ -23445,7 +23525,7 @@
           <a:p>
             <a:fld id="{7053BEFA-1175-F644-B249-7D41D72BD3FF}" type="datetime1">
               <a:rPr lang="en-US" smtClean="0"/>
-              <a:t>1/29/14</a:t>
+              <a:t>1/30/14</a:t>
             </a:fld>
             <a:endParaRPr lang="en-US"/>
           </a:p>
@@ -23503,6 +23583,13 @@
   <p:clrMapOvr>
     <a:masterClrMapping/>
   </p:clrMapOvr>
+  <p:timing>
+    <p:tnLst>
+      <p:par>
+        <p:cTn xmlns:p14="http://schemas.microsoft.com/office/powerpoint/2010/main" id="1" dur="indefinite" restart="never" nodeType="tmRoot"/>
+      </p:par>
+    </p:tnLst>
+  </p:timing>
 </p:sld>
 </file>
 
@@ -23628,7 +23715,7 @@
           <a:p>
             <a:fld id="{7053BEFA-1175-F644-B249-7D41D72BD3FF}" type="datetime1">
               <a:rPr lang="en-US" smtClean="0"/>
-              <a:t>1/29/14</a:t>
+              <a:t>1/30/14</a:t>
             </a:fld>
             <a:endParaRPr lang="en-US"/>
           </a:p>
@@ -23686,6 +23773,13 @@
   <p:clrMapOvr>
     <a:masterClrMapping/>
   </p:clrMapOvr>
+  <p:timing>
+    <p:tnLst>
+      <p:par>
+        <p:cTn xmlns:p14="http://schemas.microsoft.com/office/powerpoint/2010/main" id="1" dur="indefinite" restart="never" nodeType="tmRoot"/>
+      </p:par>
+    </p:tnLst>
+  </p:timing>
 </p:sld>
 </file>
 
@@ -23846,7 +23940,7 @@
           <a:p>
             <a:fld id="{7053BEFA-1175-F644-B249-7D41D72BD3FF}" type="datetime1">
               <a:rPr lang="en-US" smtClean="0"/>
-              <a:t>1/29/14</a:t>
+              <a:t>1/30/14</a:t>
             </a:fld>
             <a:endParaRPr lang="en-US"/>
           </a:p>
@@ -23904,6 +23998,13 @@
   <p:clrMapOvr>
     <a:masterClrMapping/>
   </p:clrMapOvr>
+  <p:timing>
+    <p:tnLst>
+      <p:par>
+        <p:cTn xmlns:p14="http://schemas.microsoft.com/office/powerpoint/2010/main" id="1" dur="indefinite" restart="never" nodeType="tmRoot"/>
+      </p:par>
+    </p:tnLst>
+  </p:timing>
 </p:sld>
 </file>
 
@@ -24050,7 +24151,7 @@
           <a:p>
             <a:fld id="{7053BEFA-1175-F644-B249-7D41D72BD3FF}" type="datetime1">
               <a:rPr lang="en-US" smtClean="0"/>
-              <a:t>1/29/14</a:t>
+              <a:t>1/30/14</a:t>
             </a:fld>
             <a:endParaRPr lang="en-US"/>
           </a:p>
@@ -24276,7 +24377,7 @@
             <a:fld id="{A73F672F-A5FB-5745-934A-1BF51CA5539C}" type="datetime1">
               <a:rPr lang="en-US" smtClean="0"/>
               <a:pPr/>
-              <a:t>1/29/14</a:t>
+              <a:t>1/30/14</a:t>
             </a:fld>
             <a:endParaRPr lang="en-US"/>
           </a:p>
@@ -24335,6 +24436,13 @@
   <p:clrMapOvr>
     <a:masterClrMapping/>
   </p:clrMapOvr>
+  <p:timing>
+    <p:tnLst>
+      <p:par>
+        <p:cTn xmlns:p14="http://schemas.microsoft.com/office/powerpoint/2010/main" id="1" dur="indefinite" restart="never" nodeType="tmRoot"/>
+      </p:par>
+    </p:tnLst>
+  </p:timing>
 </p:sld>
 </file>
 
@@ -24395,7 +24503,7 @@
           <a:p>
             <a:fld id="{7053BEFA-1175-F644-B249-7D41D72BD3FF}" type="datetime1">
               <a:rPr lang="en-US" smtClean="0"/>
-              <a:t>1/29/14</a:t>
+              <a:t>1/30/14</a:t>
             </a:fld>
             <a:endParaRPr lang="en-US"/>
           </a:p>
@@ -24953,7 +25061,7 @@
           <a:p>
             <a:fld id="{7053BEFA-1175-F644-B249-7D41D72BD3FF}" type="datetime1">
               <a:rPr lang="en-US" smtClean="0"/>
-              <a:t>1/29/14</a:t>
+              <a:t>1/30/14</a:t>
             </a:fld>
             <a:endParaRPr lang="en-US"/>
           </a:p>
@@ -25458,7 +25566,7 @@
           <a:p>
             <a:fld id="{7053BEFA-1175-F644-B249-7D41D72BD3FF}" type="datetime1">
               <a:rPr lang="en-US" smtClean="0"/>
-              <a:t>1/29/14</a:t>
+              <a:t>1/30/14</a:t>
             </a:fld>
             <a:endParaRPr lang="en-US"/>
           </a:p>
@@ -25969,7 +26077,7 @@
             <a:fld id="{FA3C144B-2939-9A49-B014-915EC3E81866}" type="datetime1">
               <a:rPr lang="en-US" smtClean="0"/>
               <a:pPr/>
-              <a:t>1/29/14</a:t>
+              <a:t>1/30/14</a:t>
             </a:fld>
             <a:endParaRPr lang="en-US" dirty="0"/>
           </a:p>
@@ -26096,6 +26204,13 @@
   <p:clrMapOvr>
     <a:masterClrMapping/>
   </p:clrMapOvr>
+  <p:timing>
+    <p:tnLst>
+      <p:par>
+        <p:cTn xmlns:p14="http://schemas.microsoft.com/office/powerpoint/2010/main" id="1" dur="indefinite" restart="never" nodeType="tmRoot"/>
+      </p:par>
+    </p:tnLst>
+  </p:timing>
 </p:sld>
 </file>
 
@@ -26199,7 +26314,7 @@
           <a:p>
             <a:fld id="{7053BEFA-1175-F644-B249-7D41D72BD3FF}" type="datetime1">
               <a:rPr lang="en-US" smtClean="0"/>
-              <a:t>1/29/14</a:t>
+              <a:t>1/30/14</a:t>
             </a:fld>
             <a:endParaRPr lang="en-US"/>
           </a:p>
@@ -26257,6 +26372,13 @@
   <p:clrMapOvr>
     <a:masterClrMapping/>
   </p:clrMapOvr>
+  <p:timing>
+    <p:tnLst>
+      <p:par>
+        <p:cTn xmlns:p14="http://schemas.microsoft.com/office/powerpoint/2010/main" id="1" dur="indefinite" restart="never" nodeType="tmRoot"/>
+      </p:par>
+    </p:tnLst>
+  </p:timing>
 </p:sld>
 </file>
 
@@ -26316,7 +26438,7 @@
           <a:p>
             <a:fld id="{7053BEFA-1175-F644-B249-7D41D72BD3FF}" type="datetime1">
               <a:rPr lang="en-US" smtClean="0"/>
-              <a:t>1/29/14</a:t>
+              <a:t>1/30/14</a:t>
             </a:fld>
             <a:endParaRPr lang="en-US"/>
           </a:p>
@@ -26517,7 +26639,7 @@
           <a:p>
             <a:fld id="{111EEF3B-ABF2-AA4E-9E24-0C6256942674}" type="datetime1">
               <a:rPr lang="en-US" smtClean="0"/>
-              <a:t>1/29/14</a:t>
+              <a:t>1/30/14</a:t>
             </a:fld>
             <a:endParaRPr lang="en-US"/>
           </a:p>
@@ -26707,7 +26829,7 @@
           <a:p>
             <a:fld id="{111EEF3B-ABF2-AA4E-9E24-0C6256942674}" type="datetime1">
               <a:rPr lang="en-US" smtClean="0"/>
-              <a:t>1/29/14</a:t>
+              <a:t>1/30/14</a:t>
             </a:fld>
             <a:endParaRPr lang="en-US"/>
           </a:p>
@@ -26862,7 +26984,7 @@
           <a:p>
             <a:fld id="{7053BEFA-1175-F644-B249-7D41D72BD3FF}" type="datetime1">
               <a:rPr lang="en-US" smtClean="0"/>
-              <a:t>1/29/14</a:t>
+              <a:t>1/30/14</a:t>
             </a:fld>
             <a:endParaRPr lang="en-US"/>
           </a:p>
@@ -26920,6 +27042,13 @@
   <p:clrMapOvr>
     <a:masterClrMapping/>
   </p:clrMapOvr>
+  <p:timing>
+    <p:tnLst>
+      <p:par>
+        <p:cTn xmlns:p14="http://schemas.microsoft.com/office/powerpoint/2010/main" id="1" dur="indefinite" restart="never" nodeType="tmRoot"/>
+      </p:par>
+    </p:tnLst>
+  </p:timing>
 </p:sld>
 </file>
 
@@ -26999,7 +27128,7 @@
           <a:p>
             <a:fld id="{7053BEFA-1175-F644-B249-7D41D72BD3FF}" type="datetime1">
               <a:rPr lang="en-US" smtClean="0"/>
-              <a:t>1/29/14</a:t>
+              <a:t>1/30/14</a:t>
             </a:fld>
             <a:endParaRPr lang="en-US"/>
           </a:p>
@@ -27143,7 +27272,7 @@
           <a:p>
             <a:fld id="{7053BEFA-1175-F644-B249-7D41D72BD3FF}" type="datetime1">
               <a:rPr lang="en-US" smtClean="0"/>
-              <a:t>1/29/14</a:t>
+              <a:t>1/30/14</a:t>
             </a:fld>
             <a:endParaRPr lang="en-US"/>
           </a:p>
@@ -27182,6 +27311,13 @@
   <p:clrMapOvr>
     <a:masterClrMapping/>
   </p:clrMapOvr>
+  <p:timing>
+    <p:tnLst>
+      <p:par>
+        <p:cTn xmlns:p14="http://schemas.microsoft.com/office/powerpoint/2010/main" id="1" dur="indefinite" restart="never" nodeType="tmRoot"/>
+      </p:par>
+    </p:tnLst>
+  </p:timing>
 </p:sld>
 </file>
 
@@ -27303,7 +27439,7 @@
           <a:p>
             <a:fld id="{7053BEFA-1175-F644-B249-7D41D72BD3FF}" type="datetime1">
               <a:rPr lang="en-US" smtClean="0"/>
-              <a:t>1/29/14</a:t>
+              <a:t>1/30/14</a:t>
             </a:fld>
             <a:endParaRPr lang="en-US"/>
           </a:p>

</xml_diff>

<commit_message>
Added a script for creating box plots and updated the lecture slides
</commit_message>
<xml_diff>
--- a/Lectures/6 Exploration.pptx
+++ b/Lectures/6 Exploration.pptx
@@ -5,10 +5,10 @@
     <p:sldMasterId id="2147483648" r:id="rId1"/>
   </p:sldMasterIdLst>
   <p:notesMasterIdLst>
-    <p:notesMasterId r:id="rId38"/>
+    <p:notesMasterId r:id="rId37"/>
   </p:notesMasterIdLst>
   <p:handoutMasterIdLst>
-    <p:handoutMasterId r:id="rId39"/>
+    <p:handoutMasterId r:id="rId38"/>
   </p:handoutMasterIdLst>
   <p:sldIdLst>
     <p:sldId id="258" r:id="rId2"/>
@@ -33,20 +33,19 @@
     <p:sldId id="309" r:id="rId21"/>
     <p:sldId id="308" r:id="rId22"/>
     <p:sldId id="310" r:id="rId23"/>
-    <p:sldId id="311" r:id="rId24"/>
-    <p:sldId id="313" r:id="rId25"/>
-    <p:sldId id="314" r:id="rId26"/>
-    <p:sldId id="315" r:id="rId27"/>
-    <p:sldId id="316" r:id="rId28"/>
-    <p:sldId id="317" r:id="rId29"/>
-    <p:sldId id="318" r:id="rId30"/>
-    <p:sldId id="319" r:id="rId31"/>
-    <p:sldId id="320" r:id="rId32"/>
-    <p:sldId id="321" r:id="rId33"/>
-    <p:sldId id="322" r:id="rId34"/>
-    <p:sldId id="323" r:id="rId35"/>
-    <p:sldId id="324" r:id="rId36"/>
-    <p:sldId id="294" r:id="rId37"/>
+    <p:sldId id="313" r:id="rId24"/>
+    <p:sldId id="314" r:id="rId25"/>
+    <p:sldId id="315" r:id="rId26"/>
+    <p:sldId id="316" r:id="rId27"/>
+    <p:sldId id="317" r:id="rId28"/>
+    <p:sldId id="318" r:id="rId29"/>
+    <p:sldId id="319" r:id="rId30"/>
+    <p:sldId id="320" r:id="rId31"/>
+    <p:sldId id="321" r:id="rId32"/>
+    <p:sldId id="322" r:id="rId33"/>
+    <p:sldId id="323" r:id="rId34"/>
+    <p:sldId id="324" r:id="rId35"/>
+    <p:sldId id="294" r:id="rId36"/>
   </p:sldIdLst>
   <p:sldSz cx="9144000" cy="6858000" type="screen4x3"/>
   <p:notesSz cx="6858000" cy="9144000"/>
@@ -5301,17 +5300,9 @@
           <a:p>
             <a:r>
               <a:rPr lang="en-US" dirty="0" smtClean="0"/>
-              <a:t>Same boxplots with lots of outliers (prior to </a:t>
-            </a:r>
-            <a:r>
-              <a:rPr lang="en-US" smtClean="0"/>
-              <a:t>cleaning</a:t>
-            </a:r>
-            <a:r>
-              <a:rPr lang="en-US" smtClean="0"/>
-              <a:t>)</a:t>
-            </a:r>
-            <a:endParaRPr lang="en-US" baseline="0" dirty="0" smtClean="0"/>
+              <a:t>Example </a:t>
+            </a:r>
+            <a:endParaRPr lang="en-US" dirty="0"/>
           </a:p>
         </p:txBody>
       </p:sp>
@@ -5332,7 +5323,7 @@
           <a:p>
             <a:fld id="{FD66F34B-9C4D-8640-BB34-4C24A79C9FFB}" type="slidenum">
               <a:rPr lang="en-US" smtClean="0"/>
-              <a:t>23</a:t>
+              <a:t>24</a:t>
             </a:fld>
             <a:endParaRPr lang="en-US"/>
           </a:p>
@@ -5341,7 +5332,7 @@
     </p:spTree>
     <p:extLst>
       <p:ext uri="{BB962C8B-B14F-4D97-AF65-F5344CB8AC3E}">
-        <p14:creationId xmlns:p14="http://schemas.microsoft.com/office/powerpoint/2010/main" val="654282882"/>
+        <p14:creationId xmlns:p14="http://schemas.microsoft.com/office/powerpoint/2010/main" val="3163214532"/>
       </p:ext>
     </p:extLst>
   </p:cSld>
@@ -5485,9 +5476,54 @@
           <a:p>
             <a:r>
               <a:rPr lang="en-US" dirty="0" smtClean="0"/>
-              <a:t>Example </a:t>
-            </a:r>
-            <a:endParaRPr lang="en-US" dirty="0"/>
+              <a:t>http://</a:t>
+            </a:r>
+            <a:r>
+              <a:rPr lang="en-US" dirty="0" err="1" smtClean="0"/>
+              <a:t>www.physics.csbsju.edu</a:t>
+            </a:r>
+            <a:r>
+              <a:rPr lang="en-US" dirty="0" smtClean="0"/>
+              <a:t>/stats/KS-</a:t>
+            </a:r>
+            <a:r>
+              <a:rPr lang="en-US" dirty="0" err="1" smtClean="0"/>
+              <a:t>test.html</a:t>
+            </a:r>
+            <a:endParaRPr lang="en-US" dirty="0" smtClean="0"/>
+          </a:p>
+          <a:p>
+            <a:endParaRPr lang="en-US" dirty="0" smtClean="0"/>
+          </a:p>
+          <a:p>
+            <a:r>
+              <a:rPr lang="en-US" dirty="0" smtClean="0"/>
+              <a:t>One of the advantages of the KS-test is that it leads to a graphical presentation of the data, which enables the user to detect normal distributions (see below). The KS-test is a robust test that cares only about the relative distribution of the data. In the above case, use of the log scales just moved the important region so the user could see the distribution of the data. There are a couple of reasons for preferring percentile plots to cumulative fractions plots. It turns out that the percentile plot is a better estimate of the distribution function (if you know what that is). And plotting percentiles allows you to use "probability graph paper"...plots with specially scaled axis divisions. Probability scales on the y-axis allows you to see how "normal" the data is. Normally distributed data will plot as a straight line on probability paper. Lognormal data will plot as a straight line with probability-log scaled axes. (</a:t>
+            </a:r>
+            <a:r>
+              <a:rPr lang="en-US" dirty="0" err="1" smtClean="0"/>
+              <a:t>Incidently</a:t>
+            </a:r>
+            <a:r>
+              <a:rPr lang="en-US" dirty="0" smtClean="0"/>
+              <a:t> uniformly distributed data will plot as a straight line using the usual linear y-scale.) Note that the KS-test reports that both </a:t>
+            </a:r>
+            <a:r>
+              <a:rPr lang="en-US" dirty="0" err="1" smtClean="0"/>
+              <a:t>treatmentB</a:t>
+            </a:r>
+            <a:r>
+              <a:rPr lang="en-US" dirty="0" smtClean="0"/>
+              <a:t> and </a:t>
+            </a:r>
+            <a:r>
+              <a:rPr lang="en-US" dirty="0" err="1" smtClean="0"/>
+              <a:t>controlB</a:t>
+            </a:r>
+            <a:r>
+              <a:rPr lang="en-US" dirty="0" smtClean="0"/>
+              <a:t> data are approximately lognormal. Thus you could take the log of all the data, and use the resulting data in a t-test. Since the t-test is a quite sensitive test when applied to appropriate data this would be the best strategy</a:t>
+            </a:r>
           </a:p>
         </p:txBody>
       </p:sp>
@@ -5508,7 +5544,7 @@
           <a:p>
             <a:fld id="{FD66F34B-9C4D-8640-BB34-4C24A79C9FFB}" type="slidenum">
               <a:rPr lang="en-US" smtClean="0"/>
-              <a:t>26</a:t>
+              <a:t>28</a:t>
             </a:fld>
             <a:endParaRPr lang="en-US"/>
           </a:p>
@@ -5517,7 +5553,7 @@
     </p:spTree>
     <p:extLst>
       <p:ext uri="{BB962C8B-B14F-4D97-AF65-F5344CB8AC3E}">
-        <p14:creationId xmlns:p14="http://schemas.microsoft.com/office/powerpoint/2010/main" val="3163214532"/>
+        <p14:creationId xmlns:p14="http://schemas.microsoft.com/office/powerpoint/2010/main" val="4269850727"/>
       </p:ext>
     </p:extLst>
   </p:cSld>
@@ -5571,56 +5607,60 @@
           <a:bodyPr/>
           <a:lstStyle/>
           <a:p>
+            <a:pPr lvl="1"/>
             <a:r>
               <a:rPr lang="en-US" dirty="0" smtClean="0"/>
-              <a:t>http://</a:t>
-            </a:r>
-            <a:r>
-              <a:rPr lang="en-US" dirty="0" err="1" smtClean="0"/>
-              <a:t>www.physics.csbsju.edu</a:t>
-            </a:r>
+              <a:t>Discrete values (“Probability Mass Function”) - typically values and weights</a:t>
+            </a:r>
+          </a:p>
+          <a:p>
+            <a:pPr lvl="1"/>
             <a:r>
               <a:rPr lang="en-US" dirty="0" smtClean="0"/>
-              <a:t>/stats/KS-</a:t>
-            </a:r>
-            <a:r>
-              <a:rPr lang="en-US" dirty="0" err="1" smtClean="0"/>
-              <a:t>test.html</a:t>
+              <a:t>Continues values (“Probability Density Function”) – typically a function</a:t>
+            </a:r>
+          </a:p>
+          <a:p>
+            <a:pPr marL="457200" marR="0" lvl="1" indent="0" algn="l" defTabSz="457200" rtl="0" eaLnBrk="1" fontAlgn="auto" latinLnBrk="0" hangingPunct="1">
+              <a:lnSpc>
+                <a:spcPct val="100000"/>
+              </a:lnSpc>
+              <a:spcBef>
+                <a:spcPts val="0"/>
+              </a:spcBef>
+              <a:spcAft>
+                <a:spcPts val="0"/>
+              </a:spcAft>
+              <a:buClrTx/>
+              <a:buSzTx/>
+              <a:buFontTx/>
+              <a:buNone/>
+              <a:tabLst/>
+              <a:defRPr/>
+            </a:pPr>
+            <a:r>
+              <a:rPr lang="en-US" dirty="0" smtClean="0"/>
+              <a:t>Affects how we model the variable </a:t>
+            </a:r>
+          </a:p>
+          <a:p>
+            <a:pPr lvl="1"/>
+            <a:r>
+              <a:rPr lang="en-US" dirty="0" smtClean="0"/>
+              <a:t>Insurance</a:t>
+            </a:r>
+            <a:r>
+              <a:rPr lang="en-US" baseline="0" dirty="0" smtClean="0"/>
+              <a:t> claims: Not independent when an epidemic hits the local population (common location affects health)</a:t>
+            </a:r>
+          </a:p>
+          <a:p>
+            <a:pPr lvl="1"/>
+            <a:r>
+              <a:rPr lang="en-US" baseline="0" dirty="0" smtClean="0"/>
+              <a:t>Identical distributions not the same in terms of chance of being sick when one person has higher likelihood of inheriting a disease or is in a socioeconomic class more at risk for disease</a:t>
             </a:r>
             <a:endParaRPr lang="en-US" dirty="0" smtClean="0"/>
-          </a:p>
-          <a:p>
-            <a:endParaRPr lang="en-US" dirty="0" smtClean="0"/>
-          </a:p>
-          <a:p>
-            <a:r>
-              <a:rPr lang="en-US" dirty="0" smtClean="0"/>
-              <a:t>One of the advantages of the KS-test is that it leads to a graphical presentation of the data, which enables the user to detect normal distributions (see below). The KS-test is a robust test that cares only about the relative distribution of the data. In the above case, use of the log scales just moved the important region so the user could see the distribution of the data. There are a couple of reasons for preferring percentile plots to cumulative fractions plots. It turns out that the percentile plot is a better estimate of the distribution function (if you know what that is). And plotting percentiles allows you to use "probability graph paper"...plots with specially scaled axis divisions. Probability scales on the y-axis allows you to see how "normal" the data is. Normally distributed data will plot as a straight line on probability paper. Lognormal data will plot as a straight line with probability-log scaled axes. (</a:t>
-            </a:r>
-            <a:r>
-              <a:rPr lang="en-US" dirty="0" err="1" smtClean="0"/>
-              <a:t>Incidently</a:t>
-            </a:r>
-            <a:r>
-              <a:rPr lang="en-US" dirty="0" smtClean="0"/>
-              <a:t> uniformly distributed data will plot as a straight line using the usual linear y-scale.) Note that the KS-test reports that both </a:t>
-            </a:r>
-            <a:r>
-              <a:rPr lang="en-US" dirty="0" err="1" smtClean="0"/>
-              <a:t>treatmentB</a:t>
-            </a:r>
-            <a:r>
-              <a:rPr lang="en-US" dirty="0" smtClean="0"/>
-              <a:t> and </a:t>
-            </a:r>
-            <a:r>
-              <a:rPr lang="en-US" dirty="0" err="1" smtClean="0"/>
-              <a:t>controlB</a:t>
-            </a:r>
-            <a:r>
-              <a:rPr lang="en-US" dirty="0" smtClean="0"/>
-              <a:t> data are approximately lognormal. Thus you could take the log of all the data, and use the resulting data in a t-test. Since the t-test is a quite sensitive test when applied to appropriate data this would be the best strategy</a:t>
-            </a:r>
           </a:p>
         </p:txBody>
       </p:sp>
@@ -5650,7 +5690,7 @@
     </p:spTree>
     <p:extLst>
       <p:ext uri="{BB962C8B-B14F-4D97-AF65-F5344CB8AC3E}">
-        <p14:creationId xmlns:p14="http://schemas.microsoft.com/office/powerpoint/2010/main" val="4269850727"/>
+        <p14:creationId xmlns:p14="http://schemas.microsoft.com/office/powerpoint/2010/main" val="3238829522"/>
       </p:ext>
     </p:extLst>
   </p:cSld>
@@ -5704,60 +5744,11 @@
           <a:bodyPr/>
           <a:lstStyle/>
           <a:p>
-            <a:pPr lvl="1"/>
             <a:r>
               <a:rPr lang="en-US" dirty="0" smtClean="0"/>
-              <a:t>Discrete values (“Probability Mass Function”) - typically values and weights</a:t>
-            </a:r>
-          </a:p>
-          <a:p>
-            <a:pPr lvl="1"/>
-            <a:r>
-              <a:rPr lang="en-US" dirty="0" smtClean="0"/>
-              <a:t>Continues values (“Probability Density Function”) – typically a function</a:t>
-            </a:r>
-          </a:p>
-          <a:p>
-            <a:pPr marL="457200" marR="0" lvl="1" indent="0" algn="l" defTabSz="457200" rtl="0" eaLnBrk="1" fontAlgn="auto" latinLnBrk="0" hangingPunct="1">
-              <a:lnSpc>
-                <a:spcPct val="100000"/>
-              </a:lnSpc>
-              <a:spcBef>
-                <a:spcPts val="0"/>
-              </a:spcBef>
-              <a:spcAft>
-                <a:spcPts val="0"/>
-              </a:spcAft>
-              <a:buClrTx/>
-              <a:buSzTx/>
-              <a:buFontTx/>
-              <a:buNone/>
-              <a:tabLst/>
-              <a:defRPr/>
-            </a:pPr>
-            <a:r>
-              <a:rPr lang="en-US" dirty="0" smtClean="0"/>
-              <a:t>Affects how we model the variable </a:t>
-            </a:r>
-          </a:p>
-          <a:p>
-            <a:pPr lvl="1"/>
-            <a:r>
-              <a:rPr lang="en-US" dirty="0" smtClean="0"/>
-              <a:t>Insurance</a:t>
-            </a:r>
-            <a:r>
-              <a:rPr lang="en-US" baseline="0" dirty="0" smtClean="0"/>
-              <a:t> claims: Not independent when an epidemic hits the local population (common location affects health)</a:t>
-            </a:r>
-          </a:p>
-          <a:p>
-            <a:pPr lvl="1"/>
-            <a:r>
-              <a:rPr lang="en-US" baseline="0" dirty="0" smtClean="0"/>
-              <a:t>Identical distributions not the same in terms of chance of being sick when one person has higher likelihood of inheriting a disease or is in a socioeconomic class more at risk for disease</a:t>
-            </a:r>
-            <a:endParaRPr lang="en-US" dirty="0" smtClean="0"/>
+              <a:t>Example </a:t>
+            </a:r>
+            <a:endParaRPr lang="en-US" dirty="0"/>
           </a:p>
         </p:txBody>
       </p:sp>
@@ -5787,7 +5778,7 @@
     </p:spTree>
     <p:extLst>
       <p:ext uri="{BB962C8B-B14F-4D97-AF65-F5344CB8AC3E}">
-        <p14:creationId xmlns:p14="http://schemas.microsoft.com/office/powerpoint/2010/main" val="3238829522"/>
+        <p14:creationId xmlns:p14="http://schemas.microsoft.com/office/powerpoint/2010/main" val="3163214532"/>
       </p:ext>
     </p:extLst>
   </p:cSld>
@@ -5841,10 +5832,125 @@
           <a:bodyPr/>
           <a:lstStyle/>
           <a:p>
+            <a:pPr marL="0" marR="0" indent="0" algn="l" defTabSz="457200" rtl="0" eaLnBrk="1" fontAlgn="auto" latinLnBrk="0" hangingPunct="1">
+              <a:lnSpc>
+                <a:spcPct val="100000"/>
+              </a:lnSpc>
+              <a:spcBef>
+                <a:spcPts val="0"/>
+              </a:spcBef>
+              <a:spcAft>
+                <a:spcPts val="0"/>
+              </a:spcAft>
+              <a:buClrTx/>
+              <a:buSzTx/>
+              <a:buFontTx/>
+              <a:buNone/>
+              <a:tabLst/>
+              <a:defRPr/>
+            </a:pPr>
             <a:r>
               <a:rPr lang="en-US" dirty="0" smtClean="0"/>
-              <a:t>Example </a:t>
-            </a:r>
+              <a:t>A variable might be modeled as log-normal if it can be thought of as the multiplicative product of many independent random variables each of which is positive. (This is justified by considering the central limit theorem in the log-domain.) For example, in finance, the variable could represent the compound return from a sequence of many trades (each expressed as its return + 1); or a long-term discount factor can be derived from the product of short-term discount factors. In wireless communication, the </a:t>
+            </a:r>
+            <a:r>
+              <a:rPr lang="en-US" dirty="0" err="1" smtClean="0"/>
+              <a:t>sas</a:t>
+            </a:r>
+            <a:r>
+              <a:rPr lang="en-US" dirty="0" smtClean="0"/>
+              <a:t> caused by shadowing or slow fading from random objects is often assumed to be log-normally distributed: see log-distance path loss model.</a:t>
+            </a:r>
+          </a:p>
+          <a:p>
+            <a:pPr marL="0" marR="0" indent="0" algn="l" defTabSz="457200" rtl="0" eaLnBrk="1" fontAlgn="auto" latinLnBrk="0" hangingPunct="1">
+              <a:lnSpc>
+                <a:spcPct val="100000"/>
+              </a:lnSpc>
+              <a:spcBef>
+                <a:spcPts val="0"/>
+              </a:spcBef>
+              <a:spcAft>
+                <a:spcPts val="0"/>
+              </a:spcAft>
+              <a:buClrTx/>
+              <a:buSzTx/>
+              <a:buFontTx/>
+              <a:buNone/>
+              <a:tabLst/>
+              <a:defRPr/>
+            </a:pPr>
+            <a:endParaRPr lang="en-US" dirty="0" smtClean="0"/>
+          </a:p>
+          <a:p>
+            <a:pPr marL="0" marR="0" indent="0" algn="l" defTabSz="457200" rtl="0" eaLnBrk="1" fontAlgn="auto" latinLnBrk="0" hangingPunct="1">
+              <a:lnSpc>
+                <a:spcPct val="100000"/>
+              </a:lnSpc>
+              <a:spcBef>
+                <a:spcPts val="0"/>
+              </a:spcBef>
+              <a:spcAft>
+                <a:spcPts val="0"/>
+              </a:spcAft>
+              <a:buClrTx/>
+              <a:buSzTx/>
+              <a:buFontTx/>
+              <a:buNone/>
+              <a:tabLst/>
+              <a:defRPr/>
+            </a:pPr>
+            <a:endParaRPr lang="en-US" dirty="0" smtClean="0"/>
+          </a:p>
+          <a:p>
+            <a:pPr marL="0" marR="0" indent="0" algn="l" defTabSz="457200" rtl="0" eaLnBrk="1" fontAlgn="auto" latinLnBrk="0" hangingPunct="1">
+              <a:lnSpc>
+                <a:spcPct val="100000"/>
+              </a:lnSpc>
+              <a:spcBef>
+                <a:spcPts val="0"/>
+              </a:spcBef>
+              <a:spcAft>
+                <a:spcPts val="0"/>
+              </a:spcAft>
+              <a:buClrTx/>
+              <a:buSzTx/>
+              <a:buFontTx/>
+              <a:buNone/>
+              <a:tabLst/>
+              <a:defRPr/>
+            </a:pPr>
+            <a:r>
+              <a:rPr lang="en-US" dirty="0" smtClean="0"/>
+              <a:t>What part of </a:t>
+            </a:r>
+            <a:r>
+              <a:rPr lang="en-US" dirty="0" err="1" smtClean="0"/>
+              <a:t>amy’s</a:t>
+            </a:r>
+            <a:r>
+              <a:rPr lang="en-US" dirty="0" smtClean="0"/>
+              <a:t> data might match a log distribution?</a:t>
+            </a:r>
+          </a:p>
+          <a:p>
+            <a:pPr marL="0" marR="0" indent="0" algn="l" defTabSz="457200" rtl="0" eaLnBrk="1" fontAlgn="auto" latinLnBrk="0" hangingPunct="1">
+              <a:lnSpc>
+                <a:spcPct val="100000"/>
+              </a:lnSpc>
+              <a:spcBef>
+                <a:spcPts val="0"/>
+              </a:spcBef>
+              <a:spcAft>
+                <a:spcPts val="0"/>
+              </a:spcAft>
+              <a:buClrTx/>
+              <a:buSzTx/>
+              <a:buFontTx/>
+              <a:buNone/>
+              <a:tabLst/>
+              <a:defRPr/>
+            </a:pPr>
             <a:endParaRPr lang="en-US" dirty="0"/>
           </a:p>
         </p:txBody>
@@ -5929,125 +6035,23 @@
           <a:bodyPr/>
           <a:lstStyle/>
           <a:p>
-            <a:pPr marL="0" marR="0" indent="0" algn="l" defTabSz="457200" rtl="0" eaLnBrk="1" fontAlgn="auto" latinLnBrk="0" hangingPunct="1">
-              <a:lnSpc>
-                <a:spcPct val="100000"/>
-              </a:lnSpc>
-              <a:spcBef>
-                <a:spcPts val="0"/>
-              </a:spcBef>
-              <a:spcAft>
-                <a:spcPts val="0"/>
-              </a:spcAft>
-              <a:buClrTx/>
-              <a:buSzTx/>
-              <a:buFontTx/>
-              <a:buNone/>
-              <a:tabLst/>
-              <a:defRPr/>
-            </a:pPr>
             <a:r>
               <a:rPr lang="en-US" dirty="0" smtClean="0"/>
-              <a:t>A variable might be modeled as log-normal if it can be thought of as the multiplicative product of many independent random variables each of which is positive. (This is justified by considering the central limit theorem in the log-domain.) For example, in finance, the variable could represent the compound return from a sequence of many trades (each expressed as its return + 1); or a long-term discount factor can be derived from the product of short-term discount factors. In wireless communication, the </a:t>
+              <a:t>For instance, suppose someone typically gets 4 pieces of mail per day on average. There will be, however, a certain spread: sometimes a little more, sometimes a little fewer, once in a while nothing at all.[2] Given only the average rate, for a certain period of observation (pieces of mail per day, </a:t>
             </a:r>
             <a:r>
               <a:rPr lang="en-US" dirty="0" err="1" smtClean="0"/>
-              <a:t>sas</a:t>
+              <a:t>phonecalls</a:t>
             </a:r>
             <a:r>
               <a:rPr lang="en-US" dirty="0" smtClean="0"/>
-              <a:t> caused by shadowing or slow fading from random objects is often assumed to be log-normally distributed: see log-distance path loss model.</a:t>
-            </a:r>
-          </a:p>
-          <a:p>
-            <a:pPr marL="0" marR="0" indent="0" algn="l" defTabSz="457200" rtl="0" eaLnBrk="1" fontAlgn="auto" latinLnBrk="0" hangingPunct="1">
-              <a:lnSpc>
-                <a:spcPct val="100000"/>
-              </a:lnSpc>
-              <a:spcBef>
-                <a:spcPts val="0"/>
-              </a:spcBef>
-              <a:spcAft>
-                <a:spcPts val="0"/>
-              </a:spcAft>
-              <a:buClrTx/>
-              <a:buSzTx/>
-              <a:buFontTx/>
-              <a:buNone/>
-              <a:tabLst/>
-              <a:defRPr/>
-            </a:pPr>
+              <a:t> per hour, etc.), and assuming that the process, or mix of processes, that produces the event flow is essentially random, the Poisson distribution specifies how likely it is that the count will be 3, or 5, or 10, or any other number, during one period of observation. That is, it predicts the degree of spread around a known average rate of occurrence.[2]</a:t>
+            </a:r>
+          </a:p>
+          <a:p>
             <a:endParaRPr lang="en-US" dirty="0" smtClean="0"/>
           </a:p>
           <a:p>
-            <a:pPr marL="0" marR="0" indent="0" algn="l" defTabSz="457200" rtl="0" eaLnBrk="1" fontAlgn="auto" latinLnBrk="0" hangingPunct="1">
-              <a:lnSpc>
-                <a:spcPct val="100000"/>
-              </a:lnSpc>
-              <a:spcBef>
-                <a:spcPts val="0"/>
-              </a:spcBef>
-              <a:spcAft>
-                <a:spcPts val="0"/>
-              </a:spcAft>
-              <a:buClrTx/>
-              <a:buSzTx/>
-              <a:buFontTx/>
-              <a:buNone/>
-              <a:tabLst/>
-              <a:defRPr/>
-            </a:pPr>
-            <a:endParaRPr lang="en-US" dirty="0" smtClean="0"/>
-          </a:p>
-          <a:p>
-            <a:pPr marL="0" marR="0" indent="0" algn="l" defTabSz="457200" rtl="0" eaLnBrk="1" fontAlgn="auto" latinLnBrk="0" hangingPunct="1">
-              <a:lnSpc>
-                <a:spcPct val="100000"/>
-              </a:lnSpc>
-              <a:spcBef>
-                <a:spcPts val="0"/>
-              </a:spcBef>
-              <a:spcAft>
-                <a:spcPts val="0"/>
-              </a:spcAft>
-              <a:buClrTx/>
-              <a:buSzTx/>
-              <a:buFontTx/>
-              <a:buNone/>
-              <a:tabLst/>
-              <a:defRPr/>
-            </a:pPr>
-            <a:r>
-              <a:rPr lang="en-US" dirty="0" smtClean="0"/>
-              <a:t>What part of </a:t>
-            </a:r>
-            <a:r>
-              <a:rPr lang="en-US" dirty="0" err="1" smtClean="0"/>
-              <a:t>amy’s</a:t>
-            </a:r>
-            <a:r>
-              <a:rPr lang="en-US" dirty="0" smtClean="0"/>
-              <a:t> data might match a log distribution?</a:t>
-            </a:r>
-          </a:p>
-          <a:p>
-            <a:pPr marL="0" marR="0" indent="0" algn="l" defTabSz="457200" rtl="0" eaLnBrk="1" fontAlgn="auto" latinLnBrk="0" hangingPunct="1">
-              <a:lnSpc>
-                <a:spcPct val="100000"/>
-              </a:lnSpc>
-              <a:spcBef>
-                <a:spcPts val="0"/>
-              </a:spcBef>
-              <a:spcAft>
-                <a:spcPts val="0"/>
-              </a:spcAft>
-              <a:buClrTx/>
-              <a:buSzTx/>
-              <a:buFontTx/>
-              <a:buNone/>
-              <a:tabLst/>
-              <a:defRPr/>
-            </a:pPr>
             <a:endParaRPr lang="en-US" dirty="0"/>
           </a:p>
         </p:txBody>
@@ -6134,19 +6138,42 @@
           <a:p>
             <a:r>
               <a:rPr lang="en-US" dirty="0" smtClean="0"/>
-              <a:t>For instance, suppose someone typically gets 4 pieces of mail per day on average. There will be, however, a certain spread: sometimes a little more, sometimes a little fewer, once in a while nothing at all.[2] Given only the average rate, for a certain period of observation (pieces of mail per day, </a:t>
+              <a:t>Fig. 17. Velocity proﬁles over time using the mouse for (</a:t>
             </a:r>
             <a:r>
               <a:rPr lang="en-US" dirty="0" err="1" smtClean="0"/>
-              <a:t>phonecalls</a:t>
+              <a:t>a,b</a:t>
             </a:r>
             <a:r>
               <a:rPr lang="en-US" dirty="0" smtClean="0"/>
-              <a:t> per hour, etc.), and assuming that the process, or mix of processes, that produces the event flow is essentially random, the Poisson distribution specifies how likely it is that the count will be 3, or 5, or 10, or any other number, during one period of observation. That is, it predicts the degree of spread around a known average rate of occurrence.[2]</a:t>
+              <a:t>) able-bodied participants and (</a:t>
+            </a:r>
+            <a:r>
+              <a:rPr lang="en-US" dirty="0" err="1" smtClean="0"/>
+              <a:t>c,d</a:t>
+            </a:r>
+            <a:r>
+              <a:rPr lang="en-US" dirty="0" smtClean="0"/>
+              <a:t>)</a:t>
             </a:r>
           </a:p>
           <a:p>
             <a:endParaRPr lang="en-US" dirty="0" smtClean="0"/>
+          </a:p>
+          <a:p>
+            <a:r>
+              <a:rPr lang="en-US" dirty="0" smtClean="0"/>
+              <a:t>motor-impaired participants. The dot represents the click or crossing event. The graphs on the</a:t>
+            </a:r>
+          </a:p>
+          <a:p>
+            <a:endParaRPr lang="en-US" dirty="0" smtClean="0"/>
+          </a:p>
+          <a:p>
+            <a:r>
+              <a:rPr lang="en-US" dirty="0" smtClean="0"/>
+              <a:t>left are for area pointing. The graphs on the right are for goal crossing.</a:t>
+            </a:r>
           </a:p>
           <a:p>
             <a:endParaRPr lang="en-US" dirty="0"/>
@@ -6171,130 +6198,6 @@
             <a:fld id="{FD66F34B-9C4D-8640-BB34-4C24A79C9FFB}" type="slidenum">
               <a:rPr lang="en-US" smtClean="0"/>
               <a:t>33</a:t>
-            </a:fld>
-            <a:endParaRPr lang="en-US"/>
-          </a:p>
-        </p:txBody>
-      </p:sp>
-    </p:spTree>
-    <p:extLst>
-      <p:ext uri="{BB962C8B-B14F-4D97-AF65-F5344CB8AC3E}">
-        <p14:creationId xmlns:p14="http://schemas.microsoft.com/office/powerpoint/2010/main" val="3163214532"/>
-      </p:ext>
-    </p:extLst>
-  </p:cSld>
-  <p:clrMapOvr>
-    <a:masterClrMapping/>
-  </p:clrMapOvr>
-</p:notes>
-</file>
-
-<file path=ppt/notesSlides/notesSlide18.xml><?xml version="1.0" encoding="utf-8"?>
-<p:notes xmlns:a="http://schemas.openxmlformats.org/drawingml/2006/main" xmlns:r="http://schemas.openxmlformats.org/officeDocument/2006/relationships" xmlns:p="http://schemas.openxmlformats.org/presentationml/2006/main">
-  <p:cSld>
-    <p:spTree>
-      <p:nvGrpSpPr>
-        <p:cNvPr id="1" name=""/>
-        <p:cNvGrpSpPr/>
-        <p:nvPr/>
-      </p:nvGrpSpPr>
-      <p:grpSpPr>
-        <a:xfrm>
-          <a:off x="0" y="0"/>
-          <a:ext cx="0" cy="0"/>
-          <a:chOff x="0" y="0"/>
-          <a:chExt cx="0" cy="0"/>
-        </a:xfrm>
-      </p:grpSpPr>
-      <p:sp>
-        <p:nvSpPr>
-          <p:cNvPr id="2" name="Slide Image Placeholder 1"/>
-          <p:cNvSpPr>
-            <a:spLocks noGrp="1" noRot="1" noChangeAspect="1"/>
-          </p:cNvSpPr>
-          <p:nvPr>
-            <p:ph type="sldImg"/>
-          </p:nvPr>
-        </p:nvSpPr>
-        <p:spPr/>
-      </p:sp>
-      <p:sp>
-        <p:nvSpPr>
-          <p:cNvPr id="3" name="Notes Placeholder 2"/>
-          <p:cNvSpPr>
-            <a:spLocks noGrp="1"/>
-          </p:cNvSpPr>
-          <p:nvPr>
-            <p:ph type="body" idx="1"/>
-          </p:nvPr>
-        </p:nvSpPr>
-        <p:spPr/>
-        <p:txBody>
-          <a:bodyPr/>
-          <a:lstStyle/>
-          <a:p>
-            <a:r>
-              <a:rPr lang="en-US" dirty="0" smtClean="0"/>
-              <a:t>Fig. 17. Velocity proﬁles over time using the mouse for (</a:t>
-            </a:r>
-            <a:r>
-              <a:rPr lang="en-US" dirty="0" err="1" smtClean="0"/>
-              <a:t>a,b</a:t>
-            </a:r>
-            <a:r>
-              <a:rPr lang="en-US" dirty="0" smtClean="0"/>
-              <a:t>) able-bodied participants and (</a:t>
-            </a:r>
-            <a:r>
-              <a:rPr lang="en-US" dirty="0" err="1" smtClean="0"/>
-              <a:t>c,d</a:t>
-            </a:r>
-            <a:r>
-              <a:rPr lang="en-US" dirty="0" smtClean="0"/>
-              <a:t>)</a:t>
-            </a:r>
-          </a:p>
-          <a:p>
-            <a:endParaRPr lang="en-US" dirty="0" smtClean="0"/>
-          </a:p>
-          <a:p>
-            <a:r>
-              <a:rPr lang="en-US" dirty="0" smtClean="0"/>
-              <a:t>motor-impaired participants. The dot represents the click or crossing event. The graphs on the</a:t>
-            </a:r>
-          </a:p>
-          <a:p>
-            <a:endParaRPr lang="en-US" dirty="0" smtClean="0"/>
-          </a:p>
-          <a:p>
-            <a:r>
-              <a:rPr lang="en-US" dirty="0" smtClean="0"/>
-              <a:t>left are for area pointing. The graphs on the right are for goal crossing.</a:t>
-            </a:r>
-          </a:p>
-          <a:p>
-            <a:endParaRPr lang="en-US" dirty="0"/>
-          </a:p>
-        </p:txBody>
-      </p:sp>
-      <p:sp>
-        <p:nvSpPr>
-          <p:cNvPr id="4" name="Slide Number Placeholder 3"/>
-          <p:cNvSpPr>
-            <a:spLocks noGrp="1"/>
-          </p:cNvSpPr>
-          <p:nvPr>
-            <p:ph type="sldNum" sz="quarter" idx="10"/>
-          </p:nvPr>
-        </p:nvSpPr>
-        <p:spPr/>
-        <p:txBody>
-          <a:bodyPr/>
-          <a:lstStyle/>
-          <a:p>
-            <a:fld id="{FD66F34B-9C4D-8640-BB34-4C24A79C9FFB}" type="slidenum">
-              <a:rPr lang="en-US" smtClean="0"/>
-              <a:t>34</a:t>
             </a:fld>
             <a:endParaRPr lang="en-US"/>
           </a:p>
@@ -7039,17 +6942,31 @@
           <a:p>
             <a:r>
               <a:rPr lang="en-US" baseline="0" dirty="0" smtClean="0"/>
-              <a:t>Boxplots </a:t>
-            </a:r>
+              <a:t>Boxplots make comparison really easy … </a:t>
+            </a:r>
+          </a:p>
+          <a:p>
             <a:r>
               <a:rPr lang="en-US" baseline="0" dirty="0" smtClean="0"/>
-              <a:t>make comparison really easy … </a:t>
-            </a:r>
-          </a:p>
-          <a:p>
+              <a:t>Can also show certain types of unexpected structure (e.g. variance variance</a:t>
+            </a:r>
             <a:r>
               <a:rPr lang="en-US" baseline="0" dirty="0" smtClean="0"/>
-              <a:t>Can also show certain types of unexpected structure (e.g. variance variance)</a:t>
+              <a:t>)</a:t>
+            </a:r>
+          </a:p>
+          <a:p>
+            <a:r>
+              <a:rPr lang="en-US" baseline="0" dirty="0" smtClean="0"/>
+              <a:t>Created with ‘boxplot-</a:t>
+            </a:r>
+            <a:r>
+              <a:rPr lang="en-US" baseline="0" dirty="0" err="1" smtClean="0"/>
+              <a:t>demo.py</a:t>
+            </a:r>
+            <a:r>
+              <a:rPr lang="en-US" baseline="0" dirty="0" smtClean="0"/>
+              <a:t>’</a:t>
             </a:r>
             <a:endParaRPr lang="en-US" dirty="0"/>
           </a:p>
@@ -22379,7 +22296,11 @@
           <a:p>
             <a:r>
               <a:rPr lang="en-US" dirty="0" smtClean="0"/>
-              <a:t>Boxplot [Data Source Unspecified]</a:t>
+              <a:t>Boxplot </a:t>
+            </a:r>
+            <a:r>
+              <a:rPr lang="en-US" dirty="0" smtClean="0"/>
+              <a:t>[Random Data; 3 times]</a:t>
             </a:r>
             <a:endParaRPr lang="en-US" dirty="0"/>
           </a:p>
@@ -22452,7 +22373,7 @@
       </p:sp>
       <p:pic>
         <p:nvPicPr>
-          <p:cNvPr id="11" name="Content Placeholder 10" descr="Screen Shot 2014-01-26 at 9.58.43 PM.png"/>
+          <p:cNvPr id="8" name="Content Placeholder 7" descr="Screen Shot 2014-01-30 at 10.56.45 AM.png"/>
           <p:cNvPicPr>
             <a:picLocks noGrp="1" noChangeAspect="1"/>
           </p:cNvPicPr>
@@ -22460,7 +22381,7 @@
             <p:ph idx="1"/>
           </p:nvPr>
         </p:nvPicPr>
-        <p:blipFill>
+        <p:blipFill rotWithShape="1">
           <a:blip r:embed="rId3">
             <a:extLst>
               <a:ext uri="{28A0092B-C50C-407E-A947-70E740481C1C}">
@@ -22468,12 +22389,15 @@
               </a:ext>
             </a:extLst>
           </a:blip>
-          <a:srcRect t="7905" b="7905"/>
-          <a:stretch>
-            <a:fillRect/>
-          </a:stretch>
+          <a:srcRect l="4761" r="43772" b="24225"/>
+          <a:stretch/>
         </p:blipFill>
-        <p:spPr/>
+        <p:spPr>
+          <a:xfrm>
+            <a:off x="1128943" y="1534736"/>
+            <a:ext cx="6105630" cy="5053862"/>
+          </a:xfrm>
+        </p:spPr>
       </p:pic>
     </p:spTree>
     <p:extLst>
@@ -22529,12 +22453,39 @@
           <a:p>
             <a:r>
               <a:rPr lang="en-US" dirty="0" smtClean="0"/>
-              <a:t>Boxplot [Data </a:t>
-            </a:r>
-            <a:r>
-              <a:rPr lang="en-US" smtClean="0"/>
-              <a:t>Source Unspecified]</a:t>
-            </a:r>
+              <a:t>Boxplots good/bad</a:t>
+            </a:r>
+            <a:endParaRPr lang="en-US" dirty="0"/>
+          </a:p>
+        </p:txBody>
+      </p:sp>
+      <p:sp>
+        <p:nvSpPr>
+          <p:cNvPr id="3" name="Content Placeholder 2"/>
+          <p:cNvSpPr>
+            <a:spLocks noGrp="1"/>
+          </p:cNvSpPr>
+          <p:nvPr>
+            <p:ph idx="1"/>
+          </p:nvPr>
+        </p:nvSpPr>
+        <p:spPr/>
+        <p:txBody>
+          <a:bodyPr/>
+          <a:lstStyle/>
+          <a:p>
+            <a:r>
+              <a:rPr lang="en-US" dirty="0"/>
+              <a:t>Boxplots make comparison really easy … </a:t>
+            </a:r>
+          </a:p>
+          <a:p>
+            <a:r>
+              <a:rPr lang="en-US" dirty="0"/>
+              <a:t>Can also show certain types of unexpected structure (e.g. variance variance)</a:t>
+            </a:r>
+          </a:p>
+          <a:p>
             <a:endParaRPr lang="en-US" dirty="0"/>
           </a:p>
         </p:txBody>
@@ -22604,35 +22555,10 @@
           </a:p>
         </p:txBody>
       </p:sp>
-      <p:pic>
-        <p:nvPicPr>
-          <p:cNvPr id="7" name="Content Placeholder 6" descr="Screen Shot 2014-01-26 at 9.56.32 PM.png"/>
-          <p:cNvPicPr>
-            <a:picLocks noGrp="1" noChangeAspect="1"/>
-          </p:cNvPicPr>
-          <p:nvPr>
-            <p:ph idx="1"/>
-          </p:nvPr>
-        </p:nvPicPr>
-        <p:blipFill>
-          <a:blip r:embed="rId3">
-            <a:extLst>
-              <a:ext uri="{28A0092B-C50C-407E-A947-70E740481C1C}">
-                <a14:useLocalDpi xmlns:a14="http://schemas.microsoft.com/office/drawing/2010/main" val="0"/>
-              </a:ext>
-            </a:extLst>
-          </a:blip>
-          <a:srcRect t="6502" b="6502"/>
-          <a:stretch>
-            <a:fillRect/>
-          </a:stretch>
-        </p:blipFill>
-        <p:spPr/>
-      </p:pic>
     </p:spTree>
     <p:extLst>
       <p:ext uri="{BB962C8B-B14F-4D97-AF65-F5344CB8AC3E}">
-        <p14:creationId xmlns:p14="http://schemas.microsoft.com/office/powerpoint/2010/main" val="2922795962"/>
+        <p14:creationId xmlns:p14="http://schemas.microsoft.com/office/powerpoint/2010/main" val="1856013120"/>
       </p:ext>
     </p:extLst>
   </p:cSld>
@@ -22676,162 +22602,6 @@
             <p:ph type="title"/>
           </p:nvPr>
         </p:nvSpPr>
-        <p:spPr/>
-        <p:txBody>
-          <a:bodyPr/>
-          <a:lstStyle/>
-          <a:p>
-            <a:r>
-              <a:rPr lang="en-US" dirty="0" smtClean="0"/>
-              <a:t>Boxplots good/bad</a:t>
-            </a:r>
-            <a:endParaRPr lang="en-US" dirty="0"/>
-          </a:p>
-        </p:txBody>
-      </p:sp>
-      <p:sp>
-        <p:nvSpPr>
-          <p:cNvPr id="3" name="Content Placeholder 2"/>
-          <p:cNvSpPr>
-            <a:spLocks noGrp="1"/>
-          </p:cNvSpPr>
-          <p:nvPr>
-            <p:ph idx="1"/>
-          </p:nvPr>
-        </p:nvSpPr>
-        <p:spPr/>
-        <p:txBody>
-          <a:bodyPr/>
-          <a:lstStyle/>
-          <a:p>
-            <a:r>
-              <a:rPr lang="en-US" dirty="0"/>
-              <a:t>Boxplots make comparison really easy … </a:t>
-            </a:r>
-          </a:p>
-          <a:p>
-            <a:r>
-              <a:rPr lang="en-US" dirty="0"/>
-              <a:t>Can also show certain types of unexpected structure (e.g. variance variance)</a:t>
-            </a:r>
-          </a:p>
-          <a:p>
-            <a:endParaRPr lang="en-US" dirty="0"/>
-          </a:p>
-        </p:txBody>
-      </p:sp>
-      <p:sp>
-        <p:nvSpPr>
-          <p:cNvPr id="4" name="Date Placeholder 3"/>
-          <p:cNvSpPr>
-            <a:spLocks noGrp="1"/>
-          </p:cNvSpPr>
-          <p:nvPr>
-            <p:ph type="dt" sz="half" idx="10"/>
-          </p:nvPr>
-        </p:nvSpPr>
-        <p:spPr/>
-        <p:txBody>
-          <a:bodyPr/>
-          <a:lstStyle/>
-          <a:p>
-            <a:fld id="{7053BEFA-1175-F644-B249-7D41D72BD3FF}" type="datetime1">
-              <a:rPr lang="en-US" smtClean="0"/>
-              <a:t>1/30/14</a:t>
-            </a:fld>
-            <a:endParaRPr lang="en-US"/>
-          </a:p>
-        </p:txBody>
-      </p:sp>
-      <p:sp>
-        <p:nvSpPr>
-          <p:cNvPr id="5" name="Footer Placeholder 4"/>
-          <p:cNvSpPr>
-            <a:spLocks noGrp="1"/>
-          </p:cNvSpPr>
-          <p:nvPr>
-            <p:ph type="ftr" sz="quarter" idx="11"/>
-          </p:nvPr>
-        </p:nvSpPr>
-        <p:spPr/>
-        <p:txBody>
-          <a:bodyPr/>
-          <a:lstStyle/>
-          <a:p>
-            <a:endParaRPr lang="en-US" dirty="0"/>
-          </a:p>
-        </p:txBody>
-      </p:sp>
-      <p:sp>
-        <p:nvSpPr>
-          <p:cNvPr id="6" name="Slide Number Placeholder 5"/>
-          <p:cNvSpPr>
-            <a:spLocks noGrp="1"/>
-          </p:cNvSpPr>
-          <p:nvPr>
-            <p:ph type="sldNum" sz="quarter" idx="12"/>
-          </p:nvPr>
-        </p:nvSpPr>
-        <p:spPr/>
-        <p:txBody>
-          <a:bodyPr/>
-          <a:lstStyle/>
-          <a:p>
-            <a:fld id="{17E276FA-8F89-B34D-A726-BE3FA1F8DD97}" type="slidenum">
-              <a:rPr lang="en-US" smtClean="0"/>
-              <a:t>24</a:t>
-            </a:fld>
-            <a:endParaRPr lang="en-US" dirty="0"/>
-          </a:p>
-        </p:txBody>
-      </p:sp>
-    </p:spTree>
-    <p:extLst>
-      <p:ext uri="{BB962C8B-B14F-4D97-AF65-F5344CB8AC3E}">
-        <p14:creationId xmlns:p14="http://schemas.microsoft.com/office/powerpoint/2010/main" val="1856013120"/>
-      </p:ext>
-    </p:extLst>
-  </p:cSld>
-  <p:clrMapOvr>
-    <a:masterClrMapping/>
-  </p:clrMapOvr>
-  <p:timing>
-    <p:tnLst>
-      <p:par>
-        <p:cTn xmlns:p14="http://schemas.microsoft.com/office/powerpoint/2010/main" id="1" dur="indefinite" restart="never" nodeType="tmRoot"/>
-      </p:par>
-    </p:tnLst>
-  </p:timing>
-</p:sld>
-</file>
-
-<file path=ppt/slides/slide25.xml><?xml version="1.0" encoding="utf-8"?>
-<p:sld xmlns:a="http://schemas.openxmlformats.org/drawingml/2006/main" xmlns:r="http://schemas.openxmlformats.org/officeDocument/2006/relationships" xmlns:p="http://schemas.openxmlformats.org/presentationml/2006/main">
-  <p:cSld>
-    <p:spTree>
-      <p:nvGrpSpPr>
-        <p:cNvPr id="1" name=""/>
-        <p:cNvGrpSpPr/>
-        <p:nvPr/>
-      </p:nvGrpSpPr>
-      <p:grpSpPr>
-        <a:xfrm>
-          <a:off x="0" y="0"/>
-          <a:ext cx="0" cy="0"/>
-          <a:chOff x="0" y="0"/>
-          <a:chExt cx="0" cy="0"/>
-        </a:xfrm>
-      </p:grpSpPr>
-      <p:sp>
-        <p:nvSpPr>
-          <p:cNvPr id="2" name="Title 1"/>
-          <p:cNvSpPr>
-            <a:spLocks noGrp="1"/>
-          </p:cNvSpPr>
-          <p:nvPr>
-            <p:ph type="title"/>
-          </p:nvPr>
-        </p:nvSpPr>
         <p:spPr>
           <a:xfrm>
             <a:off x="954132" y="310162"/>
@@ -22943,7 +22713,7 @@
           <a:p>
             <a:fld id="{17E276FA-8F89-B34D-A726-BE3FA1F8DD97}" type="slidenum">
               <a:rPr lang="en-US" smtClean="0"/>
-              <a:t>25</a:t>
+              <a:t>24</a:t>
             </a:fld>
             <a:endParaRPr lang="en-US" dirty="0"/>
           </a:p>
@@ -23131,7 +22901,7 @@
 </p:sld>
 </file>
 
-<file path=ppt/slides/slide26.xml><?xml version="1.0" encoding="utf-8"?>
+<file path=ppt/slides/slide25.xml><?xml version="1.0" encoding="utf-8"?>
 <p:sld xmlns:a="http://schemas.openxmlformats.org/drawingml/2006/main" xmlns:r="http://schemas.openxmlformats.org/officeDocument/2006/relationships" xmlns:p="http://schemas.openxmlformats.org/presentationml/2006/main">
   <p:cSld>
     <p:spTree>
@@ -23230,7 +23000,7 @@
           <a:p>
             <a:fld id="{17E276FA-8F89-B34D-A726-BE3FA1F8DD97}" type="slidenum">
               <a:rPr lang="en-US" smtClean="0"/>
-              <a:t>26</a:t>
+              <a:t>25</a:t>
             </a:fld>
             <a:endParaRPr lang="en-US" dirty="0"/>
           </a:p>
@@ -23401,6 +23171,182 @@
     <p:extLst>
       <p:ext uri="{BB962C8B-B14F-4D97-AF65-F5344CB8AC3E}">
         <p14:creationId xmlns:p14="http://schemas.microsoft.com/office/powerpoint/2010/main" val="3035987725"/>
+      </p:ext>
+    </p:extLst>
+  </p:cSld>
+  <p:clrMapOvr>
+    <a:masterClrMapping/>
+  </p:clrMapOvr>
+  <p:timing>
+    <p:tnLst>
+      <p:par>
+        <p:cTn xmlns:p14="http://schemas.microsoft.com/office/powerpoint/2010/main" id="1" dur="indefinite" restart="never" nodeType="tmRoot"/>
+      </p:par>
+    </p:tnLst>
+  </p:timing>
+</p:sld>
+</file>
+
+<file path=ppt/slides/slide26.xml><?xml version="1.0" encoding="utf-8"?>
+<p:sld xmlns:a="http://schemas.openxmlformats.org/drawingml/2006/main" xmlns:r="http://schemas.openxmlformats.org/officeDocument/2006/relationships" xmlns:p="http://schemas.openxmlformats.org/presentationml/2006/main">
+  <p:cSld>
+    <p:spTree>
+      <p:nvGrpSpPr>
+        <p:cNvPr id="1" name=""/>
+        <p:cNvGrpSpPr/>
+        <p:nvPr/>
+      </p:nvGrpSpPr>
+      <p:grpSpPr>
+        <a:xfrm>
+          <a:off x="0" y="0"/>
+          <a:ext cx="0" cy="0"/>
+          <a:chOff x="0" y="0"/>
+          <a:chExt cx="0" cy="0"/>
+        </a:xfrm>
+      </p:grpSpPr>
+      <p:sp>
+        <p:nvSpPr>
+          <p:cNvPr id="2" name="Title 1"/>
+          <p:cNvSpPr>
+            <a:spLocks noGrp="1"/>
+          </p:cNvSpPr>
+          <p:nvPr>
+            <p:ph type="title"/>
+          </p:nvPr>
+        </p:nvSpPr>
+        <p:spPr/>
+        <p:txBody>
+          <a:bodyPr/>
+          <a:lstStyle/>
+          <a:p>
+            <a:r>
+              <a:rPr lang="en-US" dirty="0" smtClean="0"/>
+              <a:t>When might we expect a Normal distribution?</a:t>
+            </a:r>
+            <a:endParaRPr lang="en-US" dirty="0"/>
+          </a:p>
+        </p:txBody>
+      </p:sp>
+      <p:sp>
+        <p:nvSpPr>
+          <p:cNvPr id="7" name="Content Placeholder 6"/>
+          <p:cNvSpPr>
+            <a:spLocks noGrp="1"/>
+          </p:cNvSpPr>
+          <p:nvPr>
+            <p:ph idx="1"/>
+          </p:nvPr>
+        </p:nvSpPr>
+        <p:spPr/>
+        <p:txBody>
+          <a:bodyPr/>
+          <a:lstStyle/>
+          <a:p>
+            <a:pPr marL="0" indent="0">
+              <a:buNone/>
+            </a:pPr>
+            <a:r>
+              <a:rPr lang="en-US" dirty="0"/>
+              <a:t>Central limit theorem: Sum of </a:t>
+            </a:r>
+            <a:r>
+              <a:rPr lang="en-US" i="1" dirty="0"/>
+              <a:t>independent </a:t>
+            </a:r>
+            <a:r>
+              <a:rPr lang="en-US" dirty="0"/>
+              <a:t>and </a:t>
+            </a:r>
+            <a:r>
+              <a:rPr lang="en-US" i="1" dirty="0"/>
+              <a:t>identically distributed </a:t>
+            </a:r>
+            <a:r>
+              <a:rPr lang="en-US" b="1" i="1" dirty="0"/>
+              <a:t>random variables </a:t>
+            </a:r>
+            <a:r>
+              <a:rPr lang="en-US" dirty="0"/>
+              <a:t>will converge to normal</a:t>
+            </a:r>
+          </a:p>
+          <a:p>
+            <a:pPr marL="0" indent="0">
+              <a:buNone/>
+            </a:pPr>
+            <a:endParaRPr lang="en-US" dirty="0"/>
+          </a:p>
+        </p:txBody>
+      </p:sp>
+      <p:sp>
+        <p:nvSpPr>
+          <p:cNvPr id="4" name="Date Placeholder 3"/>
+          <p:cNvSpPr>
+            <a:spLocks noGrp="1"/>
+          </p:cNvSpPr>
+          <p:nvPr>
+            <p:ph type="dt" sz="half" idx="10"/>
+          </p:nvPr>
+        </p:nvSpPr>
+        <p:spPr/>
+        <p:txBody>
+          <a:bodyPr/>
+          <a:lstStyle/>
+          <a:p>
+            <a:fld id="{7053BEFA-1175-F644-B249-7D41D72BD3FF}" type="datetime1">
+              <a:rPr lang="en-US" smtClean="0"/>
+              <a:t>1/30/14</a:t>
+            </a:fld>
+            <a:endParaRPr lang="en-US"/>
+          </a:p>
+        </p:txBody>
+      </p:sp>
+      <p:sp>
+        <p:nvSpPr>
+          <p:cNvPr id="5" name="Footer Placeholder 4"/>
+          <p:cNvSpPr>
+            <a:spLocks noGrp="1"/>
+          </p:cNvSpPr>
+          <p:nvPr>
+            <p:ph type="ftr" sz="quarter" idx="11"/>
+          </p:nvPr>
+        </p:nvSpPr>
+        <p:spPr/>
+        <p:txBody>
+          <a:bodyPr/>
+          <a:lstStyle/>
+          <a:p>
+            <a:endParaRPr lang="en-US" dirty="0"/>
+          </a:p>
+        </p:txBody>
+      </p:sp>
+      <p:sp>
+        <p:nvSpPr>
+          <p:cNvPr id="6" name="Slide Number Placeholder 5"/>
+          <p:cNvSpPr>
+            <a:spLocks noGrp="1"/>
+          </p:cNvSpPr>
+          <p:nvPr>
+            <p:ph type="sldNum" sz="quarter" idx="12"/>
+          </p:nvPr>
+        </p:nvSpPr>
+        <p:spPr/>
+        <p:txBody>
+          <a:bodyPr/>
+          <a:lstStyle/>
+          <a:p>
+            <a:fld id="{17E276FA-8F89-B34D-A726-BE3FA1F8DD97}" type="slidenum">
+              <a:rPr lang="en-US" smtClean="0"/>
+              <a:t>26</a:t>
+            </a:fld>
+            <a:endParaRPr lang="en-US" dirty="0"/>
+          </a:p>
+        </p:txBody>
+      </p:sp>
+    </p:spTree>
+    <p:extLst>
+      <p:ext uri="{BB962C8B-B14F-4D97-AF65-F5344CB8AC3E}">
+        <p14:creationId xmlns:p14="http://schemas.microsoft.com/office/powerpoint/2010/main" val="384715267"/>
       </p:ext>
     </p:extLst>
   </p:cSld>
@@ -23451,7 +23397,7 @@
           <a:p>
             <a:r>
               <a:rPr lang="en-US" dirty="0" smtClean="0"/>
-              <a:t>When might we expect a Normal distribution?</a:t>
+              <a:t>Random Variable</a:t>
             </a:r>
             <a:endParaRPr lang="en-US" dirty="0"/>
           </a:p>
@@ -23459,7 +23405,7 @@
       </p:sp>
       <p:sp>
         <p:nvSpPr>
-          <p:cNvPr id="7" name="Content Placeholder 6"/>
+          <p:cNvPr id="3" name="Content Placeholder 2"/>
           <p:cNvSpPr>
             <a:spLocks noGrp="1"/>
           </p:cNvSpPr>
@@ -23467,7 +23413,12 @@
             <p:ph idx="1"/>
           </p:nvPr>
         </p:nvSpPr>
-        <p:spPr/>
+        <p:spPr>
+          <a:xfrm>
+            <a:off x="954132" y="1847153"/>
+            <a:ext cx="7223615" cy="4379976"/>
+          </a:xfrm>
+        </p:spPr>
         <p:txBody>
           <a:bodyPr/>
           <a:lstStyle/>
@@ -23476,35 +23427,44 @@
               <a:buNone/>
             </a:pPr>
             <a:r>
-              <a:rPr lang="en-US" dirty="0"/>
-              <a:t>Central limit theorem: Sum of </a:t>
-            </a:r>
-            <a:r>
-              <a:rPr lang="en-US" i="1" dirty="0"/>
-              <a:t>independent </a:t>
-            </a:r>
-            <a:r>
-              <a:rPr lang="en-US" dirty="0"/>
-              <a:t>and </a:t>
-            </a:r>
-            <a:r>
-              <a:rPr lang="en-US" i="1" dirty="0"/>
-              <a:t>identically distributed </a:t>
-            </a:r>
-            <a:r>
-              <a:rPr lang="en-US" b="1" i="1" dirty="0"/>
-              <a:t>random variables </a:t>
-            </a:r>
-            <a:r>
-              <a:rPr lang="en-US" dirty="0"/>
-              <a:t>will converge to normal</a:t>
+              <a:rPr lang="en-US" dirty="0" smtClean="0"/>
+              <a:t>Value varies (</a:t>
+            </a:r>
+            <a:r>
+              <a:rPr lang="en-US" i="1" dirty="0" smtClean="0"/>
+              <a:t>e.g. </a:t>
+            </a:r>
+            <a:r>
+              <a:rPr lang="en-US" dirty="0" smtClean="0"/>
+              <a:t>possible outcomes of an experiment)</a:t>
             </a:r>
           </a:p>
           <a:p>
             <a:pPr marL="0" indent="0">
               <a:buNone/>
             </a:pPr>
-            <a:endParaRPr lang="en-US" dirty="0"/>
+            <a:r>
+              <a:rPr lang="en-US" dirty="0" smtClean="0"/>
+              <a:t>Modeled as a </a:t>
+            </a:r>
+            <a:r>
+              <a:rPr lang="en-US" i="1" dirty="0" smtClean="0"/>
+              <a:t>distribution</a:t>
+            </a:r>
+          </a:p>
+          <a:p>
+            <a:pPr lvl="1"/>
+            <a:r>
+              <a:rPr lang="en-US" dirty="0" smtClean="0"/>
+              <a:t>Discrete values (“Probability Mass Function”) - typically values and weights</a:t>
+            </a:r>
+          </a:p>
+          <a:p>
+            <a:pPr lvl="1"/>
+            <a:r>
+              <a:rPr lang="en-US" dirty="0" smtClean="0"/>
+              <a:t>Continues values (“Probability Density Function”) – typically a function</a:t>
+            </a:r>
           </a:p>
         </p:txBody>
       </p:sp>
@@ -23576,7 +23536,7 @@
     </p:spTree>
     <p:extLst>
       <p:ext uri="{BB962C8B-B14F-4D97-AF65-F5344CB8AC3E}">
-        <p14:creationId xmlns:p14="http://schemas.microsoft.com/office/powerpoint/2010/main" val="384715267"/>
+        <p14:creationId xmlns:p14="http://schemas.microsoft.com/office/powerpoint/2010/main" val="3092281358"/>
       </p:ext>
     </p:extLst>
   </p:cSld>
@@ -23612,43 +23572,43 @@
       </p:grpSpPr>
       <p:sp>
         <p:nvSpPr>
-          <p:cNvPr id="2" name="Title 1"/>
+          <p:cNvPr id="10" name="Title 9"/>
           <p:cNvSpPr>
             <a:spLocks noGrp="1"/>
           </p:cNvSpPr>
           <p:nvPr>
             <p:ph type="title"/>
-          </p:nvPr>
-        </p:nvSpPr>
-        <p:spPr/>
-        <p:txBody>
-          <a:bodyPr/>
-          <a:lstStyle/>
-          <a:p>
-            <a:r>
-              <a:rPr lang="en-US" dirty="0" smtClean="0"/>
-              <a:t>Random Variable</a:t>
-            </a:r>
-            <a:endParaRPr lang="en-US" dirty="0"/>
-          </a:p>
-        </p:txBody>
-      </p:sp>
-      <p:sp>
-        <p:nvSpPr>
-          <p:cNvPr id="3" name="Content Placeholder 2"/>
-          <p:cNvSpPr>
-            <a:spLocks noGrp="1"/>
-          </p:cNvSpPr>
-          <p:nvPr>
-            <p:ph idx="1"/>
           </p:nvPr>
         </p:nvSpPr>
         <p:spPr>
           <a:xfrm>
-            <a:off x="954132" y="1847153"/>
-            <a:ext cx="7223615" cy="4379976"/>
+            <a:off x="465996" y="310162"/>
+            <a:ext cx="7882681" cy="990107"/>
           </a:xfrm>
         </p:spPr>
+        <p:txBody>
+          <a:bodyPr/>
+          <a:lstStyle/>
+          <a:p>
+            <a:r>
+              <a:rPr lang="en-US" dirty="0" smtClean="0"/>
+              <a:t>Independent				Identically Distributed</a:t>
+            </a:r>
+            <a:endParaRPr lang="en-US" dirty="0"/>
+          </a:p>
+        </p:txBody>
+      </p:sp>
+      <p:sp>
+        <p:nvSpPr>
+          <p:cNvPr id="3" name="Content Placeholder 2"/>
+          <p:cNvSpPr>
+            <a:spLocks noGrp="1"/>
+          </p:cNvSpPr>
+          <p:nvPr>
+            <p:ph sz="half" idx="1"/>
+          </p:nvPr>
+        </p:nvSpPr>
+        <p:spPr/>
         <p:txBody>
           <a:bodyPr/>
           <a:lstStyle/>
@@ -23657,44 +23617,79 @@
               <a:buNone/>
             </a:pPr>
             <a:r>
-              <a:rPr lang="en-US" dirty="0" smtClean="0"/>
-              <a:t>Value varies (</a:t>
-            </a:r>
-            <a:r>
-              <a:rPr lang="en-US" i="1" dirty="0" smtClean="0"/>
-              <a:t>e.g. </a:t>
-            </a:r>
-            <a:r>
-              <a:rPr lang="en-US" dirty="0" smtClean="0"/>
-              <a:t>possible outcomes of an experiment)</a:t>
-            </a:r>
-          </a:p>
+              <a:rPr lang="en-US" sz="2800" dirty="0" smtClean="0"/>
+              <a:t>Are the observations independent of each other? </a:t>
+            </a:r>
+          </a:p>
+          <a:p>
+            <a:pPr lvl="1"/>
+            <a:r>
+              <a:rPr lang="en-US" sz="2400" dirty="0" smtClean="0"/>
+              <a:t>Do they directly influence each other </a:t>
+            </a:r>
+          </a:p>
+          <a:p>
+            <a:pPr lvl="1"/>
+            <a:r>
+              <a:rPr lang="en-US" sz="2400" dirty="0" smtClean="0"/>
+              <a:t>Are they both influenced by a shared hidden confounding variable?</a:t>
+            </a:r>
+          </a:p>
+        </p:txBody>
+      </p:sp>
+      <p:sp>
+        <p:nvSpPr>
+          <p:cNvPr id="9" name="Content Placeholder 8"/>
+          <p:cNvSpPr>
+            <a:spLocks noGrp="1"/>
+          </p:cNvSpPr>
+          <p:nvPr>
+            <p:ph sz="half" idx="2"/>
+          </p:nvPr>
+        </p:nvSpPr>
+        <p:spPr/>
+        <p:txBody>
+          <a:bodyPr/>
+          <a:lstStyle/>
           <a:p>
             <a:pPr marL="0" indent="0">
               <a:buNone/>
             </a:pPr>
             <a:r>
-              <a:rPr lang="en-US" dirty="0" smtClean="0"/>
-              <a:t>Modeled as a </a:t>
-            </a:r>
-            <a:r>
-              <a:rPr lang="en-US" i="1" dirty="0" smtClean="0"/>
-              <a:t>distribution</a:t>
-            </a:r>
-          </a:p>
-          <a:p>
-            <a:pPr lvl="1"/>
-            <a:r>
-              <a:rPr lang="en-US" dirty="0" smtClean="0"/>
-              <a:t>Discrete values (“Probability Mass Function”) - typically values and weights</a:t>
-            </a:r>
-          </a:p>
-          <a:p>
-            <a:pPr lvl="1"/>
-            <a:r>
-              <a:rPr lang="en-US" dirty="0" smtClean="0"/>
-              <a:t>Continues values (“Probability Density Function”) – typically a function</a:t>
-            </a:r>
+              <a:rPr lang="en-US" sz="2800" dirty="0" smtClean="0"/>
+              <a:t>Are the random variables identically distributed? </a:t>
+            </a:r>
+          </a:p>
+          <a:p>
+            <a:pPr lvl="2"/>
+            <a:r>
+              <a:rPr lang="en-US" sz="2400" dirty="0" smtClean="0"/>
+              <a:t>Is the variance equivalent</a:t>
+            </a:r>
+          </a:p>
+          <a:p>
+            <a:pPr lvl="2"/>
+            <a:r>
+              <a:rPr lang="en-US" sz="2400" dirty="0" smtClean="0"/>
+              <a:t>Are the min/max/SD equivalent</a:t>
+            </a:r>
+          </a:p>
+          <a:p>
+            <a:pPr lvl="2"/>
+            <a:r>
+              <a:rPr lang="en-US" sz="2400" dirty="0" smtClean="0"/>
+              <a:t>Kolmogorov-Smirnov Test</a:t>
+            </a:r>
+          </a:p>
+          <a:p>
+            <a:pPr lvl="2"/>
+            <a:endParaRPr lang="en-US" sz="2400" dirty="0" smtClean="0"/>
+          </a:p>
+          <a:p>
+            <a:pPr marL="0" indent="0">
+              <a:buNone/>
+            </a:pPr>
+            <a:endParaRPr lang="en-US" sz="2800" dirty="0"/>
           </a:p>
         </p:txBody>
       </p:sp>
@@ -23766,7 +23761,7 @@
     </p:spTree>
     <p:extLst>
       <p:ext uri="{BB962C8B-B14F-4D97-AF65-F5344CB8AC3E}">
-        <p14:creationId xmlns:p14="http://schemas.microsoft.com/office/powerpoint/2010/main" val="3092281358"/>
+        <p14:creationId xmlns:p14="http://schemas.microsoft.com/office/powerpoint/2010/main" val="168153640"/>
       </p:ext>
     </p:extLst>
   </p:cSld>
@@ -23810,35 +23805,32 @@
             <p:ph type="title"/>
           </p:nvPr>
         </p:nvSpPr>
+        <p:spPr/>
+        <p:txBody>
+          <a:bodyPr/>
+          <a:lstStyle/>
+          <a:p>
+            <a:r>
+              <a:rPr lang="en-US" dirty="0" smtClean="0"/>
+              <a:t>Example: Mouse Motion Length</a:t>
+            </a:r>
+            <a:endParaRPr lang="en-US" dirty="0"/>
+          </a:p>
+        </p:txBody>
+      </p:sp>
+      <p:sp>
+        <p:nvSpPr>
+          <p:cNvPr id="16" name="Content Placeholder 15"/>
+          <p:cNvSpPr>
+            <a:spLocks noGrp="1"/>
+          </p:cNvSpPr>
+          <p:nvPr>
+            <p:ph idx="1"/>
+          </p:nvPr>
+        </p:nvSpPr>
         <p:spPr>
-          <a:xfrm>
-            <a:off x="465996" y="310162"/>
-            <a:ext cx="7882681" cy="990107"/>
-          </a:xfrm>
+          <a:noFill/>
         </p:spPr>
-        <p:txBody>
-          <a:bodyPr/>
-          <a:lstStyle/>
-          <a:p>
-            <a:r>
-              <a:rPr lang="en-US" dirty="0" smtClean="0"/>
-              <a:t>Independent				Identically Distributed</a:t>
-            </a:r>
-            <a:endParaRPr lang="en-US" dirty="0"/>
-          </a:p>
-        </p:txBody>
-      </p:sp>
-      <p:sp>
-        <p:nvSpPr>
-          <p:cNvPr id="3" name="Content Placeholder 2"/>
-          <p:cNvSpPr>
-            <a:spLocks noGrp="1"/>
-          </p:cNvSpPr>
-          <p:nvPr>
-            <p:ph sz="half" idx="1"/>
-          </p:nvPr>
-        </p:nvSpPr>
-        <p:spPr/>
         <p:txBody>
           <a:bodyPr/>
           <a:lstStyle/>
@@ -23847,85 +23839,88 @@
               <a:buNone/>
             </a:pPr>
             <a:r>
-              <a:rPr lang="en-US" sz="2800" dirty="0" smtClean="0"/>
-              <a:t>Are the observations independent of each other? </a:t>
-            </a:r>
-          </a:p>
-          <a:p>
-            <a:pPr lvl="1"/>
-            <a:r>
-              <a:rPr lang="en-US" sz="2400" dirty="0" smtClean="0"/>
-              <a:t>Do they directly influence each other </a:t>
-            </a:r>
-          </a:p>
-          <a:p>
-            <a:pPr lvl="1"/>
-            <a:r>
-              <a:rPr lang="en-US" sz="2400" dirty="0" smtClean="0"/>
-              <a:t>Are they both influenced by a shared hidden confounding variable?</a:t>
-            </a:r>
-          </a:p>
-        </p:txBody>
-      </p:sp>
-      <p:sp>
-        <p:nvSpPr>
-          <p:cNvPr id="9" name="Content Placeholder 8"/>
-          <p:cNvSpPr>
-            <a:spLocks noGrp="1"/>
-          </p:cNvSpPr>
-          <p:nvPr>
-            <p:ph sz="half" idx="2"/>
-          </p:nvPr>
-        </p:nvSpPr>
-        <p:spPr/>
-        <p:txBody>
-          <a:bodyPr/>
-          <a:lstStyle/>
+              <a:rPr lang="en-US" sz="3200" dirty="0"/>
+              <a:t>Normal Distribution: </a:t>
+            </a:r>
+            <a:r>
+              <a:rPr lang="en-US" sz="3200" dirty="0" smtClean="0"/>
+              <a:t>Mouse Motion Length across all interactions</a:t>
+            </a:r>
+            <a:endParaRPr lang="en-US" sz="3200" dirty="0"/>
+          </a:p>
           <a:p>
             <a:pPr marL="0" indent="0">
               <a:buNone/>
             </a:pPr>
             <a:r>
-              <a:rPr lang="en-US" sz="2800" dirty="0" smtClean="0"/>
-              <a:t>Are the random variables identically distributed? </a:t>
-            </a:r>
-          </a:p>
-          <a:p>
-            <a:pPr lvl="2"/>
-            <a:r>
-              <a:rPr lang="en-US" sz="2400" dirty="0" smtClean="0"/>
-              <a:t>Is the variance equivalent</a:t>
-            </a:r>
-          </a:p>
-          <a:p>
-            <a:pPr lvl="2"/>
-            <a:r>
-              <a:rPr lang="en-US" sz="2400" dirty="0" smtClean="0"/>
-              <a:t>Are the min/max/SD equivalent</a:t>
-            </a:r>
-          </a:p>
-          <a:p>
-            <a:pPr lvl="2"/>
-            <a:r>
-              <a:rPr lang="en-US" sz="2400" dirty="0" smtClean="0"/>
-              <a:t>Kolmogorov-Smirnov Test</a:t>
-            </a:r>
-          </a:p>
-          <a:p>
-            <a:pPr lvl="2"/>
-            <a:endParaRPr lang="en-US" sz="2400" dirty="0" smtClean="0"/>
+              <a:rPr lang="en-US" sz="3200" dirty="0" smtClean="0"/>
+              <a:t>Random Variable:  An interaction</a:t>
+            </a:r>
           </a:p>
           <a:p>
             <a:pPr marL="0" indent="0">
               <a:buNone/>
             </a:pPr>
-            <a:endParaRPr lang="en-US" sz="2800" dirty="0"/>
-          </a:p>
-        </p:txBody>
-      </p:sp>
-      <p:sp>
-        <p:nvSpPr>
-          <p:cNvPr id="4" name="Date Placeholder 3"/>
+            <a:r>
+              <a:rPr lang="en-US" sz="3200" dirty="0"/>
+              <a:t>	</a:t>
+            </a:r>
+            <a:r>
+              <a:rPr lang="en-US" sz="3200" i="1" dirty="0" smtClean="0"/>
+              <a:t>Discrete </a:t>
+            </a:r>
+            <a:r>
+              <a:rPr lang="en-US" sz="3200" dirty="0" smtClean="0"/>
+              <a:t>or </a:t>
+            </a:r>
+            <a:r>
+              <a:rPr lang="en-US" sz="3200" i="1" dirty="0" smtClean="0"/>
+              <a:t>Continuous?</a:t>
+            </a:r>
+            <a:endParaRPr lang="en-US" sz="3200" dirty="0" smtClean="0"/>
+          </a:p>
+          <a:p>
+            <a:pPr marL="0" indent="0">
+              <a:buNone/>
+            </a:pPr>
+            <a:r>
+              <a:rPr lang="en-US" sz="3200" dirty="0" smtClean="0"/>
+              <a:t>Independence? </a:t>
+            </a:r>
+            <a:br>
+              <a:rPr lang="en-US" sz="3200" dirty="0" smtClean="0"/>
+            </a:br>
+            <a:r>
+              <a:rPr lang="en-US" sz="3200" dirty="0" smtClean="0"/>
+              <a:t>	When might this be true/untrue?</a:t>
+            </a:r>
+          </a:p>
+          <a:p>
+            <a:pPr marL="0" indent="0">
+              <a:buNone/>
+            </a:pPr>
+            <a:r>
+              <a:rPr lang="en-US" sz="3200" dirty="0" smtClean="0"/>
+              <a:t>Identical Distributions?</a:t>
+            </a:r>
+          </a:p>
+          <a:p>
+            <a:pPr marL="0" indent="0">
+              <a:buNone/>
+            </a:pPr>
+            <a:endParaRPr lang="en-US" sz="3200" dirty="0" smtClean="0"/>
+          </a:p>
+          <a:p>
+            <a:pPr marL="0" indent="0">
+              <a:buNone/>
+            </a:pPr>
+            <a:endParaRPr lang="en-US" sz="3200" dirty="0"/>
+          </a:p>
+        </p:txBody>
+      </p:sp>
+      <p:sp>
+        <p:nvSpPr>
+          <p:cNvPr id="7" name="Date Placeholder 6"/>
           <p:cNvSpPr>
             <a:spLocks noGrp="1"/>
           </p:cNvSpPr>
@@ -23938,8 +23933,9 @@
           <a:bodyPr/>
           <a:lstStyle/>
           <a:p>
-            <a:fld id="{7053BEFA-1175-F644-B249-7D41D72BD3FF}" type="datetime1">
+            <a:fld id="{A73F672F-A5FB-5745-934A-1BF51CA5539C}" type="datetime1">
               <a:rPr lang="en-US" smtClean="0"/>
+              <a:pPr/>
               <a:t>1/30/14</a:t>
             </a:fld>
             <a:endParaRPr lang="en-US"/>
@@ -23948,7 +23944,7 @@
       </p:sp>
       <p:sp>
         <p:nvSpPr>
-          <p:cNvPr id="5" name="Footer Placeholder 4"/>
+          <p:cNvPr id="8" name="Footer Placeholder 7"/>
           <p:cNvSpPr>
             <a:spLocks noGrp="1"/>
           </p:cNvSpPr>
@@ -23967,7 +23963,7 @@
       </p:sp>
       <p:sp>
         <p:nvSpPr>
-          <p:cNvPr id="6" name="Slide Number Placeholder 5"/>
+          <p:cNvPr id="9" name="Slide Number Placeholder 8"/>
           <p:cNvSpPr>
             <a:spLocks noGrp="1"/>
           </p:cNvSpPr>
@@ -23982,6 +23978,7 @@
           <a:p>
             <a:fld id="{17E276FA-8F89-B34D-A726-BE3FA1F8DD97}" type="slidenum">
               <a:rPr lang="en-US" smtClean="0"/>
+              <a:pPr/>
               <a:t>29</a:t>
             </a:fld>
             <a:endParaRPr lang="en-US" dirty="0"/>
@@ -23991,7 +23988,7 @@
     </p:spTree>
     <p:extLst>
       <p:ext uri="{BB962C8B-B14F-4D97-AF65-F5344CB8AC3E}">
-        <p14:creationId xmlns:p14="http://schemas.microsoft.com/office/powerpoint/2010/main" val="168153640"/>
+        <p14:creationId xmlns:p14="http://schemas.microsoft.com/office/powerpoint/2010/main" val="1535357585"/>
       </p:ext>
     </p:extLst>
   </p:cSld>
@@ -24238,233 +24235,6 @@
       </p:grpSpPr>
       <p:sp>
         <p:nvSpPr>
-          <p:cNvPr id="10" name="Title 9"/>
-          <p:cNvSpPr>
-            <a:spLocks noGrp="1"/>
-          </p:cNvSpPr>
-          <p:nvPr>
-            <p:ph type="title"/>
-          </p:nvPr>
-        </p:nvSpPr>
-        <p:spPr/>
-        <p:txBody>
-          <a:bodyPr/>
-          <a:lstStyle/>
-          <a:p>
-            <a:r>
-              <a:rPr lang="en-US" dirty="0" smtClean="0"/>
-              <a:t>Example: Mouse Motion Length</a:t>
-            </a:r>
-            <a:endParaRPr lang="en-US" dirty="0"/>
-          </a:p>
-        </p:txBody>
-      </p:sp>
-      <p:sp>
-        <p:nvSpPr>
-          <p:cNvPr id="16" name="Content Placeholder 15"/>
-          <p:cNvSpPr>
-            <a:spLocks noGrp="1"/>
-          </p:cNvSpPr>
-          <p:nvPr>
-            <p:ph idx="1"/>
-          </p:nvPr>
-        </p:nvSpPr>
-        <p:spPr>
-          <a:noFill/>
-        </p:spPr>
-        <p:txBody>
-          <a:bodyPr/>
-          <a:lstStyle/>
-          <a:p>
-            <a:pPr marL="0" indent="0">
-              <a:buNone/>
-            </a:pPr>
-            <a:r>
-              <a:rPr lang="en-US" sz="3200" dirty="0"/>
-              <a:t>Normal Distribution: </a:t>
-            </a:r>
-            <a:r>
-              <a:rPr lang="en-US" sz="3200" dirty="0" smtClean="0"/>
-              <a:t>Mouse Motion Length across all interactions</a:t>
-            </a:r>
-            <a:endParaRPr lang="en-US" sz="3200" dirty="0"/>
-          </a:p>
-          <a:p>
-            <a:pPr marL="0" indent="0">
-              <a:buNone/>
-            </a:pPr>
-            <a:r>
-              <a:rPr lang="en-US" sz="3200" dirty="0" smtClean="0"/>
-              <a:t>Random Variable:  An interaction</a:t>
-            </a:r>
-          </a:p>
-          <a:p>
-            <a:pPr marL="0" indent="0">
-              <a:buNone/>
-            </a:pPr>
-            <a:r>
-              <a:rPr lang="en-US" sz="3200" dirty="0"/>
-              <a:t>	</a:t>
-            </a:r>
-            <a:r>
-              <a:rPr lang="en-US" sz="3200" i="1" dirty="0" smtClean="0"/>
-              <a:t>Discrete </a:t>
-            </a:r>
-            <a:r>
-              <a:rPr lang="en-US" sz="3200" dirty="0" smtClean="0"/>
-              <a:t>or </a:t>
-            </a:r>
-            <a:r>
-              <a:rPr lang="en-US" sz="3200" i="1" dirty="0" smtClean="0"/>
-              <a:t>Continuous?</a:t>
-            </a:r>
-            <a:endParaRPr lang="en-US" sz="3200" dirty="0" smtClean="0"/>
-          </a:p>
-          <a:p>
-            <a:pPr marL="0" indent="0">
-              <a:buNone/>
-            </a:pPr>
-            <a:r>
-              <a:rPr lang="en-US" sz="3200" dirty="0" smtClean="0"/>
-              <a:t>Independence? </a:t>
-            </a:r>
-            <a:br>
-              <a:rPr lang="en-US" sz="3200" dirty="0" smtClean="0"/>
-            </a:br>
-            <a:r>
-              <a:rPr lang="en-US" sz="3200" dirty="0" smtClean="0"/>
-              <a:t>	When might this be true/untrue?</a:t>
-            </a:r>
-          </a:p>
-          <a:p>
-            <a:pPr marL="0" indent="0">
-              <a:buNone/>
-            </a:pPr>
-            <a:r>
-              <a:rPr lang="en-US" sz="3200" dirty="0" smtClean="0"/>
-              <a:t>Identical Distributions?</a:t>
-            </a:r>
-          </a:p>
-          <a:p>
-            <a:pPr marL="0" indent="0">
-              <a:buNone/>
-            </a:pPr>
-            <a:endParaRPr lang="en-US" sz="3200" dirty="0" smtClean="0"/>
-          </a:p>
-          <a:p>
-            <a:pPr marL="0" indent="0">
-              <a:buNone/>
-            </a:pPr>
-            <a:endParaRPr lang="en-US" sz="3200" dirty="0"/>
-          </a:p>
-        </p:txBody>
-      </p:sp>
-      <p:sp>
-        <p:nvSpPr>
-          <p:cNvPr id="7" name="Date Placeholder 6"/>
-          <p:cNvSpPr>
-            <a:spLocks noGrp="1"/>
-          </p:cNvSpPr>
-          <p:nvPr>
-            <p:ph type="dt" sz="half" idx="10"/>
-          </p:nvPr>
-        </p:nvSpPr>
-        <p:spPr/>
-        <p:txBody>
-          <a:bodyPr/>
-          <a:lstStyle/>
-          <a:p>
-            <a:fld id="{A73F672F-A5FB-5745-934A-1BF51CA5539C}" type="datetime1">
-              <a:rPr lang="en-US" smtClean="0"/>
-              <a:pPr/>
-              <a:t>1/30/14</a:t>
-            </a:fld>
-            <a:endParaRPr lang="en-US"/>
-          </a:p>
-        </p:txBody>
-      </p:sp>
-      <p:sp>
-        <p:nvSpPr>
-          <p:cNvPr id="8" name="Footer Placeholder 7"/>
-          <p:cNvSpPr>
-            <a:spLocks noGrp="1"/>
-          </p:cNvSpPr>
-          <p:nvPr>
-            <p:ph type="ftr" sz="quarter" idx="11"/>
-          </p:nvPr>
-        </p:nvSpPr>
-        <p:spPr/>
-        <p:txBody>
-          <a:bodyPr/>
-          <a:lstStyle/>
-          <a:p>
-            <a:endParaRPr lang="en-US" dirty="0"/>
-          </a:p>
-        </p:txBody>
-      </p:sp>
-      <p:sp>
-        <p:nvSpPr>
-          <p:cNvPr id="9" name="Slide Number Placeholder 8"/>
-          <p:cNvSpPr>
-            <a:spLocks noGrp="1"/>
-          </p:cNvSpPr>
-          <p:nvPr>
-            <p:ph type="sldNum" sz="quarter" idx="12"/>
-          </p:nvPr>
-        </p:nvSpPr>
-        <p:spPr/>
-        <p:txBody>
-          <a:bodyPr/>
-          <a:lstStyle/>
-          <a:p>
-            <a:fld id="{17E276FA-8F89-B34D-A726-BE3FA1F8DD97}" type="slidenum">
-              <a:rPr lang="en-US" smtClean="0"/>
-              <a:pPr/>
-              <a:t>30</a:t>
-            </a:fld>
-            <a:endParaRPr lang="en-US" dirty="0"/>
-          </a:p>
-        </p:txBody>
-      </p:sp>
-    </p:spTree>
-    <p:extLst>
-      <p:ext uri="{BB962C8B-B14F-4D97-AF65-F5344CB8AC3E}">
-        <p14:creationId xmlns:p14="http://schemas.microsoft.com/office/powerpoint/2010/main" val="1535357585"/>
-      </p:ext>
-    </p:extLst>
-  </p:cSld>
-  <p:clrMapOvr>
-    <a:masterClrMapping/>
-  </p:clrMapOvr>
-  <p:timing>
-    <p:tnLst>
-      <p:par>
-        <p:cTn xmlns:p14="http://schemas.microsoft.com/office/powerpoint/2010/main" id="1" dur="indefinite" restart="never" nodeType="tmRoot"/>
-      </p:par>
-    </p:tnLst>
-  </p:timing>
-</p:sld>
-</file>
-
-<file path=ppt/slides/slide31.xml><?xml version="1.0" encoding="utf-8"?>
-<p:sld xmlns:a="http://schemas.openxmlformats.org/drawingml/2006/main" xmlns:r="http://schemas.openxmlformats.org/officeDocument/2006/relationships" xmlns:p="http://schemas.openxmlformats.org/presentationml/2006/main">
-  <p:cSld>
-    <p:spTree>
-      <p:nvGrpSpPr>
-        <p:cNvPr id="1" name=""/>
-        <p:cNvGrpSpPr/>
-        <p:nvPr/>
-      </p:nvGrpSpPr>
-      <p:grpSpPr>
-        <a:xfrm>
-          <a:off x="0" y="0"/>
-          <a:ext cx="0" cy="0"/>
-          <a:chOff x="0" y="0"/>
-          <a:chExt cx="0" cy="0"/>
-        </a:xfrm>
-      </p:grpSpPr>
-      <p:sp>
-        <p:nvSpPr>
           <p:cNvPr id="2" name="Title 1"/>
           <p:cNvSpPr>
             <a:spLocks noGrp="1"/>
@@ -24545,7 +24315,7 @@
           <a:p>
             <a:fld id="{17E276FA-8F89-B34D-A726-BE3FA1F8DD97}" type="slidenum">
               <a:rPr lang="en-US" smtClean="0"/>
-              <a:t>31</a:t>
+              <a:t>30</a:t>
             </a:fld>
             <a:endParaRPr lang="en-US" dirty="0"/>
           </a:p>
@@ -24997,7 +24767,7 @@
 </p:sld>
 </file>
 
-<file path=ppt/slides/slide32.xml><?xml version="1.0" encoding="utf-8"?>
+<file path=ppt/slides/slide31.xml><?xml version="1.0" encoding="utf-8"?>
 <p:sld xmlns:a="http://schemas.openxmlformats.org/drawingml/2006/main" xmlns:r="http://schemas.openxmlformats.org/officeDocument/2006/relationships" xmlns:p="http://schemas.openxmlformats.org/presentationml/2006/main">
   <p:cSld>
     <p:spTree>
@@ -25103,7 +24873,7 @@
           <a:p>
             <a:fld id="{17E276FA-8F89-B34D-A726-BE3FA1F8DD97}" type="slidenum">
               <a:rPr lang="en-US" smtClean="0"/>
-              <a:t>32</a:t>
+              <a:t>31</a:t>
             </a:fld>
             <a:endParaRPr lang="en-US" dirty="0"/>
           </a:p>
@@ -25509,7 +25279,7 @@
 </p:sld>
 </file>
 
-<file path=ppt/slides/slide33.xml><?xml version="1.0" encoding="utf-8"?>
+<file path=ppt/slides/slide32.xml><?xml version="1.0" encoding="utf-8"?>
 <p:sld xmlns:a="http://schemas.openxmlformats.org/drawingml/2006/main" xmlns:r="http://schemas.openxmlformats.org/officeDocument/2006/relationships" xmlns:p="http://schemas.openxmlformats.org/presentationml/2006/main">
   <p:cSld>
     <p:spTree>
@@ -25608,7 +25378,7 @@
           <a:p>
             <a:fld id="{17E276FA-8F89-B34D-A726-BE3FA1F8DD97}" type="slidenum">
               <a:rPr lang="en-US" smtClean="0"/>
-              <a:t>33</a:t>
+              <a:t>32</a:t>
             </a:fld>
             <a:endParaRPr lang="en-US" dirty="0"/>
           </a:p>
@@ -25989,7 +25759,7 @@
 </p:sld>
 </file>
 
-<file path=ppt/slides/slide34.xml><?xml version="1.0" encoding="utf-8"?>
+<file path=ppt/slides/slide33.xml><?xml version="1.0" encoding="utf-8"?>
 <p:sld xmlns:a="http://schemas.openxmlformats.org/drawingml/2006/main" xmlns:r="http://schemas.openxmlformats.org/officeDocument/2006/relationships" xmlns:p="http://schemas.openxmlformats.org/presentationml/2006/main">
   <p:cSld>
     <p:spTree>
@@ -26120,7 +25890,7 @@
             <a:fld id="{17E276FA-8F89-B34D-A726-BE3FA1F8DD97}" type="slidenum">
               <a:rPr lang="en-US" smtClean="0"/>
               <a:pPr/>
-              <a:t>34</a:t>
+              <a:t>33</a:t>
             </a:fld>
             <a:endParaRPr lang="en-US" dirty="0"/>
           </a:p>
@@ -26198,6 +25968,174 @@
     <p:extLst>
       <p:ext uri="{BB962C8B-B14F-4D97-AF65-F5344CB8AC3E}">
         <p14:creationId xmlns:p14="http://schemas.microsoft.com/office/powerpoint/2010/main" val="2762598272"/>
+      </p:ext>
+    </p:extLst>
+  </p:cSld>
+  <p:clrMapOvr>
+    <a:masterClrMapping/>
+  </p:clrMapOvr>
+  <p:timing>
+    <p:tnLst>
+      <p:par>
+        <p:cTn xmlns:p14="http://schemas.microsoft.com/office/powerpoint/2010/main" id="1" dur="indefinite" restart="never" nodeType="tmRoot"/>
+      </p:par>
+    </p:tnLst>
+  </p:timing>
+</p:sld>
+</file>
+
+<file path=ppt/slides/slide34.xml><?xml version="1.0" encoding="utf-8"?>
+<p:sld xmlns:a="http://schemas.openxmlformats.org/drawingml/2006/main" xmlns:r="http://schemas.openxmlformats.org/officeDocument/2006/relationships" xmlns:p="http://schemas.openxmlformats.org/presentationml/2006/main">
+  <p:cSld>
+    <p:spTree>
+      <p:nvGrpSpPr>
+        <p:cNvPr id="1" name=""/>
+        <p:cNvGrpSpPr/>
+        <p:nvPr/>
+      </p:nvGrpSpPr>
+      <p:grpSpPr>
+        <a:xfrm>
+          <a:off x="0" y="0"/>
+          <a:ext cx="0" cy="0"/>
+          <a:chOff x="0" y="0"/>
+          <a:chExt cx="0" cy="0"/>
+        </a:xfrm>
+      </p:grpSpPr>
+      <p:sp>
+        <p:nvSpPr>
+          <p:cNvPr id="2" name="Title 1"/>
+          <p:cNvSpPr>
+            <a:spLocks noGrp="1"/>
+          </p:cNvSpPr>
+          <p:nvPr>
+            <p:ph type="title"/>
+          </p:nvPr>
+        </p:nvSpPr>
+        <p:spPr/>
+        <p:txBody>
+          <a:bodyPr/>
+          <a:lstStyle/>
+          <a:p>
+            <a:r>
+              <a:rPr lang="en-US" dirty="0" smtClean="0"/>
+              <a:t>Value of Histograms</a:t>
+            </a:r>
+            <a:endParaRPr lang="en-US" dirty="0"/>
+          </a:p>
+        </p:txBody>
+      </p:sp>
+      <p:sp>
+        <p:nvSpPr>
+          <p:cNvPr id="3" name="Content Placeholder 2"/>
+          <p:cNvSpPr>
+            <a:spLocks noGrp="1"/>
+          </p:cNvSpPr>
+          <p:nvPr>
+            <p:ph idx="1"/>
+          </p:nvPr>
+        </p:nvSpPr>
+        <p:spPr/>
+        <p:txBody>
+          <a:bodyPr/>
+          <a:lstStyle/>
+          <a:p>
+            <a:pPr marL="0" indent="0">
+              <a:buNone/>
+            </a:pPr>
+            <a:r>
+              <a:rPr lang="en-US" dirty="0" smtClean="0"/>
+              <a:t>Helps you check: Do assumptions match your data?</a:t>
+            </a:r>
+          </a:p>
+          <a:p>
+            <a:pPr marL="0" indent="0">
+              <a:buNone/>
+            </a:pPr>
+            <a:r>
+              <a:rPr lang="en-US" dirty="0" smtClean="0"/>
+              <a:t>Gives a sense of the distribution</a:t>
+            </a:r>
+          </a:p>
+          <a:p>
+            <a:pPr marL="0" indent="0">
+              <a:buNone/>
+            </a:pPr>
+            <a:endParaRPr lang="en-US" dirty="0" smtClean="0"/>
+          </a:p>
+          <a:p>
+            <a:endParaRPr lang="en-US" dirty="0"/>
+          </a:p>
+        </p:txBody>
+      </p:sp>
+      <p:sp>
+        <p:nvSpPr>
+          <p:cNvPr id="4" name="Date Placeholder 3"/>
+          <p:cNvSpPr>
+            <a:spLocks noGrp="1"/>
+          </p:cNvSpPr>
+          <p:nvPr>
+            <p:ph type="dt" sz="half" idx="10"/>
+          </p:nvPr>
+        </p:nvSpPr>
+        <p:spPr/>
+        <p:txBody>
+          <a:bodyPr/>
+          <a:lstStyle/>
+          <a:p>
+            <a:fld id="{7053BEFA-1175-F644-B249-7D41D72BD3FF}" type="datetime1">
+              <a:rPr lang="en-US" smtClean="0"/>
+              <a:t>1/30/14</a:t>
+            </a:fld>
+            <a:endParaRPr lang="en-US"/>
+          </a:p>
+        </p:txBody>
+      </p:sp>
+      <p:sp>
+        <p:nvSpPr>
+          <p:cNvPr id="5" name="Footer Placeholder 4"/>
+          <p:cNvSpPr>
+            <a:spLocks noGrp="1"/>
+          </p:cNvSpPr>
+          <p:nvPr>
+            <p:ph type="ftr" sz="quarter" idx="11"/>
+          </p:nvPr>
+        </p:nvSpPr>
+        <p:spPr/>
+        <p:txBody>
+          <a:bodyPr/>
+          <a:lstStyle/>
+          <a:p>
+            <a:endParaRPr lang="en-US" dirty="0"/>
+          </a:p>
+        </p:txBody>
+      </p:sp>
+      <p:sp>
+        <p:nvSpPr>
+          <p:cNvPr id="6" name="Slide Number Placeholder 5"/>
+          <p:cNvSpPr>
+            <a:spLocks noGrp="1"/>
+          </p:cNvSpPr>
+          <p:nvPr>
+            <p:ph type="sldNum" sz="quarter" idx="12"/>
+          </p:nvPr>
+        </p:nvSpPr>
+        <p:spPr/>
+        <p:txBody>
+          <a:bodyPr/>
+          <a:lstStyle/>
+          <a:p>
+            <a:fld id="{17E276FA-8F89-B34D-A726-BE3FA1F8DD97}" type="slidenum">
+              <a:rPr lang="en-US" smtClean="0"/>
+              <a:t>34</a:t>
+            </a:fld>
+            <a:endParaRPr lang="en-US" dirty="0"/>
+          </a:p>
+        </p:txBody>
+      </p:sp>
+    </p:spTree>
+    <p:extLst>
+      <p:ext uri="{BB962C8B-B14F-4D97-AF65-F5344CB8AC3E}">
+        <p14:creationId xmlns:p14="http://schemas.microsoft.com/office/powerpoint/2010/main" val="721130924"/>
       </p:ext>
     </p:extLst>
   </p:cSld>
@@ -26247,53 +26185,9 @@
           <a:lstStyle/>
           <a:p>
             <a:r>
-              <a:rPr lang="en-US" dirty="0" smtClean="0"/>
-              <a:t>Value of Histograms</a:t>
-            </a:r>
-            <a:endParaRPr lang="en-US" dirty="0"/>
-          </a:p>
-        </p:txBody>
-      </p:sp>
-      <p:sp>
-        <p:nvSpPr>
-          <p:cNvPr id="3" name="Content Placeholder 2"/>
-          <p:cNvSpPr>
-            <a:spLocks noGrp="1"/>
-          </p:cNvSpPr>
-          <p:nvPr>
-            <p:ph idx="1"/>
-          </p:nvPr>
-        </p:nvSpPr>
-        <p:spPr/>
-        <p:txBody>
-          <a:bodyPr/>
-          <a:lstStyle/>
-          <a:p>
-            <a:pPr marL="0" indent="0">
-              <a:buNone/>
-            </a:pPr>
-            <a:r>
-              <a:rPr lang="en-US" dirty="0" smtClean="0"/>
-              <a:t>Helps you check: Do assumptions match your data?</a:t>
-            </a:r>
-          </a:p>
-          <a:p>
-            <a:pPr marL="0" indent="0">
-              <a:buNone/>
-            </a:pPr>
-            <a:r>
-              <a:rPr lang="en-US" dirty="0" smtClean="0"/>
-              <a:t>Gives a sense of the distribution</a:t>
-            </a:r>
-          </a:p>
-          <a:p>
-            <a:pPr marL="0" indent="0">
-              <a:buNone/>
-            </a:pPr>
-            <a:endParaRPr lang="en-US" dirty="0" smtClean="0"/>
-          </a:p>
-          <a:p>
-            <a:endParaRPr lang="en-US" dirty="0"/>
+              <a:rPr lang="en-US" dirty="0"/>
+              <a:t>Summary: Steps So Far</a:t>
+            </a:r>
           </a:p>
         </p:txBody>
       </p:sp>
@@ -26357,130 +26251,6 @@
             <a:fld id="{17E276FA-8F89-B34D-A726-BE3FA1F8DD97}" type="slidenum">
               <a:rPr lang="en-US" smtClean="0"/>
               <a:t>35</a:t>
-            </a:fld>
-            <a:endParaRPr lang="en-US" dirty="0"/>
-          </a:p>
-        </p:txBody>
-      </p:sp>
-    </p:spTree>
-    <p:extLst>
-      <p:ext uri="{BB962C8B-B14F-4D97-AF65-F5344CB8AC3E}">
-        <p14:creationId xmlns:p14="http://schemas.microsoft.com/office/powerpoint/2010/main" val="721130924"/>
-      </p:ext>
-    </p:extLst>
-  </p:cSld>
-  <p:clrMapOvr>
-    <a:masterClrMapping/>
-  </p:clrMapOvr>
-  <p:timing>
-    <p:tnLst>
-      <p:par>
-        <p:cTn xmlns:p14="http://schemas.microsoft.com/office/powerpoint/2010/main" id="1" dur="indefinite" restart="never" nodeType="tmRoot"/>
-      </p:par>
-    </p:tnLst>
-  </p:timing>
-</p:sld>
-</file>
-
-<file path=ppt/slides/slide36.xml><?xml version="1.0" encoding="utf-8"?>
-<p:sld xmlns:a="http://schemas.openxmlformats.org/drawingml/2006/main" xmlns:r="http://schemas.openxmlformats.org/officeDocument/2006/relationships" xmlns:p="http://schemas.openxmlformats.org/presentationml/2006/main">
-  <p:cSld>
-    <p:spTree>
-      <p:nvGrpSpPr>
-        <p:cNvPr id="1" name=""/>
-        <p:cNvGrpSpPr/>
-        <p:nvPr/>
-      </p:nvGrpSpPr>
-      <p:grpSpPr>
-        <a:xfrm>
-          <a:off x="0" y="0"/>
-          <a:ext cx="0" cy="0"/>
-          <a:chOff x="0" y="0"/>
-          <a:chExt cx="0" cy="0"/>
-        </a:xfrm>
-      </p:grpSpPr>
-      <p:sp>
-        <p:nvSpPr>
-          <p:cNvPr id="2" name="Title 1"/>
-          <p:cNvSpPr>
-            <a:spLocks noGrp="1"/>
-          </p:cNvSpPr>
-          <p:nvPr>
-            <p:ph type="title"/>
-          </p:nvPr>
-        </p:nvSpPr>
-        <p:spPr/>
-        <p:txBody>
-          <a:bodyPr/>
-          <a:lstStyle/>
-          <a:p>
-            <a:r>
-              <a:rPr lang="en-US" dirty="0"/>
-              <a:t>Summary: Steps So Far</a:t>
-            </a:r>
-          </a:p>
-        </p:txBody>
-      </p:sp>
-      <p:sp>
-        <p:nvSpPr>
-          <p:cNvPr id="4" name="Date Placeholder 3"/>
-          <p:cNvSpPr>
-            <a:spLocks noGrp="1"/>
-          </p:cNvSpPr>
-          <p:nvPr>
-            <p:ph type="dt" sz="half" idx="10"/>
-          </p:nvPr>
-        </p:nvSpPr>
-        <p:spPr/>
-        <p:txBody>
-          <a:bodyPr/>
-          <a:lstStyle/>
-          <a:p>
-            <a:fld id="{7053BEFA-1175-F644-B249-7D41D72BD3FF}" type="datetime1">
-              <a:rPr lang="en-US" smtClean="0"/>
-              <a:t>1/30/14</a:t>
-            </a:fld>
-            <a:endParaRPr lang="en-US"/>
-          </a:p>
-        </p:txBody>
-      </p:sp>
-      <p:sp>
-        <p:nvSpPr>
-          <p:cNvPr id="5" name="Footer Placeholder 4"/>
-          <p:cNvSpPr>
-            <a:spLocks noGrp="1"/>
-          </p:cNvSpPr>
-          <p:nvPr>
-            <p:ph type="ftr" sz="quarter" idx="11"/>
-          </p:nvPr>
-        </p:nvSpPr>
-        <p:spPr/>
-        <p:txBody>
-          <a:bodyPr/>
-          <a:lstStyle/>
-          <a:p>
-            <a:endParaRPr lang="en-US" dirty="0"/>
-          </a:p>
-        </p:txBody>
-      </p:sp>
-      <p:sp>
-        <p:nvSpPr>
-          <p:cNvPr id="6" name="Slide Number Placeholder 5"/>
-          <p:cNvSpPr>
-            <a:spLocks noGrp="1"/>
-          </p:cNvSpPr>
-          <p:nvPr>
-            <p:ph type="sldNum" sz="quarter" idx="12"/>
-          </p:nvPr>
-        </p:nvSpPr>
-        <p:spPr/>
-        <p:txBody>
-          <a:bodyPr/>
-          <a:lstStyle/>
-          <a:p>
-            <a:fld id="{17E276FA-8F89-B34D-A726-BE3FA1F8DD97}" type="slidenum">
-              <a:rPr lang="en-US" smtClean="0"/>
-              <a:t>36</a:t>
             </a:fld>
             <a:endParaRPr lang="en-US" dirty="0"/>
           </a:p>

</xml_diff>

<commit_message>
Updates to lectures for statistics and byte 4
</commit_message>
<xml_diff>
--- a/Lectures/6 Exploration.pptx
+++ b/Lectures/6 Exploration.pptx
@@ -1992,1073 +1992,6 @@
       <dsp:cNvGrpSpPr/>
     </dsp:nvGrpSpPr>
     <dsp:grpSpPr/>
-    <dsp:sp modelId="{5E1494A8-77FB-CC45-AD26-121A0E33EB57}">
-      <dsp:nvSpPr>
-        <dsp:cNvPr id="0" name=""/>
-        <dsp:cNvSpPr/>
-      </dsp:nvSpPr>
-      <dsp:spPr>
-        <a:xfrm>
-          <a:off x="6557" y="1595804"/>
-          <a:ext cx="1440811" cy="1188367"/>
-        </a:xfrm>
-        <a:prstGeom prst="roundRect">
-          <a:avLst>
-            <a:gd name="adj" fmla="val 10000"/>
-          </a:avLst>
-        </a:prstGeom>
-        <a:solidFill>
-          <a:schemeClr val="lt1">
-            <a:alpha val="90000"/>
-            <a:hueOff val="0"/>
-            <a:satOff val="0"/>
-            <a:lumOff val="0"/>
-            <a:alphaOff val="0"/>
-          </a:schemeClr>
-        </a:solidFill>
-        <a:ln w="25400" cap="flat" cmpd="sng" algn="ctr">
-          <a:solidFill>
-            <a:schemeClr val="accent1">
-              <a:hueOff val="0"/>
-              <a:satOff val="0"/>
-              <a:lumOff val="0"/>
-              <a:alphaOff val="0"/>
-            </a:schemeClr>
-          </a:solidFill>
-          <a:prstDash val="solid"/>
-        </a:ln>
-        <a:effectLst/>
-      </dsp:spPr>
-      <dsp:style>
-        <a:lnRef idx="2">
-          <a:scrgbClr r="0" g="0" b="0"/>
-        </a:lnRef>
-        <a:fillRef idx="1">
-          <a:scrgbClr r="0" g="0" b="0"/>
-        </a:fillRef>
-        <a:effectRef idx="0">
-          <a:scrgbClr r="0" g="0" b="0"/>
-        </a:effectRef>
-        <a:fontRef idx="minor"/>
-      </dsp:style>
-      <dsp:txBody>
-        <a:bodyPr spcFirstLastPara="0" vert="horz" wrap="square" lIns="20955" tIns="20955" rIns="20955" bIns="20955" numCol="1" spcCol="1270" anchor="t" anchorCtr="0">
-          <a:noAutofit/>
-        </a:bodyPr>
-        <a:lstStyle/>
-        <a:p>
-          <a:pPr marL="57150" lvl="1" indent="-57150" algn="l" defTabSz="488950">
-            <a:lnSpc>
-              <a:spcPct val="90000"/>
-            </a:lnSpc>
-            <a:spcBef>
-              <a:spcPct val="0"/>
-            </a:spcBef>
-            <a:spcAft>
-              <a:spcPct val="15000"/>
-            </a:spcAft>
-            <a:buChar char="••"/>
-          </a:pPr>
-          <a:r>
-            <a:rPr lang="en-US" sz="1100" kern="1200" dirty="0" smtClean="0"/>
-            <a:t>Is it the right question?</a:t>
-          </a:r>
-          <a:endParaRPr lang="en-US" sz="1100" kern="1200" dirty="0"/>
-        </a:p>
-        <a:p>
-          <a:pPr marL="57150" lvl="1" indent="-57150" algn="l" defTabSz="488950">
-            <a:lnSpc>
-              <a:spcPct val="90000"/>
-            </a:lnSpc>
-            <a:spcBef>
-              <a:spcPct val="0"/>
-            </a:spcBef>
-            <a:spcAft>
-              <a:spcPct val="15000"/>
-            </a:spcAft>
-            <a:buChar char="••"/>
-          </a:pPr>
-          <a:r>
-            <a:rPr lang="en-US" sz="1100" kern="1200" dirty="0" smtClean="0"/>
-            <a:t>Is it answerable?</a:t>
-          </a:r>
-          <a:endParaRPr lang="en-US" sz="1100" kern="1200" dirty="0"/>
-        </a:p>
-      </dsp:txBody>
-      <dsp:txXfrm>
-        <a:off x="33905" y="1623152"/>
-        <a:ext cx="1386115" cy="879021"/>
-      </dsp:txXfrm>
-    </dsp:sp>
-    <dsp:sp modelId="{C34A02AC-E43B-E64A-98B7-D7F0F68A5B18}">
-      <dsp:nvSpPr>
-        <dsp:cNvPr id="0" name=""/>
-        <dsp:cNvSpPr/>
-      </dsp:nvSpPr>
-      <dsp:spPr>
-        <a:xfrm>
-          <a:off x="812945" y="1866947"/>
-          <a:ext cx="1606511" cy="1606511"/>
-        </a:xfrm>
-        <a:prstGeom prst="leftCircularArrow">
-          <a:avLst>
-            <a:gd name="adj1" fmla="val 3263"/>
-            <a:gd name="adj2" fmla="val 402578"/>
-            <a:gd name="adj3" fmla="val 2178089"/>
-            <a:gd name="adj4" fmla="val 9024489"/>
-            <a:gd name="adj5" fmla="val 3807"/>
-          </a:avLst>
-        </a:prstGeom>
-        <a:solidFill>
-          <a:schemeClr val="accent1">
-            <a:tint val="60000"/>
-            <a:hueOff val="0"/>
-            <a:satOff val="0"/>
-            <a:lumOff val="0"/>
-            <a:alphaOff val="0"/>
-          </a:schemeClr>
-        </a:solidFill>
-        <a:ln>
-          <a:noFill/>
-        </a:ln>
-        <a:effectLst/>
-      </dsp:spPr>
-      <dsp:style>
-        <a:lnRef idx="0">
-          <a:scrgbClr r="0" g="0" b="0"/>
-        </a:lnRef>
-        <a:fillRef idx="1">
-          <a:scrgbClr r="0" g="0" b="0"/>
-        </a:fillRef>
-        <a:effectRef idx="0">
-          <a:scrgbClr r="0" g="0" b="0"/>
-        </a:effectRef>
-        <a:fontRef idx="minor">
-          <a:schemeClr val="lt1"/>
-        </a:fontRef>
-      </dsp:style>
-    </dsp:sp>
-    <dsp:sp modelId="{76846BB1-C877-DA42-B78C-85598899D6F0}">
-      <dsp:nvSpPr>
-        <dsp:cNvPr id="0" name=""/>
-        <dsp:cNvSpPr/>
-      </dsp:nvSpPr>
-      <dsp:spPr>
-        <a:xfrm>
-          <a:off x="326738" y="2529521"/>
-          <a:ext cx="1280721" cy="509300"/>
-        </a:xfrm>
-        <a:prstGeom prst="roundRect">
-          <a:avLst>
-            <a:gd name="adj" fmla="val 10000"/>
-          </a:avLst>
-        </a:prstGeom>
-        <a:solidFill>
-          <a:schemeClr val="accent1">
-            <a:hueOff val="0"/>
-            <a:satOff val="0"/>
-            <a:lumOff val="0"/>
-            <a:alphaOff val="0"/>
-          </a:schemeClr>
-        </a:solidFill>
-        <a:ln w="25400" cap="flat" cmpd="sng" algn="ctr">
-          <a:solidFill>
-            <a:schemeClr val="lt1">
-              <a:hueOff val="0"/>
-              <a:satOff val="0"/>
-              <a:lumOff val="0"/>
-              <a:alphaOff val="0"/>
-            </a:schemeClr>
-          </a:solidFill>
-          <a:prstDash val="solid"/>
-        </a:ln>
-        <a:effectLst/>
-      </dsp:spPr>
-      <dsp:style>
-        <a:lnRef idx="2">
-          <a:scrgbClr r="0" g="0" b="0"/>
-        </a:lnRef>
-        <a:fillRef idx="1">
-          <a:scrgbClr r="0" g="0" b="0"/>
-        </a:fillRef>
-        <a:effectRef idx="0">
-          <a:scrgbClr r="0" g="0" b="0"/>
-        </a:effectRef>
-        <a:fontRef idx="minor">
-          <a:schemeClr val="lt1"/>
-        </a:fontRef>
-      </dsp:style>
-      <dsp:txBody>
-        <a:bodyPr spcFirstLastPara="0" vert="horz" wrap="square" lIns="34290" tIns="22860" rIns="34290" bIns="22860" numCol="1" spcCol="1270" anchor="ctr" anchorCtr="0">
-          <a:noAutofit/>
-        </a:bodyPr>
-        <a:lstStyle/>
-        <a:p>
-          <a:pPr lvl="0" algn="ctr" defTabSz="800100">
-            <a:lnSpc>
-              <a:spcPct val="90000"/>
-            </a:lnSpc>
-            <a:spcBef>
-              <a:spcPct val="0"/>
-            </a:spcBef>
-            <a:spcAft>
-              <a:spcPct val="35000"/>
-            </a:spcAft>
-          </a:pPr>
-          <a:r>
-            <a:rPr lang="en-US" sz="1800" kern="1200" smtClean="0"/>
-            <a:t>Question</a:t>
-          </a:r>
-          <a:endParaRPr lang="en-US" sz="1800" kern="1200" dirty="0"/>
-        </a:p>
-      </dsp:txBody>
-      <dsp:txXfrm>
-        <a:off x="341655" y="2544438"/>
-        <a:ext cx="1250887" cy="479466"/>
-      </dsp:txXfrm>
-    </dsp:sp>
-    <dsp:sp modelId="{D8D23966-ECBC-C144-B897-AFC029FA32FB}">
-      <dsp:nvSpPr>
-        <dsp:cNvPr id="0" name=""/>
-        <dsp:cNvSpPr/>
-      </dsp:nvSpPr>
-      <dsp:spPr>
-        <a:xfrm>
-          <a:off x="1857074" y="1595804"/>
-          <a:ext cx="1440811" cy="1188367"/>
-        </a:xfrm>
-        <a:prstGeom prst="roundRect">
-          <a:avLst>
-            <a:gd name="adj" fmla="val 10000"/>
-          </a:avLst>
-        </a:prstGeom>
-        <a:solidFill>
-          <a:schemeClr val="lt1">
-            <a:alpha val="90000"/>
-            <a:hueOff val="0"/>
-            <a:satOff val="0"/>
-            <a:lumOff val="0"/>
-            <a:alphaOff val="0"/>
-          </a:schemeClr>
-        </a:solidFill>
-        <a:ln w="25400" cap="flat" cmpd="sng" algn="ctr">
-          <a:solidFill>
-            <a:schemeClr val="accent1">
-              <a:hueOff val="0"/>
-              <a:satOff val="0"/>
-              <a:lumOff val="0"/>
-              <a:alphaOff val="0"/>
-            </a:schemeClr>
-          </a:solidFill>
-          <a:prstDash val="solid"/>
-        </a:ln>
-        <a:effectLst/>
-      </dsp:spPr>
-      <dsp:style>
-        <a:lnRef idx="2">
-          <a:scrgbClr r="0" g="0" b="0"/>
-        </a:lnRef>
-        <a:fillRef idx="1">
-          <a:scrgbClr r="0" g="0" b="0"/>
-        </a:fillRef>
-        <a:effectRef idx="0">
-          <a:scrgbClr r="0" g="0" b="0"/>
-        </a:effectRef>
-        <a:fontRef idx="minor"/>
-      </dsp:style>
-      <dsp:txBody>
-        <a:bodyPr spcFirstLastPara="0" vert="horz" wrap="square" lIns="20955" tIns="20955" rIns="20955" bIns="20955" numCol="1" spcCol="1270" anchor="t" anchorCtr="0">
-          <a:noAutofit/>
-        </a:bodyPr>
-        <a:lstStyle/>
-        <a:p>
-          <a:pPr marL="57150" lvl="1" indent="-57150" algn="l" defTabSz="488950">
-            <a:lnSpc>
-              <a:spcPct val="90000"/>
-            </a:lnSpc>
-            <a:spcBef>
-              <a:spcPct val="0"/>
-            </a:spcBef>
-            <a:spcAft>
-              <a:spcPct val="15000"/>
-            </a:spcAft>
-            <a:buChar char="••"/>
-          </a:pPr>
-          <a:r>
-            <a:rPr lang="en-US" sz="1100" kern="1200" dirty="0" smtClean="0"/>
-            <a:t>Is it the right data for the question?</a:t>
-          </a:r>
-          <a:endParaRPr lang="en-US" sz="1100" kern="1200" dirty="0"/>
-        </a:p>
-        <a:p>
-          <a:pPr marL="57150" lvl="1" indent="-57150" algn="l" defTabSz="488950">
-            <a:lnSpc>
-              <a:spcPct val="90000"/>
-            </a:lnSpc>
-            <a:spcBef>
-              <a:spcPct val="0"/>
-            </a:spcBef>
-            <a:spcAft>
-              <a:spcPct val="15000"/>
-            </a:spcAft>
-            <a:buChar char="••"/>
-          </a:pPr>
-          <a:r>
-            <a:rPr lang="en-US" sz="1100" kern="1200" dirty="0" smtClean="0"/>
-            <a:t>How hard/easy is it to collect?</a:t>
-          </a:r>
-          <a:endParaRPr lang="en-US" sz="1100" kern="1200" dirty="0"/>
-        </a:p>
-        <a:p>
-          <a:pPr marL="57150" lvl="1" indent="-57150" algn="l" defTabSz="488950">
-            <a:lnSpc>
-              <a:spcPct val="90000"/>
-            </a:lnSpc>
-            <a:spcBef>
-              <a:spcPct val="0"/>
-            </a:spcBef>
-            <a:spcAft>
-              <a:spcPct val="15000"/>
-            </a:spcAft>
-            <a:buChar char="••"/>
-          </a:pPr>
-          <a:r>
-            <a:rPr lang="en-US" sz="1100" kern="1200" dirty="0" smtClean="0"/>
-            <a:t>Understand the fields</a:t>
-          </a:r>
-          <a:endParaRPr lang="en-US" sz="1100" kern="1200" dirty="0"/>
-        </a:p>
-      </dsp:txBody>
-      <dsp:txXfrm>
-        <a:off x="1884422" y="1877802"/>
-        <a:ext cx="1386115" cy="879021"/>
-      </dsp:txXfrm>
-    </dsp:sp>
-    <dsp:sp modelId="{AF52B1F5-AB63-0D48-B810-E413F876CDB0}">
-      <dsp:nvSpPr>
-        <dsp:cNvPr id="0" name=""/>
-        <dsp:cNvSpPr/>
-      </dsp:nvSpPr>
-      <dsp:spPr>
-        <a:xfrm>
-          <a:off x="2651455" y="859922"/>
-          <a:ext cx="1790614" cy="1790614"/>
-        </a:xfrm>
-        <a:prstGeom prst="circularArrow">
-          <a:avLst>
-            <a:gd name="adj1" fmla="val 2927"/>
-            <a:gd name="adj2" fmla="val 358341"/>
-            <a:gd name="adj3" fmla="val 19466149"/>
-            <a:gd name="adj4" fmla="val 12575511"/>
-            <a:gd name="adj5" fmla="val 3415"/>
-          </a:avLst>
-        </a:prstGeom>
-        <a:solidFill>
-          <a:schemeClr val="accent1">
-            <a:tint val="60000"/>
-            <a:hueOff val="0"/>
-            <a:satOff val="0"/>
-            <a:lumOff val="0"/>
-            <a:alphaOff val="0"/>
-          </a:schemeClr>
-        </a:solidFill>
-        <a:ln>
-          <a:noFill/>
-        </a:ln>
-        <a:effectLst/>
-      </dsp:spPr>
-      <dsp:style>
-        <a:lnRef idx="0">
-          <a:scrgbClr r="0" g="0" b="0"/>
-        </a:lnRef>
-        <a:fillRef idx="1">
-          <a:scrgbClr r="0" g="0" b="0"/>
-        </a:fillRef>
-        <a:effectRef idx="0">
-          <a:scrgbClr r="0" g="0" b="0"/>
-        </a:effectRef>
-        <a:fontRef idx="minor">
-          <a:schemeClr val="lt1"/>
-        </a:fontRef>
-      </dsp:style>
-    </dsp:sp>
-    <dsp:sp modelId="{0A1C6453-319F-7146-9DCF-C8845C38D472}">
-      <dsp:nvSpPr>
-        <dsp:cNvPr id="0" name=""/>
-        <dsp:cNvSpPr/>
-      </dsp:nvSpPr>
-      <dsp:spPr>
-        <a:xfrm>
-          <a:off x="2177254" y="1341153"/>
-          <a:ext cx="1280721" cy="509300"/>
-        </a:xfrm>
-        <a:prstGeom prst="roundRect">
-          <a:avLst>
-            <a:gd name="adj" fmla="val 10000"/>
-          </a:avLst>
-        </a:prstGeom>
-        <a:solidFill>
-          <a:schemeClr val="accent1">
-            <a:hueOff val="0"/>
-            <a:satOff val="0"/>
-            <a:lumOff val="0"/>
-            <a:alphaOff val="0"/>
-          </a:schemeClr>
-        </a:solidFill>
-        <a:ln w="25400" cap="flat" cmpd="sng" algn="ctr">
-          <a:solidFill>
-            <a:schemeClr val="lt1">
-              <a:hueOff val="0"/>
-              <a:satOff val="0"/>
-              <a:lumOff val="0"/>
-              <a:alphaOff val="0"/>
-            </a:schemeClr>
-          </a:solidFill>
-          <a:prstDash val="solid"/>
-        </a:ln>
-        <a:effectLst/>
-      </dsp:spPr>
-      <dsp:style>
-        <a:lnRef idx="2">
-          <a:scrgbClr r="0" g="0" b="0"/>
-        </a:lnRef>
-        <a:fillRef idx="1">
-          <a:scrgbClr r="0" g="0" b="0"/>
-        </a:fillRef>
-        <a:effectRef idx="0">
-          <a:scrgbClr r="0" g="0" b="0"/>
-        </a:effectRef>
-        <a:fontRef idx="minor">
-          <a:schemeClr val="lt1"/>
-        </a:fontRef>
-      </dsp:style>
-      <dsp:txBody>
-        <a:bodyPr spcFirstLastPara="0" vert="horz" wrap="square" lIns="34290" tIns="22860" rIns="34290" bIns="22860" numCol="1" spcCol="1270" anchor="ctr" anchorCtr="0">
-          <a:noAutofit/>
-        </a:bodyPr>
-        <a:lstStyle/>
-        <a:p>
-          <a:pPr lvl="0" algn="ctr" defTabSz="800100">
-            <a:lnSpc>
-              <a:spcPct val="90000"/>
-            </a:lnSpc>
-            <a:spcBef>
-              <a:spcPct val="0"/>
-            </a:spcBef>
-            <a:spcAft>
-              <a:spcPct val="35000"/>
-            </a:spcAft>
-          </a:pPr>
-          <a:r>
-            <a:rPr lang="en-US" sz="1800" kern="1200" dirty="0" smtClean="0"/>
-            <a:t>Collect Data </a:t>
-          </a:r>
-          <a:endParaRPr lang="en-US" sz="1800" kern="1200" dirty="0"/>
-        </a:p>
-      </dsp:txBody>
-      <dsp:txXfrm>
-        <a:off x="2192171" y="1356070"/>
-        <a:ext cx="1250887" cy="479466"/>
-      </dsp:txXfrm>
-    </dsp:sp>
-    <dsp:sp modelId="{D6870E45-591C-7C42-BE64-B49D1CBE90D5}">
-      <dsp:nvSpPr>
-        <dsp:cNvPr id="0" name=""/>
-        <dsp:cNvSpPr/>
-      </dsp:nvSpPr>
-      <dsp:spPr>
-        <a:xfrm>
-          <a:off x="3707590" y="1595804"/>
-          <a:ext cx="1440811" cy="1188367"/>
-        </a:xfrm>
-        <a:prstGeom prst="roundRect">
-          <a:avLst>
-            <a:gd name="adj" fmla="val 10000"/>
-          </a:avLst>
-        </a:prstGeom>
-        <a:solidFill>
-          <a:schemeClr val="lt1">
-            <a:alpha val="90000"/>
-            <a:hueOff val="0"/>
-            <a:satOff val="0"/>
-            <a:lumOff val="0"/>
-            <a:alphaOff val="0"/>
-          </a:schemeClr>
-        </a:solidFill>
-        <a:ln w="25400" cap="flat" cmpd="sng" algn="ctr">
-          <a:solidFill>
-            <a:schemeClr val="accent1">
-              <a:hueOff val="0"/>
-              <a:satOff val="0"/>
-              <a:lumOff val="0"/>
-              <a:alphaOff val="0"/>
-            </a:schemeClr>
-          </a:solidFill>
-          <a:prstDash val="solid"/>
-        </a:ln>
-        <a:effectLst/>
-      </dsp:spPr>
-      <dsp:style>
-        <a:lnRef idx="2">
-          <a:scrgbClr r="0" g="0" b="0"/>
-        </a:lnRef>
-        <a:fillRef idx="1">
-          <a:scrgbClr r="0" g="0" b="0"/>
-        </a:fillRef>
-        <a:effectRef idx="0">
-          <a:scrgbClr r="0" g="0" b="0"/>
-        </a:effectRef>
-        <a:fontRef idx="minor"/>
-      </dsp:style>
-      <dsp:txBody>
-        <a:bodyPr spcFirstLastPara="0" vert="horz" wrap="square" lIns="20955" tIns="20955" rIns="20955" bIns="20955" numCol="1" spcCol="1270" anchor="t" anchorCtr="0">
-          <a:noAutofit/>
-        </a:bodyPr>
-        <a:lstStyle/>
-        <a:p>
-          <a:pPr marL="57150" lvl="1" indent="-57150" algn="l" defTabSz="488950">
-            <a:lnSpc>
-              <a:spcPct val="90000"/>
-            </a:lnSpc>
-            <a:spcBef>
-              <a:spcPct val="0"/>
-            </a:spcBef>
-            <a:spcAft>
-              <a:spcPct val="15000"/>
-            </a:spcAft>
-            <a:buChar char="••"/>
-          </a:pPr>
-          <a:r>
-            <a:rPr lang="en-US" sz="1100" kern="1200" dirty="0" smtClean="0"/>
-            <a:t>What flaws exist in the data?</a:t>
-          </a:r>
-          <a:endParaRPr lang="en-US" sz="1100" kern="1200" dirty="0"/>
-        </a:p>
-        <a:p>
-          <a:pPr marL="57150" lvl="1" indent="-57150" algn="l" defTabSz="488950">
-            <a:lnSpc>
-              <a:spcPct val="90000"/>
-            </a:lnSpc>
-            <a:spcBef>
-              <a:spcPct val="0"/>
-            </a:spcBef>
-            <a:spcAft>
-              <a:spcPct val="15000"/>
-            </a:spcAft>
-            <a:buChar char="••"/>
-          </a:pPr>
-          <a:r>
-            <a:rPr lang="en-US" sz="1100" kern="1200" dirty="0" smtClean="0"/>
-            <a:t>Check and address the four Cs</a:t>
-          </a:r>
-          <a:endParaRPr lang="en-US" sz="1100" kern="1200" dirty="0"/>
-        </a:p>
-      </dsp:txBody>
-      <dsp:txXfrm>
-        <a:off x="3734938" y="1623152"/>
-        <a:ext cx="1386115" cy="879021"/>
-      </dsp:txXfrm>
-    </dsp:sp>
-    <dsp:sp modelId="{4CAF90A0-856A-FD40-B080-658D7F5A9A85}">
-      <dsp:nvSpPr>
-        <dsp:cNvPr id="0" name=""/>
-        <dsp:cNvSpPr/>
-      </dsp:nvSpPr>
-      <dsp:spPr>
-        <a:xfrm>
-          <a:off x="4513978" y="1866947"/>
-          <a:ext cx="1606511" cy="1606511"/>
-        </a:xfrm>
-        <a:prstGeom prst="leftCircularArrow">
-          <a:avLst>
-            <a:gd name="adj1" fmla="val 3263"/>
-            <a:gd name="adj2" fmla="val 402578"/>
-            <a:gd name="adj3" fmla="val 2178089"/>
-            <a:gd name="adj4" fmla="val 9024489"/>
-            <a:gd name="adj5" fmla="val 3807"/>
-          </a:avLst>
-        </a:prstGeom>
-        <a:solidFill>
-          <a:schemeClr val="accent1">
-            <a:tint val="60000"/>
-            <a:hueOff val="0"/>
-            <a:satOff val="0"/>
-            <a:lumOff val="0"/>
-            <a:alphaOff val="0"/>
-          </a:schemeClr>
-        </a:solidFill>
-        <a:ln>
-          <a:noFill/>
-        </a:ln>
-        <a:effectLst/>
-      </dsp:spPr>
-      <dsp:style>
-        <a:lnRef idx="0">
-          <a:scrgbClr r="0" g="0" b="0"/>
-        </a:lnRef>
-        <a:fillRef idx="1">
-          <a:scrgbClr r="0" g="0" b="0"/>
-        </a:fillRef>
-        <a:effectRef idx="0">
-          <a:scrgbClr r="0" g="0" b="0"/>
-        </a:effectRef>
-        <a:fontRef idx="minor">
-          <a:schemeClr val="lt1"/>
-        </a:fontRef>
-      </dsp:style>
-    </dsp:sp>
-    <dsp:sp modelId="{28D77D5E-313D-6148-8C77-DA201CE1F97F}">
-      <dsp:nvSpPr>
-        <dsp:cNvPr id="0" name=""/>
-        <dsp:cNvSpPr/>
-      </dsp:nvSpPr>
-      <dsp:spPr>
-        <a:xfrm>
-          <a:off x="4027771" y="2529521"/>
-          <a:ext cx="1280721" cy="509300"/>
-        </a:xfrm>
-        <a:prstGeom prst="roundRect">
-          <a:avLst>
-            <a:gd name="adj" fmla="val 10000"/>
-          </a:avLst>
-        </a:prstGeom>
-        <a:solidFill>
-          <a:schemeClr val="accent1">
-            <a:hueOff val="0"/>
-            <a:satOff val="0"/>
-            <a:lumOff val="0"/>
-            <a:alphaOff val="0"/>
-          </a:schemeClr>
-        </a:solidFill>
-        <a:ln w="25400" cap="flat" cmpd="sng" algn="ctr">
-          <a:solidFill>
-            <a:schemeClr val="lt1">
-              <a:hueOff val="0"/>
-              <a:satOff val="0"/>
-              <a:lumOff val="0"/>
-              <a:alphaOff val="0"/>
-            </a:schemeClr>
-          </a:solidFill>
-          <a:prstDash val="solid"/>
-        </a:ln>
-        <a:effectLst/>
-      </dsp:spPr>
-      <dsp:style>
-        <a:lnRef idx="2">
-          <a:scrgbClr r="0" g="0" b="0"/>
-        </a:lnRef>
-        <a:fillRef idx="1">
-          <a:scrgbClr r="0" g="0" b="0"/>
-        </a:fillRef>
-        <a:effectRef idx="0">
-          <a:scrgbClr r="0" g="0" b="0"/>
-        </a:effectRef>
-        <a:fontRef idx="minor">
-          <a:schemeClr val="lt1"/>
-        </a:fontRef>
-      </dsp:style>
-      <dsp:txBody>
-        <a:bodyPr spcFirstLastPara="0" vert="horz" wrap="square" lIns="34290" tIns="22860" rIns="34290" bIns="22860" numCol="1" spcCol="1270" anchor="ctr" anchorCtr="0">
-          <a:noAutofit/>
-        </a:bodyPr>
-        <a:lstStyle/>
-        <a:p>
-          <a:pPr lvl="0" algn="ctr" defTabSz="800100">
-            <a:lnSpc>
-              <a:spcPct val="90000"/>
-            </a:lnSpc>
-            <a:spcBef>
-              <a:spcPct val="0"/>
-            </a:spcBef>
-            <a:spcAft>
-              <a:spcPct val="35000"/>
-            </a:spcAft>
-          </a:pPr>
-          <a:r>
-            <a:rPr lang="en-US" sz="1800" kern="1200" dirty="0" smtClean="0"/>
-            <a:t>Clean Data</a:t>
-          </a:r>
-          <a:endParaRPr lang="en-US" sz="1800" kern="1200" dirty="0"/>
-        </a:p>
-      </dsp:txBody>
-      <dsp:txXfrm>
-        <a:off x="4042688" y="2544438"/>
-        <a:ext cx="1250887" cy="479466"/>
-      </dsp:txXfrm>
-    </dsp:sp>
-    <dsp:sp modelId="{B0DDEC13-ACE4-4742-AF15-9777191C54CE}">
-      <dsp:nvSpPr>
-        <dsp:cNvPr id="0" name=""/>
-        <dsp:cNvSpPr/>
-      </dsp:nvSpPr>
-      <dsp:spPr>
-        <a:xfrm>
-          <a:off x="5558107" y="1595804"/>
-          <a:ext cx="1440811" cy="1188367"/>
-        </a:xfrm>
-        <a:prstGeom prst="roundRect">
-          <a:avLst>
-            <a:gd name="adj" fmla="val 10000"/>
-          </a:avLst>
-        </a:prstGeom>
-        <a:solidFill>
-          <a:schemeClr val="lt1">
-            <a:alpha val="90000"/>
-            <a:hueOff val="0"/>
-            <a:satOff val="0"/>
-            <a:lumOff val="0"/>
-            <a:alphaOff val="0"/>
-          </a:schemeClr>
-        </a:solidFill>
-        <a:ln w="25400" cap="flat" cmpd="sng" algn="ctr">
-          <a:solidFill>
-            <a:schemeClr val="accent1">
-              <a:hueOff val="0"/>
-              <a:satOff val="0"/>
-              <a:lumOff val="0"/>
-              <a:alphaOff val="0"/>
-            </a:schemeClr>
-          </a:solidFill>
-          <a:prstDash val="solid"/>
-        </a:ln>
-        <a:effectLst/>
-      </dsp:spPr>
-      <dsp:style>
-        <a:lnRef idx="2">
-          <a:scrgbClr r="0" g="0" b="0"/>
-        </a:lnRef>
-        <a:fillRef idx="1">
-          <a:scrgbClr r="0" g="0" b="0"/>
-        </a:fillRef>
-        <a:effectRef idx="0">
-          <a:scrgbClr r="0" g="0" b="0"/>
-        </a:effectRef>
-        <a:fontRef idx="minor"/>
-      </dsp:style>
-      <dsp:txBody>
-        <a:bodyPr spcFirstLastPara="0" vert="horz" wrap="square" lIns="20955" tIns="20955" rIns="20955" bIns="20955" numCol="1" spcCol="1270" anchor="t" anchorCtr="0">
-          <a:noAutofit/>
-        </a:bodyPr>
-        <a:lstStyle/>
-        <a:p>
-          <a:pPr marL="57150" lvl="1" indent="-57150" algn="l" defTabSz="488950">
-            <a:lnSpc>
-              <a:spcPct val="90000"/>
-            </a:lnSpc>
-            <a:spcBef>
-              <a:spcPct val="0"/>
-            </a:spcBef>
-            <a:spcAft>
-              <a:spcPct val="15000"/>
-            </a:spcAft>
-            <a:buChar char="••"/>
-          </a:pPr>
-          <a:r>
-            <a:rPr lang="en-US" sz="1100" kern="1200" dirty="0" smtClean="0"/>
-            <a:t>Transform / delete variables</a:t>
-          </a:r>
-          <a:endParaRPr lang="en-US" sz="1100" kern="1200" dirty="0"/>
-        </a:p>
-        <a:p>
-          <a:pPr marL="57150" lvl="1" indent="-57150" algn="l" defTabSz="488950">
-            <a:lnSpc>
-              <a:spcPct val="90000"/>
-            </a:lnSpc>
-            <a:spcBef>
-              <a:spcPct val="0"/>
-            </a:spcBef>
-            <a:spcAft>
-              <a:spcPct val="15000"/>
-            </a:spcAft>
-            <a:buChar char="••"/>
-          </a:pPr>
-          <a:r>
-            <a:rPr lang="en-US" sz="1100" kern="1200" dirty="0" smtClean="0"/>
-            <a:t>Create subsets / views</a:t>
-          </a:r>
-          <a:endParaRPr lang="en-US" sz="1100" kern="1200" dirty="0"/>
-        </a:p>
-        <a:p>
-          <a:pPr marL="57150" lvl="1" indent="-57150" algn="l" defTabSz="488950">
-            <a:lnSpc>
-              <a:spcPct val="90000"/>
-            </a:lnSpc>
-            <a:spcBef>
-              <a:spcPct val="0"/>
-            </a:spcBef>
-            <a:spcAft>
-              <a:spcPct val="15000"/>
-            </a:spcAft>
-            <a:buChar char="••"/>
-          </a:pPr>
-          <a:r>
-            <a:rPr lang="en-US" sz="1100" kern="1200" dirty="0" smtClean="0"/>
-            <a:t>Visualize</a:t>
-          </a:r>
-          <a:endParaRPr lang="en-US" sz="1100" kern="1200" dirty="0"/>
-        </a:p>
-      </dsp:txBody>
-      <dsp:txXfrm>
-        <a:off x="5585455" y="1877802"/>
-        <a:ext cx="1386115" cy="879021"/>
-      </dsp:txXfrm>
-    </dsp:sp>
-    <dsp:sp modelId="{1924B303-8A8F-D04A-9B5A-F833EB6F6268}">
-      <dsp:nvSpPr>
-        <dsp:cNvPr id="0" name=""/>
-        <dsp:cNvSpPr/>
-      </dsp:nvSpPr>
-      <dsp:spPr>
-        <a:xfrm>
-          <a:off x="6352488" y="859922"/>
-          <a:ext cx="1790614" cy="1790614"/>
-        </a:xfrm>
-        <a:prstGeom prst="circularArrow">
-          <a:avLst>
-            <a:gd name="adj1" fmla="val 2927"/>
-            <a:gd name="adj2" fmla="val 358341"/>
-            <a:gd name="adj3" fmla="val 19466149"/>
-            <a:gd name="adj4" fmla="val 12575511"/>
-            <a:gd name="adj5" fmla="val 3415"/>
-          </a:avLst>
-        </a:prstGeom>
-        <a:solidFill>
-          <a:srgbClr val="FFFFFF"/>
-        </a:solidFill>
-        <a:ln>
-          <a:solidFill>
-            <a:srgbClr val="FFFFFF"/>
-          </a:solidFill>
-        </a:ln>
-        <a:effectLst/>
-      </dsp:spPr>
-      <dsp:style>
-        <a:lnRef idx="0">
-          <a:scrgbClr r="0" g="0" b="0"/>
-        </a:lnRef>
-        <a:fillRef idx="1">
-          <a:scrgbClr r="0" g="0" b="0"/>
-        </a:fillRef>
-        <a:effectRef idx="0">
-          <a:scrgbClr r="0" g="0" b="0"/>
-        </a:effectRef>
-        <a:fontRef idx="minor">
-          <a:schemeClr val="lt1"/>
-        </a:fontRef>
-      </dsp:style>
-    </dsp:sp>
-    <dsp:sp modelId="{961E70B4-4CE0-EC49-99DE-1D5C9F9F9D7C}">
-      <dsp:nvSpPr>
-        <dsp:cNvPr id="0" name=""/>
-        <dsp:cNvSpPr/>
-      </dsp:nvSpPr>
-      <dsp:spPr>
-        <a:xfrm>
-          <a:off x="5878287" y="1341153"/>
-          <a:ext cx="1280721" cy="509300"/>
-        </a:xfrm>
-        <a:prstGeom prst="roundRect">
-          <a:avLst>
-            <a:gd name="adj" fmla="val 10000"/>
-          </a:avLst>
-        </a:prstGeom>
-        <a:solidFill>
-          <a:schemeClr val="accent1">
-            <a:hueOff val="0"/>
-            <a:satOff val="0"/>
-            <a:lumOff val="0"/>
-            <a:alphaOff val="0"/>
-          </a:schemeClr>
-        </a:solidFill>
-        <a:ln w="25400" cap="flat" cmpd="sng" algn="ctr">
-          <a:solidFill>
-            <a:schemeClr val="lt1">
-              <a:hueOff val="0"/>
-              <a:satOff val="0"/>
-              <a:lumOff val="0"/>
-              <a:alphaOff val="0"/>
-            </a:schemeClr>
-          </a:solidFill>
-          <a:prstDash val="solid"/>
-        </a:ln>
-        <a:effectLst/>
-      </dsp:spPr>
-      <dsp:style>
-        <a:lnRef idx="2">
-          <a:scrgbClr r="0" g="0" b="0"/>
-        </a:lnRef>
-        <a:fillRef idx="1">
-          <a:scrgbClr r="0" g="0" b="0"/>
-        </a:fillRef>
-        <a:effectRef idx="0">
-          <a:scrgbClr r="0" g="0" b="0"/>
-        </a:effectRef>
-        <a:fontRef idx="minor">
-          <a:schemeClr val="lt1"/>
-        </a:fontRef>
-      </dsp:style>
-      <dsp:txBody>
-        <a:bodyPr spcFirstLastPara="0" vert="horz" wrap="square" lIns="34290" tIns="22860" rIns="34290" bIns="22860" numCol="1" spcCol="1270" anchor="ctr" anchorCtr="0">
-          <a:noAutofit/>
-        </a:bodyPr>
-        <a:lstStyle/>
-        <a:p>
-          <a:pPr lvl="0" algn="ctr" defTabSz="800100">
-            <a:lnSpc>
-              <a:spcPct val="90000"/>
-            </a:lnSpc>
-            <a:spcBef>
-              <a:spcPct val="0"/>
-            </a:spcBef>
-            <a:spcAft>
-              <a:spcPct val="35000"/>
-            </a:spcAft>
-          </a:pPr>
-          <a:r>
-            <a:rPr lang="en-US" sz="1800" kern="1200" dirty="0" smtClean="0"/>
-            <a:t>Explore Data</a:t>
-          </a:r>
-          <a:endParaRPr lang="en-US" sz="1800" kern="1200" dirty="0"/>
-        </a:p>
-      </dsp:txBody>
-      <dsp:txXfrm>
-        <a:off x="5893204" y="1356070"/>
-        <a:ext cx="1250887" cy="479466"/>
-      </dsp:txXfrm>
-    </dsp:sp>
-    <dsp:sp modelId="{EC4E25C6-C3D7-4B4B-8BC5-92A960D631E0}">
-      <dsp:nvSpPr>
-        <dsp:cNvPr id="0" name=""/>
-        <dsp:cNvSpPr/>
-      </dsp:nvSpPr>
-      <dsp:spPr>
-        <a:xfrm>
-          <a:off x="7408623" y="1595804"/>
-          <a:ext cx="1440811" cy="1188367"/>
-        </a:xfrm>
-        <a:prstGeom prst="roundRect">
-          <a:avLst>
-            <a:gd name="adj" fmla="val 10000"/>
-          </a:avLst>
-        </a:prstGeom>
-        <a:solidFill>
-          <a:srgbClr val="FFFFFF"/>
-        </a:solidFill>
-        <a:ln w="25400" cap="flat" cmpd="sng" algn="ctr">
-          <a:solidFill>
-            <a:srgbClr val="FFFFFF"/>
-          </a:solidFill>
-          <a:prstDash val="solid"/>
-        </a:ln>
-        <a:effectLst/>
-      </dsp:spPr>
-      <dsp:style>
-        <a:lnRef idx="2">
-          <a:scrgbClr r="0" g="0" b="0"/>
-        </a:lnRef>
-        <a:fillRef idx="1">
-          <a:scrgbClr r="0" g="0" b="0"/>
-        </a:fillRef>
-        <a:effectRef idx="0">
-          <a:scrgbClr r="0" g="0" b="0"/>
-        </a:effectRef>
-        <a:fontRef idx="minor"/>
-      </dsp:style>
-      <dsp:txBody>
-        <a:bodyPr spcFirstLastPara="0" vert="horz" wrap="square" lIns="20955" tIns="20955" rIns="20955" bIns="20955" numCol="1" spcCol="1270" anchor="t" anchorCtr="0">
-          <a:noAutofit/>
-        </a:bodyPr>
-        <a:lstStyle/>
-        <a:p>
-          <a:pPr marL="57150" lvl="1" indent="-57150" algn="l" defTabSz="488950">
-            <a:lnSpc>
-              <a:spcPct val="90000"/>
-            </a:lnSpc>
-            <a:spcBef>
-              <a:spcPct val="0"/>
-            </a:spcBef>
-            <a:spcAft>
-              <a:spcPct val="15000"/>
-            </a:spcAft>
-            <a:buChar char="••"/>
-          </a:pPr>
-          <a:endParaRPr lang="en-US" sz="1100" kern="1200" dirty="0"/>
-        </a:p>
-      </dsp:txBody>
-      <dsp:txXfrm>
-        <a:off x="7435971" y="1623152"/>
-        <a:ext cx="1386115" cy="879021"/>
-      </dsp:txXfrm>
-    </dsp:sp>
-    <dsp:sp modelId="{AF6505CF-267F-3E45-B6F3-BA7036ABB4F7}">
-      <dsp:nvSpPr>
-        <dsp:cNvPr id="0" name=""/>
-        <dsp:cNvSpPr/>
-      </dsp:nvSpPr>
-      <dsp:spPr>
-        <a:xfrm>
-          <a:off x="7728804" y="2529521"/>
-          <a:ext cx="1280721" cy="509300"/>
-        </a:xfrm>
-        <a:prstGeom prst="roundRect">
-          <a:avLst>
-            <a:gd name="adj" fmla="val 10000"/>
-          </a:avLst>
-        </a:prstGeom>
-        <a:solidFill>
-          <a:srgbClr val="FFFFFF"/>
-        </a:solidFill>
-        <a:ln w="25400" cap="flat" cmpd="sng" algn="ctr">
-          <a:solidFill>
-            <a:srgbClr val="FFFFFF"/>
-          </a:solidFill>
-          <a:prstDash val="solid"/>
-        </a:ln>
-        <a:effectLst/>
-      </dsp:spPr>
-      <dsp:style>
-        <a:lnRef idx="2">
-          <a:scrgbClr r="0" g="0" b="0"/>
-        </a:lnRef>
-        <a:fillRef idx="1">
-          <a:scrgbClr r="0" g="0" b="0"/>
-        </a:fillRef>
-        <a:effectRef idx="0">
-          <a:scrgbClr r="0" g="0" b="0"/>
-        </a:effectRef>
-        <a:fontRef idx="minor">
-          <a:schemeClr val="lt1"/>
-        </a:fontRef>
-      </dsp:style>
-      <dsp:txBody>
-        <a:bodyPr spcFirstLastPara="0" vert="horz" wrap="square" lIns="34290" tIns="22860" rIns="34290" bIns="22860" numCol="1" spcCol="1270" anchor="ctr" anchorCtr="0">
-          <a:noAutofit/>
-        </a:bodyPr>
-        <a:lstStyle/>
-        <a:p>
-          <a:pPr lvl="0" algn="ctr" defTabSz="800100">
-            <a:lnSpc>
-              <a:spcPct val="90000"/>
-            </a:lnSpc>
-            <a:spcBef>
-              <a:spcPct val="0"/>
-            </a:spcBef>
-            <a:spcAft>
-              <a:spcPct val="35000"/>
-            </a:spcAft>
-          </a:pPr>
-          <a:r>
-            <a:rPr lang="en-US" sz="1800" kern="1200" dirty="0" smtClean="0"/>
-            <a:t>Use data</a:t>
-          </a:r>
-          <a:endParaRPr lang="en-US" sz="1800" kern="1200" dirty="0"/>
-        </a:p>
-      </dsp:txBody>
-      <dsp:txXfrm>
-        <a:off x="7743721" y="2544438"/>
-        <a:ext cx="1250887" cy="479466"/>
-      </dsp:txXfrm>
-    </dsp:sp>
   </dsp:spTree>
 </dsp:drawing>
 </file>
@@ -4723,7 +3656,7 @@
           <a:p>
             <a:fld id="{D3AAB66F-B1B7-D045-B4E8-4F60236F228D}" type="datetimeFigureOut">
               <a:rPr lang="en-US" smtClean="0"/>
-              <a:t>1/30/14</a:t>
+              <a:t>2/20/14</a:t>
             </a:fld>
             <a:endParaRPr lang="en-US"/>
           </a:p>
@@ -4889,7 +3822,7 @@
           <a:p>
             <a:fld id="{BCCF8E76-06A6-164E-A6FA-EC32C13EB232}" type="datetimeFigureOut">
               <a:rPr lang="en-US" smtClean="0"/>
-              <a:t>1/30/14</a:t>
+              <a:t>2/20/14</a:t>
             </a:fld>
             <a:endParaRPr lang="en-US"/>
           </a:p>
@@ -6973,11 +5906,28 @@
               <a:rPr lang="en-US" baseline="0" dirty="0" smtClean="0"/>
               <a:t>Box is 25% </a:t>
             </a:r>
+          </a:p>
+          <a:p>
+            <a:r>
+              <a:rPr lang="en-US" baseline="0" dirty="0" smtClean="0"/>
+              <a:t>Line is median</a:t>
+            </a:r>
+          </a:p>
+          <a:p>
             <a:r>
               <a:rPr lang="en-US" baseline="0" smtClean="0"/>
-              <a:t>line is 75%</a:t>
-            </a:r>
-            <a:endParaRPr lang="en-US" dirty="0"/>
+              <a:t>Dots are </a:t>
+            </a:r>
+            <a:r>
+              <a:rPr lang="en-US" baseline="0" dirty="0" smtClean="0"/>
+              <a:t>outliers</a:t>
+            </a:r>
+          </a:p>
+          <a:p>
+            <a:r>
+              <a:rPr lang="en-US" baseline="0" dirty="0" smtClean="0"/>
+              <a:t>Xx update</a:t>
+            </a:r>
           </a:p>
         </p:txBody>
       </p:sp>
@@ -7534,7 +6484,7 @@
             <a:fld id="{FA3C144B-2939-9A49-B014-915EC3E81866}" type="datetime1">
               <a:rPr lang="en-US" smtClean="0"/>
               <a:pPr/>
-              <a:t>1/30/14</a:t>
+              <a:t>2/20/14</a:t>
             </a:fld>
             <a:endParaRPr lang="en-US" dirty="0"/>
           </a:p>
@@ -7963,7 +6913,7 @@
           <a:p>
             <a:fld id="{76838339-A875-5E45-AB3F-AAABD270346A}" type="datetime1">
               <a:rPr lang="en-US" smtClean="0"/>
-              <a:t>1/30/14</a:t>
+              <a:t>2/20/14</a:t>
             </a:fld>
             <a:endParaRPr lang="en-US"/>
           </a:p>
@@ -8249,7 +7199,7 @@
             <a:fld id="{FA3C144B-2939-9A49-B014-915EC3E81866}" type="datetime1">
               <a:rPr lang="en-US" smtClean="0"/>
               <a:pPr/>
-              <a:t>1/30/14</a:t>
+              <a:t>2/20/14</a:t>
             </a:fld>
             <a:endParaRPr lang="en-US" dirty="0"/>
           </a:p>
@@ -8731,7 +7681,7 @@
           <a:p>
             <a:fld id="{A73F672F-A5FB-5745-934A-1BF51CA5539C}" type="datetime1">
               <a:rPr lang="en-US" smtClean="0"/>
-              <a:t>1/30/14</a:t>
+              <a:t>2/20/14</a:t>
             </a:fld>
             <a:endParaRPr lang="en-US"/>
           </a:p>
@@ -9073,7 +8023,7 @@
             <a:fld id="{FA3C144B-2939-9A49-B014-915EC3E81866}" type="datetime1">
               <a:rPr lang="en-US" smtClean="0"/>
               <a:pPr/>
-              <a:t>1/30/14</a:t>
+              <a:t>2/20/14</a:t>
             </a:fld>
             <a:endParaRPr lang="en-US" dirty="0"/>
           </a:p>
@@ -9537,7 +8487,7 @@
           <a:p>
             <a:fld id="{6AFE6A63-5EBE-3E48-B0AE-DF655A1ECE76}" type="datetime1">
               <a:rPr lang="en-US" smtClean="0"/>
-              <a:t>1/30/14</a:t>
+              <a:t>2/20/14</a:t>
             </a:fld>
             <a:endParaRPr lang="en-US"/>
           </a:p>
@@ -9856,7 +8806,7 @@
           <a:p>
             <a:fld id="{4A019F0C-9D18-B54A-9AC9-18AA74EDB034}" type="datetime1">
               <a:rPr lang="en-US" smtClean="0"/>
-              <a:t>1/30/14</a:t>
+              <a:t>2/20/14</a:t>
             </a:fld>
             <a:endParaRPr lang="en-US"/>
           </a:p>
@@ -10166,7 +9116,7 @@
             <a:fld id="{FA3C144B-2939-9A49-B014-915EC3E81866}" type="datetime1">
               <a:rPr lang="en-US" smtClean="0"/>
               <a:pPr/>
-              <a:t>1/30/14</a:t>
+              <a:t>2/20/14</a:t>
             </a:fld>
             <a:endParaRPr lang="en-US" dirty="0"/>
           </a:p>
@@ -10429,7 +9379,7 @@
           <a:p>
             <a:fld id="{FA3C144B-2939-9A49-B014-915EC3E81866}" type="datetime1">
               <a:rPr lang="en-US" smtClean="0"/>
-              <a:t>1/30/14</a:t>
+              <a:t>2/20/14</a:t>
             </a:fld>
             <a:endParaRPr lang="en-US" dirty="0"/>
           </a:p>
@@ -10797,7 +9747,7 @@
           <a:p>
             <a:fld id="{7053BEFA-1175-F644-B249-7D41D72BD3FF}" type="datetime1">
               <a:rPr lang="en-US" smtClean="0"/>
-              <a:t>1/30/14</a:t>
+              <a:t>2/20/14</a:t>
             </a:fld>
             <a:endParaRPr lang="en-US"/>
           </a:p>
@@ -10916,7 +9866,7 @@
             <a:fld id="{FA3C144B-2939-9A49-B014-915EC3E81866}" type="datetime1">
               <a:rPr lang="en-US" smtClean="0"/>
               <a:pPr/>
-              <a:t>1/30/14</a:t>
+              <a:t>2/20/14</a:t>
             </a:fld>
             <a:endParaRPr lang="en-US" dirty="0"/>
           </a:p>
@@ -11133,7 +10083,7 @@
             <a:fld id="{FA3C144B-2939-9A49-B014-915EC3E81866}" type="datetime1">
               <a:rPr lang="en-US" smtClean="0"/>
               <a:pPr/>
-              <a:t>1/30/14</a:t>
+              <a:t>2/20/14</a:t>
             </a:fld>
             <a:endParaRPr lang="en-US" dirty="0"/>
           </a:p>
@@ -11378,7 +10328,7 @@
             <a:fld id="{FA3C144B-2939-9A49-B014-915EC3E81866}" type="datetime1">
               <a:rPr lang="en-US" smtClean="0"/>
               <a:pPr/>
-              <a:t>1/30/14</a:t>
+              <a:t>2/20/14</a:t>
             </a:fld>
             <a:endParaRPr lang="en-US" dirty="0"/>
           </a:p>
@@ -11756,7 +10706,7 @@
           <a:p>
             <a:fld id="{111EEF3B-ABF2-AA4E-9E24-0C6256942674}" type="datetime1">
               <a:rPr lang="en-US" smtClean="0"/>
-              <a:t>1/30/14</a:t>
+              <a:t>2/20/14</a:t>
             </a:fld>
             <a:endParaRPr lang="en-US"/>
           </a:p>
@@ -11920,7 +10870,7 @@
             <a:fld id="{FA3C144B-2939-9A49-B014-915EC3E81866}" type="datetime1">
               <a:rPr lang="en-US" smtClean="0"/>
               <a:pPr/>
-              <a:t>1/30/14</a:t>
+              <a:t>2/20/14</a:t>
             </a:fld>
             <a:endParaRPr lang="en-US" dirty="0"/>
           </a:p>
@@ -12337,7 +11287,7 @@
             <a:fld id="{FA3C144B-2939-9A49-B014-915EC3E81866}" type="datetime1">
               <a:rPr lang="en-US" smtClean="0"/>
               <a:pPr/>
-              <a:t>1/30/14</a:t>
+              <a:t>2/20/14</a:t>
             </a:fld>
             <a:endParaRPr lang="en-US" dirty="0"/>
           </a:p>
@@ -12653,7 +11603,7 @@
             <a:fld id="{FA3C144B-2939-9A49-B014-915EC3E81866}" type="datetime1">
               <a:rPr lang="en-US" smtClean="0"/>
               <a:pPr/>
-              <a:t>1/30/14</a:t>
+              <a:t>2/20/14</a:t>
             </a:fld>
             <a:endParaRPr lang="en-US" dirty="0"/>
           </a:p>
@@ -13319,7 +12269,7 @@
             <a:fld id="{FA3C144B-2939-9A49-B014-915EC3E81866}" type="datetime1">
               <a:rPr lang="en-US" smtClean="0"/>
               <a:pPr/>
-              <a:t>1/30/14</a:t>
+              <a:t>2/20/14</a:t>
             </a:fld>
             <a:endParaRPr lang="en-US" dirty="0"/>
           </a:p>
@@ -14527,7 +13477,7 @@
           <a:p>
             <a:fld id="{7053BEFA-1175-F644-B249-7D41D72BD3FF}" type="datetime1">
               <a:rPr lang="en-US" smtClean="0"/>
-              <a:t>1/30/14</a:t>
+              <a:t>2/20/14</a:t>
             </a:fld>
             <a:endParaRPr lang="en-US"/>
           </a:p>
@@ -14741,7 +13691,7 @@
           <a:p>
             <a:fld id="{7053BEFA-1175-F644-B249-7D41D72BD3FF}" type="datetime1">
               <a:rPr lang="en-US" smtClean="0"/>
-              <a:t>1/30/14</a:t>
+              <a:t>2/20/14</a:t>
             </a:fld>
             <a:endParaRPr lang="en-US"/>
           </a:p>
@@ -14891,7 +13841,7 @@
           <a:p>
             <a:fld id="{7053BEFA-1175-F644-B249-7D41D72BD3FF}" type="datetime1">
               <a:rPr lang="en-US" smtClean="0"/>
-              <a:t>1/30/14</a:t>
+              <a:t>2/20/14</a:t>
             </a:fld>
             <a:endParaRPr lang="en-US"/>
           </a:p>
@@ -15152,7 +14102,7 @@
           <a:p>
             <a:fld id="{7053BEFA-1175-F644-B249-7D41D72BD3FF}" type="datetime1">
               <a:rPr lang="en-US" smtClean="0"/>
-              <a:t>1/30/14</a:t>
+              <a:t>2/20/14</a:t>
             </a:fld>
             <a:endParaRPr lang="en-US"/>
           </a:p>
@@ -15359,7 +14309,7 @@
           <a:p>
             <a:fld id="{7053BEFA-1175-F644-B249-7D41D72BD3FF}" type="datetime1">
               <a:rPr lang="en-US" smtClean="0"/>
-              <a:t>1/30/14</a:t>
+              <a:t>2/20/14</a:t>
             </a:fld>
             <a:endParaRPr lang="en-US"/>
           </a:p>
@@ -15572,7 +14522,7 @@
           <a:p>
             <a:fld id="{7053BEFA-1175-F644-B249-7D41D72BD3FF}" type="datetime1">
               <a:rPr lang="en-US" smtClean="0"/>
-              <a:t>1/30/14</a:t>
+              <a:t>2/20/14</a:t>
             </a:fld>
             <a:endParaRPr lang="en-US"/>
           </a:p>
@@ -16400,7 +15350,7 @@
           <a:p>
             <a:fld id="{7053BEFA-1175-F644-B249-7D41D72BD3FF}" type="datetime1">
               <a:rPr lang="en-US" smtClean="0"/>
-              <a:t>1/30/14</a:t>
+              <a:t>2/20/14</a:t>
             </a:fld>
             <a:endParaRPr lang="en-US"/>
           </a:p>
@@ -17856,7 +16806,7 @@
           <a:p>
             <a:fld id="{7053BEFA-1175-F644-B249-7D41D72BD3FF}" type="datetime1">
               <a:rPr lang="en-US" smtClean="0"/>
-              <a:t>1/30/14</a:t>
+              <a:t>2/20/14</a:t>
             </a:fld>
             <a:endParaRPr lang="en-US"/>
           </a:p>
@@ -21726,7 +20676,7 @@
           <a:p>
             <a:fld id="{7053BEFA-1175-F644-B249-7D41D72BD3FF}" type="datetime1">
               <a:rPr lang="en-US" smtClean="0"/>
-              <a:t>1/30/14</a:t>
+              <a:t>2/20/14</a:t>
             </a:fld>
             <a:endParaRPr lang="en-US"/>
           </a:p>
@@ -21870,7 +20820,7 @@
           <a:p>
             <a:fld id="{111EEF3B-ABF2-AA4E-9E24-0C6256942674}" type="datetime1">
               <a:rPr lang="en-US" smtClean="0"/>
-              <a:t>1/30/14</a:t>
+              <a:t>2/20/14</a:t>
             </a:fld>
             <a:endParaRPr lang="en-US"/>
           </a:p>
@@ -22001,7 +20951,7 @@
           <a:p>
             <a:fld id="{7053BEFA-1175-F644-B249-7D41D72BD3FF}" type="datetime1">
               <a:rPr lang="en-US" smtClean="0"/>
-              <a:t>1/30/14</a:t>
+              <a:t>2/20/14</a:t>
             </a:fld>
             <a:endParaRPr lang="en-US"/>
           </a:p>
@@ -22203,7 +21153,7 @@
           <a:p>
             <a:fld id="{7053BEFA-1175-F644-B249-7D41D72BD3FF}" type="datetime1">
               <a:rPr lang="en-US" smtClean="0"/>
-              <a:t>1/30/14</a:t>
+              <a:t>2/20/14</a:t>
             </a:fld>
             <a:endParaRPr lang="en-US"/>
           </a:p>
@@ -22328,7 +21278,7 @@
           <a:p>
             <a:fld id="{7053BEFA-1175-F644-B249-7D41D72BD3FF}" type="datetime1">
               <a:rPr lang="en-US" smtClean="0"/>
-              <a:t>1/30/14</a:t>
+              <a:t>2/20/14</a:t>
             </a:fld>
             <a:endParaRPr lang="en-US"/>
           </a:p>
@@ -22404,6 +21354,53 @@
           </a:xfrm>
         </p:spPr>
       </p:pic>
+      <p:sp>
+        <p:nvSpPr>
+          <p:cNvPr id="3" name="TextBox 2"/>
+          <p:cNvSpPr txBox="1"/>
+          <p:nvPr/>
+        </p:nvSpPr>
+        <p:spPr>
+          <a:xfrm>
+            <a:off x="465996" y="5064047"/>
+            <a:ext cx="8032968" cy="646331"/>
+          </a:xfrm>
+          <a:prstGeom prst="rect">
+            <a:avLst/>
+          </a:prstGeom>
+          <a:noFill/>
+        </p:spPr>
+        <p:txBody>
+          <a:bodyPr wrap="none" rtlCol="0">
+            <a:spAutoFit/>
+          </a:bodyPr>
+          <a:lstStyle/>
+          <a:p>
+            <a:r>
+              <a:rPr lang="en-US" dirty="0" smtClean="0"/>
+              <a:t>Xx update with</a:t>
+            </a:r>
+          </a:p>
+          <a:p>
+            <a:r>
+              <a:rPr lang="en-US" dirty="0" smtClean="0"/>
+              <a:t>http</a:t>
+            </a:r>
+            <a:r>
+              <a:rPr lang="en-US" dirty="0"/>
+              <a:t>://</a:t>
+            </a:r>
+            <a:r>
+              <a:rPr lang="en-US" dirty="0" err="1"/>
+              <a:t>flowingdata.com</a:t>
+            </a:r>
+            <a:r>
+              <a:rPr lang="en-US" dirty="0"/>
+              <a:t>/2008/02/15/how-to-read-and-use-a-box-and-whisker-plot/</a:t>
+            </a:r>
+          </a:p>
+        </p:txBody>
+      </p:sp>
     </p:spTree>
     <p:extLst>
       <p:ext uri="{BB962C8B-B14F-4D97-AF65-F5344CB8AC3E}">
@@ -22512,7 +21509,7 @@
           <a:p>
             <a:fld id="{7053BEFA-1175-F644-B249-7D41D72BD3FF}" type="datetime1">
               <a:rPr lang="en-US" smtClean="0"/>
-              <a:t>1/30/14</a:t>
+              <a:t>2/20/14</a:t>
             </a:fld>
             <a:endParaRPr lang="en-US"/>
           </a:p>
@@ -22676,7 +21673,7 @@
           <a:p>
             <a:fld id="{7053BEFA-1175-F644-B249-7D41D72BD3FF}" type="datetime1">
               <a:rPr lang="en-US" smtClean="0"/>
-              <a:t>1/30/14</a:t>
+              <a:t>2/20/14</a:t>
             </a:fld>
             <a:endParaRPr lang="en-US"/>
           </a:p>
@@ -22963,7 +21960,7 @@
           <a:p>
             <a:fld id="{7053BEFA-1175-F644-B249-7D41D72BD3FF}" type="datetime1">
               <a:rPr lang="en-US" smtClean="0"/>
-              <a:t>1/30/14</a:t>
+              <a:t>2/20/14</a:t>
             </a:fld>
             <a:endParaRPr lang="en-US"/>
           </a:p>
@@ -23300,7 +22297,7 @@
           <a:p>
             <a:fld id="{7053BEFA-1175-F644-B249-7D41D72BD3FF}" type="datetime1">
               <a:rPr lang="en-US" smtClean="0"/>
-              <a:t>1/30/14</a:t>
+              <a:t>2/20/14</a:t>
             </a:fld>
             <a:endParaRPr lang="en-US"/>
           </a:p>
@@ -23490,7 +22487,7 @@
           <a:p>
             <a:fld id="{7053BEFA-1175-F644-B249-7D41D72BD3FF}" type="datetime1">
               <a:rPr lang="en-US" smtClean="0"/>
-              <a:t>1/30/14</a:t>
+              <a:t>2/20/14</a:t>
             </a:fld>
             <a:endParaRPr lang="en-US"/>
           </a:p>
@@ -23715,7 +22712,7 @@
           <a:p>
             <a:fld id="{7053BEFA-1175-F644-B249-7D41D72BD3FF}" type="datetime1">
               <a:rPr lang="en-US" smtClean="0"/>
-              <a:t>1/30/14</a:t>
+              <a:t>2/20/14</a:t>
             </a:fld>
             <a:endParaRPr lang="en-US"/>
           </a:p>
@@ -23941,7 +22938,7 @@
             <a:fld id="{A73F672F-A5FB-5745-934A-1BF51CA5539C}" type="datetime1">
               <a:rPr lang="en-US" smtClean="0"/>
               <a:pPr/>
-              <a:t>1/30/14</a:t>
+              <a:t>2/20/14</a:t>
             </a:fld>
             <a:endParaRPr lang="en-US"/>
           </a:p>
@@ -24153,7 +23150,7 @@
           <a:p>
             <a:fld id="{7053BEFA-1175-F644-B249-7D41D72BD3FF}" type="datetime1">
               <a:rPr lang="en-US" smtClean="0"/>
-              <a:t>1/30/14</a:t>
+              <a:t>2/20/14</a:t>
             </a:fld>
             <a:endParaRPr lang="en-US"/>
           </a:p>
@@ -24278,7 +23275,7 @@
           <a:p>
             <a:fld id="{7053BEFA-1175-F644-B249-7D41D72BD3FF}" type="datetime1">
               <a:rPr lang="en-US" smtClean="0"/>
-              <a:t>1/30/14</a:t>
+              <a:t>2/20/14</a:t>
             </a:fld>
             <a:endParaRPr lang="en-US"/>
           </a:p>
@@ -24836,7 +23833,7 @@
           <a:p>
             <a:fld id="{7053BEFA-1175-F644-B249-7D41D72BD3FF}" type="datetime1">
               <a:rPr lang="en-US" smtClean="0"/>
-              <a:t>1/30/14</a:t>
+              <a:t>2/20/14</a:t>
             </a:fld>
             <a:endParaRPr lang="en-US"/>
           </a:p>
@@ -25341,7 +24338,7 @@
           <a:p>
             <a:fld id="{7053BEFA-1175-F644-B249-7D41D72BD3FF}" type="datetime1">
               <a:rPr lang="en-US" smtClean="0"/>
-              <a:t>1/30/14</a:t>
+              <a:t>2/20/14</a:t>
             </a:fld>
             <a:endParaRPr lang="en-US"/>
           </a:p>
@@ -25852,7 +24849,7 @@
             <a:fld id="{FA3C144B-2939-9A49-B014-915EC3E81866}" type="datetime1">
               <a:rPr lang="en-US" smtClean="0"/>
               <a:pPr/>
-              <a:t>1/30/14</a:t>
+              <a:t>2/20/14</a:t>
             </a:fld>
             <a:endParaRPr lang="en-US" dirty="0"/>
           </a:p>
@@ -26089,7 +25086,7 @@
           <a:p>
             <a:fld id="{7053BEFA-1175-F644-B249-7D41D72BD3FF}" type="datetime1">
               <a:rPr lang="en-US" smtClean="0"/>
-              <a:t>1/30/14</a:t>
+              <a:t>2/20/14</a:t>
             </a:fld>
             <a:endParaRPr lang="en-US"/>
           </a:p>
@@ -26213,7 +25210,7 @@
           <a:p>
             <a:fld id="{7053BEFA-1175-F644-B249-7D41D72BD3FF}" type="datetime1">
               <a:rPr lang="en-US" smtClean="0"/>
-              <a:t>1/30/14</a:t>
+              <a:t>2/20/14</a:t>
             </a:fld>
             <a:endParaRPr lang="en-US"/>
           </a:p>
@@ -26414,7 +25411,7 @@
           <a:p>
             <a:fld id="{111EEF3B-ABF2-AA4E-9E24-0C6256942674}" type="datetime1">
               <a:rPr lang="en-US" smtClean="0"/>
-              <a:t>1/30/14</a:t>
+              <a:t>2/20/14</a:t>
             </a:fld>
             <a:endParaRPr lang="en-US"/>
           </a:p>
@@ -26604,7 +25601,7 @@
           <a:p>
             <a:fld id="{111EEF3B-ABF2-AA4E-9E24-0C6256942674}" type="datetime1">
               <a:rPr lang="en-US" smtClean="0"/>
-              <a:t>1/30/14</a:t>
+              <a:t>2/20/14</a:t>
             </a:fld>
             <a:endParaRPr lang="en-US"/>
           </a:p>
@@ -26759,7 +25756,7 @@
           <a:p>
             <a:fld id="{7053BEFA-1175-F644-B249-7D41D72BD3FF}" type="datetime1">
               <a:rPr lang="en-US" smtClean="0"/>
-              <a:t>1/30/14</a:t>
+              <a:t>2/20/14</a:t>
             </a:fld>
             <a:endParaRPr lang="en-US"/>
           </a:p>
@@ -26903,7 +25900,7 @@
           <a:p>
             <a:fld id="{7053BEFA-1175-F644-B249-7D41D72BD3FF}" type="datetime1">
               <a:rPr lang="en-US" smtClean="0"/>
-              <a:t>1/30/14</a:t>
+              <a:t>2/20/14</a:t>
             </a:fld>
             <a:endParaRPr lang="en-US"/>
           </a:p>
@@ -27047,7 +26044,7 @@
           <a:p>
             <a:fld id="{7053BEFA-1175-F644-B249-7D41D72BD3FF}" type="datetime1">
               <a:rPr lang="en-US" smtClean="0"/>
-              <a:t>1/30/14</a:t>
+              <a:t>2/20/14</a:t>
             </a:fld>
             <a:endParaRPr lang="en-US"/>
           </a:p>
@@ -27214,7 +26211,7 @@
           <a:p>
             <a:fld id="{7053BEFA-1175-F644-B249-7D41D72BD3FF}" type="datetime1">
               <a:rPr lang="en-US" smtClean="0"/>
-              <a:t>1/30/14</a:t>
+              <a:t>2/20/14</a:t>
             </a:fld>
             <a:endParaRPr lang="en-US"/>
           </a:p>

</xml_diff>

<commit_message>
lecture updates for first week
</commit_message>
<xml_diff>
--- a/Lectures/6 Exploration.pptx
+++ b/Lectures/6 Exploration.pptx
@@ -4724,7 +4724,7 @@
           <a:p>
             <a:fld id="{D3AAB66F-B1B7-D045-B4E8-4F60236F228D}" type="datetimeFigureOut">
               <a:rPr lang="en-US" smtClean="0"/>
-              <a:t>4/21/15</a:t>
+              <a:t>5/28/15</a:t>
             </a:fld>
             <a:endParaRPr lang="en-US"/>
           </a:p>
@@ -4890,7 +4890,7 @@
           <a:p>
             <a:fld id="{BCCF8E76-06A6-164E-A6FA-EC32C13EB232}" type="datetimeFigureOut">
               <a:rPr lang="en-US" smtClean="0"/>
-              <a:t>4/21/15</a:t>
+              <a:t>5/28/15</a:t>
             </a:fld>
             <a:endParaRPr lang="en-US"/>
           </a:p>
@@ -6172,6 +6172,38 @@
             <a:endParaRPr lang="en-US" dirty="0" smtClean="0"/>
           </a:p>
           <a:p>
+            <a:pPr marL="0" marR="0" indent="0" algn="l" defTabSz="457200" rtl="0" eaLnBrk="1" fontAlgn="auto" latinLnBrk="0" hangingPunct="1">
+              <a:lnSpc>
+                <a:spcPct val="100000"/>
+              </a:lnSpc>
+              <a:spcBef>
+                <a:spcPts val="0"/>
+              </a:spcBef>
+              <a:spcAft>
+                <a:spcPts val="0"/>
+              </a:spcAft>
+              <a:buClrTx/>
+              <a:buSzTx/>
+              <a:buFontTx/>
+              <a:buNone/>
+              <a:tabLst/>
+              <a:defRPr/>
+            </a:pPr>
+            <a:r>
+              <a:rPr lang="en-US" sz="1200" b="1" kern="1200" smtClean="0">
+                <a:solidFill>
+                  <a:schemeClr val="tx1"/>
+                </a:solidFill>
+                <a:effectLst/>
+                <a:latin typeface="+mn-lt"/>
+                <a:ea typeface="+mn-ea"/>
+                <a:cs typeface="+mn-cs"/>
+              </a:rPr>
+              <a:t>mean equals the variance </a:t>
+            </a:r>
+            <a:endParaRPr lang="en-US" smtClean="0"/>
+          </a:p>
+          <a:p>
             <a:endParaRPr lang="en-US" dirty="0"/>
           </a:p>
         </p:txBody>
@@ -7827,7 +7859,7 @@
             <a:fld id="{FA3C144B-2939-9A49-B014-915EC3E81866}" type="datetime1">
               <a:rPr lang="en-US" smtClean="0"/>
               <a:pPr/>
-              <a:t>4/21/15</a:t>
+              <a:t>5/28/15</a:t>
             </a:fld>
             <a:endParaRPr lang="en-US" dirty="0"/>
           </a:p>
@@ -8256,7 +8288,7 @@
           <a:p>
             <a:fld id="{76838339-A875-5E45-AB3F-AAABD270346A}" type="datetime1">
               <a:rPr lang="en-US" smtClean="0"/>
-              <a:t>4/21/15</a:t>
+              <a:t>5/28/15</a:t>
             </a:fld>
             <a:endParaRPr lang="en-US"/>
           </a:p>
@@ -8542,7 +8574,7 @@
             <a:fld id="{FA3C144B-2939-9A49-B014-915EC3E81866}" type="datetime1">
               <a:rPr lang="en-US" smtClean="0"/>
               <a:pPr/>
-              <a:t>4/21/15</a:t>
+              <a:t>5/28/15</a:t>
             </a:fld>
             <a:endParaRPr lang="en-US" dirty="0"/>
           </a:p>
@@ -9024,7 +9056,7 @@
           <a:p>
             <a:fld id="{A73F672F-A5FB-5745-934A-1BF51CA5539C}" type="datetime1">
               <a:rPr lang="en-US" smtClean="0"/>
-              <a:t>4/21/15</a:t>
+              <a:t>5/28/15</a:t>
             </a:fld>
             <a:endParaRPr lang="en-US"/>
           </a:p>
@@ -9366,7 +9398,7 @@
             <a:fld id="{FA3C144B-2939-9A49-B014-915EC3E81866}" type="datetime1">
               <a:rPr lang="en-US" smtClean="0"/>
               <a:pPr/>
-              <a:t>4/21/15</a:t>
+              <a:t>5/28/15</a:t>
             </a:fld>
             <a:endParaRPr lang="en-US" dirty="0"/>
           </a:p>
@@ -9830,7 +9862,7 @@
           <a:p>
             <a:fld id="{6AFE6A63-5EBE-3E48-B0AE-DF655A1ECE76}" type="datetime1">
               <a:rPr lang="en-US" smtClean="0"/>
-              <a:t>4/21/15</a:t>
+              <a:t>5/28/15</a:t>
             </a:fld>
             <a:endParaRPr lang="en-US"/>
           </a:p>
@@ -10149,7 +10181,7 @@
           <a:p>
             <a:fld id="{4A019F0C-9D18-B54A-9AC9-18AA74EDB034}" type="datetime1">
               <a:rPr lang="en-US" smtClean="0"/>
-              <a:t>4/21/15</a:t>
+              <a:t>5/28/15</a:t>
             </a:fld>
             <a:endParaRPr lang="en-US"/>
           </a:p>
@@ -10459,7 +10491,7 @@
             <a:fld id="{FA3C144B-2939-9A49-B014-915EC3E81866}" type="datetime1">
               <a:rPr lang="en-US" smtClean="0"/>
               <a:pPr/>
-              <a:t>4/21/15</a:t>
+              <a:t>5/28/15</a:t>
             </a:fld>
             <a:endParaRPr lang="en-US" dirty="0"/>
           </a:p>
@@ -10722,7 +10754,7 @@
           <a:p>
             <a:fld id="{FA3C144B-2939-9A49-B014-915EC3E81866}" type="datetime1">
               <a:rPr lang="en-US" smtClean="0"/>
-              <a:t>4/21/15</a:t>
+              <a:t>5/28/15</a:t>
             </a:fld>
             <a:endParaRPr lang="en-US" dirty="0"/>
           </a:p>
@@ -11090,7 +11122,7 @@
           <a:p>
             <a:fld id="{7053BEFA-1175-F644-B249-7D41D72BD3FF}" type="datetime1">
               <a:rPr lang="en-US" smtClean="0"/>
-              <a:t>4/21/15</a:t>
+              <a:t>5/28/15</a:t>
             </a:fld>
             <a:endParaRPr lang="en-US"/>
           </a:p>
@@ -11209,7 +11241,7 @@
             <a:fld id="{FA3C144B-2939-9A49-B014-915EC3E81866}" type="datetime1">
               <a:rPr lang="en-US" smtClean="0"/>
               <a:pPr/>
-              <a:t>4/21/15</a:t>
+              <a:t>5/28/15</a:t>
             </a:fld>
             <a:endParaRPr lang="en-US" dirty="0"/>
           </a:p>
@@ -11426,7 +11458,7 @@
             <a:fld id="{FA3C144B-2939-9A49-B014-915EC3E81866}" type="datetime1">
               <a:rPr lang="en-US" smtClean="0"/>
               <a:pPr/>
-              <a:t>4/21/15</a:t>
+              <a:t>5/28/15</a:t>
             </a:fld>
             <a:endParaRPr lang="en-US" dirty="0"/>
           </a:p>
@@ -11671,7 +11703,7 @@
             <a:fld id="{FA3C144B-2939-9A49-B014-915EC3E81866}" type="datetime1">
               <a:rPr lang="en-US" smtClean="0"/>
               <a:pPr/>
-              <a:t>4/21/15</a:t>
+              <a:t>5/28/15</a:t>
             </a:fld>
             <a:endParaRPr lang="en-US" dirty="0"/>
           </a:p>
@@ -12049,7 +12081,7 @@
           <a:p>
             <a:fld id="{111EEF3B-ABF2-AA4E-9E24-0C6256942674}" type="datetime1">
               <a:rPr lang="en-US" smtClean="0"/>
-              <a:t>4/21/15</a:t>
+              <a:t>5/28/15</a:t>
             </a:fld>
             <a:endParaRPr lang="en-US"/>
           </a:p>
@@ -12213,7 +12245,7 @@
             <a:fld id="{FA3C144B-2939-9A49-B014-915EC3E81866}" type="datetime1">
               <a:rPr lang="en-US" smtClean="0"/>
               <a:pPr/>
-              <a:t>4/21/15</a:t>
+              <a:t>5/28/15</a:t>
             </a:fld>
             <a:endParaRPr lang="en-US" dirty="0"/>
           </a:p>
@@ -12630,7 +12662,7 @@
             <a:fld id="{FA3C144B-2939-9A49-B014-915EC3E81866}" type="datetime1">
               <a:rPr lang="en-US" smtClean="0"/>
               <a:pPr/>
-              <a:t>4/21/15</a:t>
+              <a:t>5/28/15</a:t>
             </a:fld>
             <a:endParaRPr lang="en-US" dirty="0"/>
           </a:p>
@@ -12946,7 +12978,7 @@
             <a:fld id="{FA3C144B-2939-9A49-B014-915EC3E81866}" type="datetime1">
               <a:rPr lang="en-US" smtClean="0"/>
               <a:pPr/>
-              <a:t>4/21/15</a:t>
+              <a:t>5/28/15</a:t>
             </a:fld>
             <a:endParaRPr lang="en-US" dirty="0"/>
           </a:p>
@@ -13612,7 +13644,7 @@
             <a:fld id="{FA3C144B-2939-9A49-B014-915EC3E81866}" type="datetime1">
               <a:rPr lang="en-US" smtClean="0"/>
               <a:pPr/>
-              <a:t>4/21/15</a:t>
+              <a:t>5/28/15</a:t>
             </a:fld>
             <a:endParaRPr lang="en-US" dirty="0"/>
           </a:p>
@@ -14784,7 +14816,7 @@
           <a:p>
             <a:fld id="{7053BEFA-1175-F644-B249-7D41D72BD3FF}" type="datetime1">
               <a:rPr lang="en-US" smtClean="0"/>
-              <a:t>4/21/15</a:t>
+              <a:t>5/28/15</a:t>
             </a:fld>
             <a:endParaRPr lang="en-US"/>
           </a:p>
@@ -15035,7 +15067,7 @@
           <a:p>
             <a:fld id="{7053BEFA-1175-F644-B249-7D41D72BD3FF}" type="datetime1">
               <a:rPr lang="en-US" smtClean="0"/>
-              <a:t>4/21/15</a:t>
+              <a:t>5/28/15</a:t>
             </a:fld>
             <a:endParaRPr lang="en-US"/>
           </a:p>
@@ -15281,7 +15313,7 @@
           <a:p>
             <a:fld id="{7053BEFA-1175-F644-B249-7D41D72BD3FF}" type="datetime1">
               <a:rPr lang="en-US" smtClean="0"/>
-              <a:t>4/21/15</a:t>
+              <a:t>5/28/15</a:t>
             </a:fld>
             <a:endParaRPr lang="en-US"/>
           </a:p>
@@ -15431,7 +15463,7 @@
           <a:p>
             <a:fld id="{7053BEFA-1175-F644-B249-7D41D72BD3FF}" type="datetime1">
               <a:rPr lang="en-US" smtClean="0"/>
-              <a:t>4/21/15</a:t>
+              <a:t>5/28/15</a:t>
             </a:fld>
             <a:endParaRPr lang="en-US"/>
           </a:p>
@@ -15638,7 +15670,7 @@
           <a:p>
             <a:fld id="{7053BEFA-1175-F644-B249-7D41D72BD3FF}" type="datetime1">
               <a:rPr lang="en-US" smtClean="0"/>
-              <a:t>4/21/15</a:t>
+              <a:t>5/28/15</a:t>
             </a:fld>
             <a:endParaRPr lang="en-US"/>
           </a:p>
@@ -15836,7 +15868,7 @@
           <a:p>
             <a:fld id="{7053BEFA-1175-F644-B249-7D41D72BD3FF}" type="datetime1">
               <a:rPr lang="en-US" smtClean="0"/>
-              <a:t>4/21/15</a:t>
+              <a:t>5/28/15</a:t>
             </a:fld>
             <a:endParaRPr lang="en-US"/>
           </a:p>
@@ -16034,7 +16066,7 @@
           <a:p>
             <a:fld id="{7053BEFA-1175-F644-B249-7D41D72BD3FF}" type="datetime1">
               <a:rPr lang="en-US" smtClean="0"/>
-              <a:t>4/21/15</a:t>
+              <a:t>5/28/15</a:t>
             </a:fld>
             <a:endParaRPr lang="en-US"/>
           </a:p>
@@ -16552,7 +16584,7 @@
           <a:p>
             <a:fld id="{7053BEFA-1175-F644-B249-7D41D72BD3FF}" type="datetime1">
               <a:rPr lang="en-US" smtClean="0"/>
-              <a:t>4/21/15</a:t>
+              <a:t>5/28/15</a:t>
             </a:fld>
             <a:endParaRPr lang="en-US"/>
           </a:p>
@@ -18161,7 +18193,7 @@
           <a:p>
             <a:fld id="{7053BEFA-1175-F644-B249-7D41D72BD3FF}" type="datetime1">
               <a:rPr lang="en-US" smtClean="0"/>
-              <a:t>4/21/15</a:t>
+              <a:t>5/28/15</a:t>
             </a:fld>
             <a:endParaRPr lang="en-US"/>
           </a:p>
@@ -22290,7 +22322,7 @@
           <a:p>
             <a:fld id="{7053BEFA-1175-F644-B249-7D41D72BD3FF}" type="datetime1">
               <a:rPr lang="en-US" smtClean="0"/>
-              <a:t>4/21/15</a:t>
+              <a:t>5/28/15</a:t>
             </a:fld>
             <a:endParaRPr lang="en-US"/>
           </a:p>
@@ -22650,7 +22682,7 @@
           <a:p>
             <a:fld id="{7053BEFA-1175-F644-B249-7D41D72BD3FF}" type="datetime1">
               <a:rPr lang="en-US" smtClean="0"/>
-              <a:t>4/21/15</a:t>
+              <a:t>5/28/15</a:t>
             </a:fld>
             <a:endParaRPr lang="en-US"/>
           </a:p>
@@ -22852,7 +22884,7 @@
           <a:p>
             <a:fld id="{7053BEFA-1175-F644-B249-7D41D72BD3FF}" type="datetime1">
               <a:rPr lang="en-US" smtClean="0"/>
-              <a:t>4/21/15</a:t>
+              <a:t>5/28/15</a:t>
             </a:fld>
             <a:endParaRPr lang="en-US"/>
           </a:p>
@@ -23017,7 +23049,7 @@
           <a:p>
             <a:fld id="{7053BEFA-1175-F644-B249-7D41D72BD3FF}" type="datetime1">
               <a:rPr lang="en-US" smtClean="0"/>
-              <a:t>4/21/15</a:t>
+              <a:t>5/28/15</a:t>
             </a:fld>
             <a:endParaRPr lang="en-US"/>
           </a:p>
@@ -23187,7 +23219,7 @@
           <a:p>
             <a:fld id="{7053BEFA-1175-F644-B249-7D41D72BD3FF}" type="datetime1">
               <a:rPr lang="en-US" smtClean="0"/>
-              <a:t>4/21/15</a:t>
+              <a:t>5/28/15</a:t>
             </a:fld>
             <a:endParaRPr lang="en-US"/>
           </a:p>
@@ -23379,7 +23411,7 @@
           <a:p>
             <a:fld id="{7053BEFA-1175-F644-B249-7D41D72BD3FF}" type="datetime1">
               <a:rPr lang="en-US" smtClean="0"/>
-              <a:t>4/21/15</a:t>
+              <a:t>5/28/15</a:t>
             </a:fld>
             <a:endParaRPr lang="en-US"/>
           </a:p>
@@ -23666,7 +23698,7 @@
           <a:p>
             <a:fld id="{7053BEFA-1175-F644-B249-7D41D72BD3FF}" type="datetime1">
               <a:rPr lang="en-US" smtClean="0"/>
-              <a:t>4/21/15</a:t>
+              <a:t>5/28/15</a:t>
             </a:fld>
             <a:endParaRPr lang="en-US"/>
           </a:p>
@@ -24003,7 +24035,7 @@
           <a:p>
             <a:fld id="{7053BEFA-1175-F644-B249-7D41D72BD3FF}" type="datetime1">
               <a:rPr lang="en-US" smtClean="0"/>
-              <a:t>4/21/15</a:t>
+              <a:t>5/28/15</a:t>
             </a:fld>
             <a:endParaRPr lang="en-US"/>
           </a:p>
@@ -24193,7 +24225,7 @@
           <a:p>
             <a:fld id="{7053BEFA-1175-F644-B249-7D41D72BD3FF}" type="datetime1">
               <a:rPr lang="en-US" smtClean="0"/>
-              <a:t>4/21/15</a:t>
+              <a:t>5/28/15</a:t>
             </a:fld>
             <a:endParaRPr lang="en-US"/>
           </a:p>
@@ -24418,7 +24450,7 @@
           <a:p>
             <a:fld id="{7053BEFA-1175-F644-B249-7D41D72BD3FF}" type="datetime1">
               <a:rPr lang="en-US" smtClean="0"/>
-              <a:t>4/21/15</a:t>
+              <a:t>5/28/15</a:t>
             </a:fld>
             <a:endParaRPr lang="en-US"/>
           </a:p>
@@ -24644,7 +24676,7 @@
             <a:fld id="{A73F672F-A5FB-5745-934A-1BF51CA5539C}" type="datetime1">
               <a:rPr lang="en-US" smtClean="0"/>
               <a:pPr/>
-              <a:t>4/21/15</a:t>
+              <a:t>5/28/15</a:t>
             </a:fld>
             <a:endParaRPr lang="en-US"/>
           </a:p>
@@ -24789,7 +24821,7 @@
           <a:p>
             <a:fld id="{111EEF3B-ABF2-AA4E-9E24-0C6256942674}" type="datetime1">
               <a:rPr lang="en-US" smtClean="0"/>
-              <a:t>4/21/15</a:t>
+              <a:t>5/28/15</a:t>
             </a:fld>
             <a:endParaRPr lang="en-US"/>
           </a:p>
@@ -24895,7 +24927,7 @@
           <a:p>
             <a:fld id="{7053BEFA-1175-F644-B249-7D41D72BD3FF}" type="datetime1">
               <a:rPr lang="en-US" smtClean="0"/>
-              <a:t>4/21/15</a:t>
+              <a:t>5/28/15</a:t>
             </a:fld>
             <a:endParaRPr lang="en-US"/>
           </a:p>
@@ -25453,7 +25485,7 @@
           <a:p>
             <a:fld id="{7053BEFA-1175-F644-B249-7D41D72BD3FF}" type="datetime1">
               <a:rPr lang="en-US" smtClean="0"/>
-              <a:t>4/21/15</a:t>
+              <a:t>5/28/15</a:t>
             </a:fld>
             <a:endParaRPr lang="en-US"/>
           </a:p>
@@ -25958,7 +25990,7 @@
           <a:p>
             <a:fld id="{7053BEFA-1175-F644-B249-7D41D72BD3FF}" type="datetime1">
               <a:rPr lang="en-US" smtClean="0"/>
-              <a:t>4/21/15</a:t>
+              <a:t>5/28/15</a:t>
             </a:fld>
             <a:endParaRPr lang="en-US"/>
           </a:p>
@@ -26469,7 +26501,7 @@
             <a:fld id="{FA3C144B-2939-9A49-B014-915EC3E81866}" type="datetime1">
               <a:rPr lang="en-US" smtClean="0"/>
               <a:pPr/>
-              <a:t>4/21/15</a:t>
+              <a:t>5/28/15</a:t>
             </a:fld>
             <a:endParaRPr lang="en-US" dirty="0"/>
           </a:p>
@@ -26706,7 +26738,7 @@
           <a:p>
             <a:fld id="{7053BEFA-1175-F644-B249-7D41D72BD3FF}" type="datetime1">
               <a:rPr lang="en-US" smtClean="0"/>
-              <a:t>4/21/15</a:t>
+              <a:t>5/28/15</a:t>
             </a:fld>
             <a:endParaRPr lang="en-US"/>
           </a:p>
@@ -26830,7 +26862,7 @@
           <a:p>
             <a:fld id="{7053BEFA-1175-F644-B249-7D41D72BD3FF}" type="datetime1">
               <a:rPr lang="en-US" smtClean="0"/>
-              <a:t>4/21/15</a:t>
+              <a:t>5/28/15</a:t>
             </a:fld>
             <a:endParaRPr lang="en-US"/>
           </a:p>
@@ -27097,7 +27129,7 @@
           <a:p>
             <a:fld id="{7053BEFA-1175-F644-B249-7D41D72BD3FF}" type="datetime1">
               <a:rPr lang="en-US" smtClean="0"/>
-              <a:t>4/21/15</a:t>
+              <a:t>5/28/15</a:t>
             </a:fld>
             <a:endParaRPr lang="en-US"/>
           </a:p>
@@ -27385,7 +27417,7 @@
           <a:p>
             <a:fld id="{7053BEFA-1175-F644-B249-7D41D72BD3FF}" type="datetime1">
               <a:rPr lang="en-US" smtClean="0"/>
-              <a:t>4/21/15</a:t>
+              <a:t>5/28/15</a:t>
             </a:fld>
             <a:endParaRPr lang="en-US"/>
           </a:p>
@@ -27570,7 +27602,7 @@
           <a:p>
             <a:fld id="{111EEF3B-ABF2-AA4E-9E24-0C6256942674}" type="datetime1">
               <a:rPr lang="en-US" smtClean="0"/>
-              <a:t>4/21/15</a:t>
+              <a:t>5/28/15</a:t>
             </a:fld>
             <a:endParaRPr lang="en-US"/>
           </a:p>
@@ -27760,7 +27792,7 @@
           <a:p>
             <a:fld id="{111EEF3B-ABF2-AA4E-9E24-0C6256942674}" type="datetime1">
               <a:rPr lang="en-US" smtClean="0"/>
-              <a:t>4/21/15</a:t>
+              <a:t>5/28/15</a:t>
             </a:fld>
             <a:endParaRPr lang="en-US"/>
           </a:p>
@@ -27915,7 +27947,7 @@
           <a:p>
             <a:fld id="{7053BEFA-1175-F644-B249-7D41D72BD3FF}" type="datetime1">
               <a:rPr lang="en-US" smtClean="0"/>
-              <a:t>4/21/15</a:t>
+              <a:t>5/28/15</a:t>
             </a:fld>
             <a:endParaRPr lang="en-US"/>
           </a:p>
@@ -28059,7 +28091,7 @@
           <a:p>
             <a:fld id="{7053BEFA-1175-F644-B249-7D41D72BD3FF}" type="datetime1">
               <a:rPr lang="en-US" smtClean="0"/>
-              <a:t>4/21/15</a:t>
+              <a:t>5/28/15</a:t>
             </a:fld>
             <a:endParaRPr lang="en-US"/>
           </a:p>
@@ -28203,7 +28235,7 @@
           <a:p>
             <a:fld id="{7053BEFA-1175-F644-B249-7D41D72BD3FF}" type="datetime1">
               <a:rPr lang="en-US" smtClean="0"/>
-              <a:t>4/21/15</a:t>
+              <a:t>5/28/15</a:t>
             </a:fld>
             <a:endParaRPr lang="en-US"/>
           </a:p>

</xml_diff>